<commit_message>
Azure AZ-900 Section 9
</commit_message>
<xml_diff>
--- a/Azure_AZ-900_Fundamentals/MJH_AZ-900_Azure_Fundamentals_Notes.pptx
+++ b/Azure_AZ-900_Fundamentals/MJH_AZ-900_Azure_Fundamentals_Notes.pptx
@@ -39,11 +39,13 @@
     <p:sldId id="326" r:id="rId33"/>
     <p:sldId id="297" r:id="rId34"/>
     <p:sldId id="327" r:id="rId35"/>
-    <p:sldId id="298" r:id="rId36"/>
-    <p:sldId id="299" r:id="rId37"/>
-    <p:sldId id="300" r:id="rId38"/>
-    <p:sldId id="301" r:id="rId39"/>
-    <p:sldId id="302" r:id="rId40"/>
+    <p:sldId id="328" r:id="rId36"/>
+    <p:sldId id="298" r:id="rId37"/>
+    <p:sldId id="329" r:id="rId38"/>
+    <p:sldId id="299" r:id="rId39"/>
+    <p:sldId id="300" r:id="rId40"/>
+    <p:sldId id="301" r:id="rId41"/>
+    <p:sldId id="302" r:id="rId42"/>
   </p:sldIdLst>
   <p:sldSz cx="12192000" cy="6858000"/>
   <p:notesSz cx="6858000" cy="9144000"/>
@@ -299,7 +301,7 @@
           <a:p>
             <a:fld id="{655AA731-BE5F-44DA-AAEA-300254B29F16}" type="datetimeFigureOut">
               <a:rPr lang="en-GB" smtClean="0"/>
-              <a:t>28/02/2022</a:t>
+              <a:t>01/03/2022</a:t>
             </a:fld>
             <a:endParaRPr lang="en-GB"/>
           </a:p>
@@ -499,7 +501,7 @@
           <a:p>
             <a:fld id="{655AA731-BE5F-44DA-AAEA-300254B29F16}" type="datetimeFigureOut">
               <a:rPr lang="en-GB" smtClean="0"/>
-              <a:t>28/02/2022</a:t>
+              <a:t>01/03/2022</a:t>
             </a:fld>
             <a:endParaRPr lang="en-GB"/>
           </a:p>
@@ -709,7 +711,7 @@
           <a:p>
             <a:fld id="{655AA731-BE5F-44DA-AAEA-300254B29F16}" type="datetimeFigureOut">
               <a:rPr lang="en-GB" smtClean="0"/>
-              <a:t>28/02/2022</a:t>
+              <a:t>01/03/2022</a:t>
             </a:fld>
             <a:endParaRPr lang="en-GB"/>
           </a:p>
@@ -909,7 +911,7 @@
           <a:p>
             <a:fld id="{655AA731-BE5F-44DA-AAEA-300254B29F16}" type="datetimeFigureOut">
               <a:rPr lang="en-GB" smtClean="0"/>
-              <a:t>28/02/2022</a:t>
+              <a:t>01/03/2022</a:t>
             </a:fld>
             <a:endParaRPr lang="en-GB"/>
           </a:p>
@@ -1185,7 +1187,7 @@
           <a:p>
             <a:fld id="{655AA731-BE5F-44DA-AAEA-300254B29F16}" type="datetimeFigureOut">
               <a:rPr lang="en-GB" smtClean="0"/>
-              <a:t>28/02/2022</a:t>
+              <a:t>01/03/2022</a:t>
             </a:fld>
             <a:endParaRPr lang="en-GB"/>
           </a:p>
@@ -1453,7 +1455,7 @@
           <a:p>
             <a:fld id="{655AA731-BE5F-44DA-AAEA-300254B29F16}" type="datetimeFigureOut">
               <a:rPr lang="en-GB" smtClean="0"/>
-              <a:t>28/02/2022</a:t>
+              <a:t>01/03/2022</a:t>
             </a:fld>
             <a:endParaRPr lang="en-GB"/>
           </a:p>
@@ -1868,7 +1870,7 @@
           <a:p>
             <a:fld id="{655AA731-BE5F-44DA-AAEA-300254B29F16}" type="datetimeFigureOut">
               <a:rPr lang="en-GB" smtClean="0"/>
-              <a:t>28/02/2022</a:t>
+              <a:t>01/03/2022</a:t>
             </a:fld>
             <a:endParaRPr lang="en-GB"/>
           </a:p>
@@ -2010,7 +2012,7 @@
           <a:p>
             <a:fld id="{655AA731-BE5F-44DA-AAEA-300254B29F16}" type="datetimeFigureOut">
               <a:rPr lang="en-GB" smtClean="0"/>
-              <a:t>28/02/2022</a:t>
+              <a:t>01/03/2022</a:t>
             </a:fld>
             <a:endParaRPr lang="en-GB"/>
           </a:p>
@@ -2123,7 +2125,7 @@
           <a:p>
             <a:fld id="{655AA731-BE5F-44DA-AAEA-300254B29F16}" type="datetimeFigureOut">
               <a:rPr lang="en-GB" smtClean="0"/>
-              <a:t>28/02/2022</a:t>
+              <a:t>01/03/2022</a:t>
             </a:fld>
             <a:endParaRPr lang="en-GB"/>
           </a:p>
@@ -2436,7 +2438,7 @@
           <a:p>
             <a:fld id="{655AA731-BE5F-44DA-AAEA-300254B29F16}" type="datetimeFigureOut">
               <a:rPr lang="en-GB" smtClean="0"/>
-              <a:t>28/02/2022</a:t>
+              <a:t>01/03/2022</a:t>
             </a:fld>
             <a:endParaRPr lang="en-GB"/>
           </a:p>
@@ -2725,7 +2727,7 @@
           <a:p>
             <a:fld id="{655AA731-BE5F-44DA-AAEA-300254B29F16}" type="datetimeFigureOut">
               <a:rPr lang="en-GB" smtClean="0"/>
-              <a:t>28/02/2022</a:t>
+              <a:t>01/03/2022</a:t>
             </a:fld>
             <a:endParaRPr lang="en-GB"/>
           </a:p>
@@ -2968,7 +2970,7 @@
           <a:p>
             <a:fld id="{655AA731-BE5F-44DA-AAEA-300254B29F16}" type="datetimeFigureOut">
               <a:rPr lang="en-GB" smtClean="0"/>
-              <a:t>28/02/2022</a:t>
+              <a:t>01/03/2022</a:t>
             </a:fld>
             <a:endParaRPr lang="en-GB"/>
           </a:p>
@@ -21999,6 +22001,809 @@
           <a:chExt cx="0" cy="0"/>
         </a:xfrm>
       </p:grpSpPr>
+      <p:grpSp>
+        <p:nvGrpSpPr>
+          <p:cNvPr id="18" name="Group 17">
+            <a:extLst>
+              <a:ext uri="{FF2B5EF4-FFF2-40B4-BE49-F238E27FC236}">
+                <a16:creationId xmlns:a16="http://schemas.microsoft.com/office/drawing/2014/main" id="{6185BE9B-87C8-4B46-9293-0E71CF17E76A}"/>
+              </a:ext>
+            </a:extLst>
+          </p:cNvPr>
+          <p:cNvGrpSpPr/>
+          <p:nvPr/>
+        </p:nvGrpSpPr>
+        <p:grpSpPr>
+          <a:xfrm>
+            <a:off x="99755" y="83129"/>
+            <a:ext cx="11953701" cy="872834"/>
+            <a:chOff x="99755" y="83129"/>
+            <a:chExt cx="11953701" cy="872834"/>
+          </a:xfrm>
+        </p:grpSpPr>
+        <p:cxnSp>
+          <p:nvCxnSpPr>
+            <p:cNvPr id="5" name="Straight Connector 4">
+              <a:extLst>
+                <a:ext uri="{FF2B5EF4-FFF2-40B4-BE49-F238E27FC236}">
+                  <a16:creationId xmlns:a16="http://schemas.microsoft.com/office/drawing/2014/main" id="{A8BE4EF8-406C-4035-940C-AB752B29BA18}"/>
+                </a:ext>
+              </a:extLst>
+            </p:cNvPr>
+            <p:cNvCxnSpPr/>
+            <p:nvPr/>
+          </p:nvCxnSpPr>
+          <p:spPr>
+            <a:xfrm>
+              <a:off x="99755" y="955963"/>
+              <a:ext cx="11953701" cy="0"/>
+            </a:xfrm>
+            <a:prstGeom prst="line">
+              <a:avLst/>
+            </a:prstGeom>
+            <a:ln w="19050">
+              <a:solidFill>
+                <a:srgbClr val="0072C6"/>
+              </a:solidFill>
+            </a:ln>
+          </p:spPr>
+          <p:style>
+            <a:lnRef idx="1">
+              <a:schemeClr val="accent1"/>
+            </a:lnRef>
+            <a:fillRef idx="0">
+              <a:schemeClr val="accent1"/>
+            </a:fillRef>
+            <a:effectRef idx="0">
+              <a:schemeClr val="accent1"/>
+            </a:effectRef>
+            <a:fontRef idx="minor">
+              <a:schemeClr val="tx1"/>
+            </a:fontRef>
+          </p:style>
+        </p:cxnSp>
+        <p:sp>
+          <p:nvSpPr>
+            <p:cNvPr id="8" name="TextBox 7">
+              <a:extLst>
+                <a:ext uri="{FF2B5EF4-FFF2-40B4-BE49-F238E27FC236}">
+                  <a16:creationId xmlns:a16="http://schemas.microsoft.com/office/drawing/2014/main" id="{C61B684E-FDA7-4625-9CC3-79C17CC59ED7}"/>
+                </a:ext>
+              </a:extLst>
+            </p:cNvPr>
+            <p:cNvSpPr txBox="1"/>
+            <p:nvPr/>
+          </p:nvSpPr>
+          <p:spPr>
+            <a:xfrm>
+              <a:off x="4372494" y="180818"/>
+              <a:ext cx="2686392" cy="369332"/>
+            </a:xfrm>
+            <a:prstGeom prst="rect">
+              <a:avLst/>
+            </a:prstGeom>
+            <a:noFill/>
+          </p:spPr>
+          <p:txBody>
+            <a:bodyPr wrap="square" rtlCol="0">
+              <a:spAutoFit/>
+            </a:bodyPr>
+            <a:lstStyle/>
+            <a:p>
+              <a:pPr marL="0" marR="0" lvl="0" indent="0" algn="l" defTabSz="914400" rtl="0" eaLnBrk="1" fontAlgn="auto" latinLnBrk="0" hangingPunct="1">
+                <a:lnSpc>
+                  <a:spcPct val="100000"/>
+                </a:lnSpc>
+                <a:spcBef>
+                  <a:spcPts val="0"/>
+                </a:spcBef>
+                <a:spcAft>
+                  <a:spcPts val="0"/>
+                </a:spcAft>
+                <a:buClrTx/>
+                <a:buSzTx/>
+                <a:buFontTx/>
+                <a:buNone/>
+                <a:tabLst/>
+                <a:defRPr/>
+              </a:pPr>
+              <a:r>
+                <a:rPr kumimoji="0" lang="en-GB" sz="1800" b="0" i="0" u="none" strike="noStrike" kern="1200" cap="none" spc="0" normalizeH="0" baseline="0" noProof="0" dirty="0">
+                  <a:ln>
+                    <a:noFill/>
+                  </a:ln>
+                  <a:solidFill>
+                    <a:prstClr val="black"/>
+                  </a:solidFill>
+                  <a:effectLst/>
+                  <a:uLnTx/>
+                  <a:uFillTx/>
+                  <a:latin typeface="Calibri" panose="020F0502020204030204"/>
+                  <a:ea typeface="+mn-ea"/>
+                  <a:cs typeface="+mn-cs"/>
+                </a:rPr>
+                <a:t>Azure Network Security</a:t>
+              </a:r>
+            </a:p>
+          </p:txBody>
+        </p:sp>
+        <p:sp>
+          <p:nvSpPr>
+            <p:cNvPr id="9" name="TextBox 8">
+              <a:extLst>
+                <a:ext uri="{FF2B5EF4-FFF2-40B4-BE49-F238E27FC236}">
+                  <a16:creationId xmlns:a16="http://schemas.microsoft.com/office/drawing/2014/main" id="{F6943DFB-F258-4603-B2D8-7E2958123510}"/>
+                </a:ext>
+              </a:extLst>
+            </p:cNvPr>
+            <p:cNvSpPr txBox="1"/>
+            <p:nvPr/>
+          </p:nvSpPr>
+          <p:spPr>
+            <a:xfrm>
+              <a:off x="7197436" y="190641"/>
+              <a:ext cx="2155764" cy="369332"/>
+            </a:xfrm>
+            <a:prstGeom prst="rect">
+              <a:avLst/>
+            </a:prstGeom>
+            <a:noFill/>
+          </p:spPr>
+          <p:txBody>
+            <a:bodyPr wrap="square" rtlCol="0">
+              <a:spAutoFit/>
+            </a:bodyPr>
+            <a:lstStyle/>
+            <a:p>
+              <a:pPr marL="0" marR="0" lvl="0" indent="0" algn="l" defTabSz="914400" rtl="0" eaLnBrk="1" fontAlgn="auto" latinLnBrk="0" hangingPunct="1">
+                <a:lnSpc>
+                  <a:spcPct val="100000"/>
+                </a:lnSpc>
+                <a:spcBef>
+                  <a:spcPts val="0"/>
+                </a:spcBef>
+                <a:spcAft>
+                  <a:spcPts val="0"/>
+                </a:spcAft>
+                <a:buClrTx/>
+                <a:buSzTx/>
+                <a:buFontTx/>
+                <a:buNone/>
+                <a:tabLst/>
+                <a:defRPr/>
+              </a:pPr>
+              <a:r>
+                <a:rPr kumimoji="0" lang="en-GB" sz="1800" b="0" i="0" u="none" strike="noStrike" kern="1200" cap="none" spc="0" normalizeH="0" baseline="0" noProof="0" dirty="0">
+                  <a:ln>
+                    <a:noFill/>
+                  </a:ln>
+                  <a:solidFill>
+                    <a:prstClr val="black"/>
+                  </a:solidFill>
+                  <a:effectLst/>
+                  <a:uLnTx/>
+                  <a:uFillTx/>
+                  <a:latin typeface="Calibri" panose="020F0502020204030204"/>
+                  <a:ea typeface="+mn-ea"/>
+                  <a:cs typeface="+mn-cs"/>
+                </a:rPr>
+                <a:t>Section: 9.42</a:t>
+              </a:r>
+            </a:p>
+          </p:txBody>
+        </p:sp>
+        <p:sp>
+          <p:nvSpPr>
+            <p:cNvPr id="10" name="TextBox 9">
+              <a:extLst>
+                <a:ext uri="{FF2B5EF4-FFF2-40B4-BE49-F238E27FC236}">
+                  <a16:creationId xmlns:a16="http://schemas.microsoft.com/office/drawing/2014/main" id="{4E568F0D-7E90-4A0C-8070-6C806D992954}"/>
+                </a:ext>
+              </a:extLst>
+            </p:cNvPr>
+            <p:cNvSpPr txBox="1"/>
+            <p:nvPr/>
+          </p:nvSpPr>
+          <p:spPr>
+            <a:xfrm>
+              <a:off x="9534699" y="180818"/>
+              <a:ext cx="2155764" cy="369332"/>
+            </a:xfrm>
+            <a:prstGeom prst="rect">
+              <a:avLst/>
+            </a:prstGeom>
+            <a:noFill/>
+          </p:spPr>
+          <p:txBody>
+            <a:bodyPr wrap="square" rtlCol="0">
+              <a:spAutoFit/>
+            </a:bodyPr>
+            <a:lstStyle/>
+            <a:p>
+              <a:pPr marL="0" marR="0" lvl="0" indent="0" algn="l" defTabSz="914400" rtl="0" eaLnBrk="1" fontAlgn="auto" latinLnBrk="0" hangingPunct="1">
+                <a:lnSpc>
+                  <a:spcPct val="100000"/>
+                </a:lnSpc>
+                <a:spcBef>
+                  <a:spcPts val="0"/>
+                </a:spcBef>
+                <a:spcAft>
+                  <a:spcPts val="0"/>
+                </a:spcAft>
+                <a:buClrTx/>
+                <a:buSzTx/>
+                <a:buFontTx/>
+                <a:buNone/>
+                <a:tabLst/>
+                <a:defRPr/>
+              </a:pPr>
+              <a:r>
+                <a:rPr kumimoji="0" lang="en-GB" sz="1800" b="0" i="0" u="none" strike="noStrike" kern="1200" cap="none" spc="0" normalizeH="0" baseline="0" noProof="0" dirty="0">
+                  <a:ln>
+                    <a:noFill/>
+                  </a:ln>
+                  <a:solidFill>
+                    <a:prstClr val="black"/>
+                  </a:solidFill>
+                  <a:effectLst/>
+                  <a:uLnTx/>
+                  <a:uFillTx/>
+                  <a:latin typeface="Calibri" panose="020F0502020204030204"/>
+                  <a:ea typeface="+mn-ea"/>
+                  <a:cs typeface="+mn-cs"/>
+                </a:rPr>
+                <a:t>Date: </a:t>
+              </a:r>
+              <a:r>
+                <a:rPr lang="en-GB" dirty="0">
+                  <a:solidFill>
+                    <a:prstClr val="black"/>
+                  </a:solidFill>
+                  <a:latin typeface="Calibri" panose="020F0502020204030204"/>
+                </a:rPr>
+                <a:t>01</a:t>
+              </a:r>
+              <a:r>
+                <a:rPr kumimoji="0" lang="en-GB" sz="1800" b="0" i="0" u="none" strike="noStrike" kern="1200" cap="none" spc="0" normalizeH="0" baseline="0" noProof="0" dirty="0">
+                  <a:ln>
+                    <a:noFill/>
+                  </a:ln>
+                  <a:solidFill>
+                    <a:prstClr val="black"/>
+                  </a:solidFill>
+                  <a:effectLst/>
+                  <a:uLnTx/>
+                  <a:uFillTx/>
+                  <a:latin typeface="Calibri" panose="020F0502020204030204"/>
+                  <a:ea typeface="+mn-ea"/>
+                  <a:cs typeface="+mn-cs"/>
+                </a:rPr>
+                <a:t>/03/22 </a:t>
+              </a:r>
+            </a:p>
+          </p:txBody>
+        </p:sp>
+        <p:cxnSp>
+          <p:nvCxnSpPr>
+            <p:cNvPr id="11" name="Straight Connector 10">
+              <a:extLst>
+                <a:ext uri="{FF2B5EF4-FFF2-40B4-BE49-F238E27FC236}">
+                  <a16:creationId xmlns:a16="http://schemas.microsoft.com/office/drawing/2014/main" id="{F70ABCF3-BE60-426F-8C8C-059C854869C6}"/>
+                </a:ext>
+              </a:extLst>
+            </p:cNvPr>
+            <p:cNvCxnSpPr>
+              <a:cxnSpLocks/>
+            </p:cNvCxnSpPr>
+            <p:nvPr/>
+          </p:nvCxnSpPr>
+          <p:spPr>
+            <a:xfrm flipV="1">
+              <a:off x="4267202" y="93505"/>
+              <a:ext cx="1" cy="754394"/>
+            </a:xfrm>
+            <a:prstGeom prst="line">
+              <a:avLst/>
+            </a:prstGeom>
+            <a:ln w="19050">
+              <a:solidFill>
+                <a:srgbClr val="0072C6"/>
+              </a:solidFill>
+            </a:ln>
+          </p:spPr>
+          <p:style>
+            <a:lnRef idx="1">
+              <a:schemeClr val="accent1"/>
+            </a:lnRef>
+            <a:fillRef idx="0">
+              <a:schemeClr val="accent1"/>
+            </a:fillRef>
+            <a:effectRef idx="0">
+              <a:schemeClr val="accent1"/>
+            </a:effectRef>
+            <a:fontRef idx="minor">
+              <a:schemeClr val="tx1"/>
+            </a:fontRef>
+          </p:style>
+        </p:cxnSp>
+        <p:cxnSp>
+          <p:nvCxnSpPr>
+            <p:cNvPr id="15" name="Straight Connector 14">
+              <a:extLst>
+                <a:ext uri="{FF2B5EF4-FFF2-40B4-BE49-F238E27FC236}">
+                  <a16:creationId xmlns:a16="http://schemas.microsoft.com/office/drawing/2014/main" id="{D7F750D7-69E5-4FC3-AFB5-134C7587DE8B}"/>
+                </a:ext>
+              </a:extLst>
+            </p:cNvPr>
+            <p:cNvCxnSpPr>
+              <a:cxnSpLocks/>
+            </p:cNvCxnSpPr>
+            <p:nvPr/>
+          </p:nvCxnSpPr>
+          <p:spPr>
+            <a:xfrm flipV="1">
+              <a:off x="7154489" y="88317"/>
+              <a:ext cx="1" cy="754394"/>
+            </a:xfrm>
+            <a:prstGeom prst="line">
+              <a:avLst/>
+            </a:prstGeom>
+            <a:ln w="19050">
+              <a:solidFill>
+                <a:srgbClr val="0072C6"/>
+              </a:solidFill>
+            </a:ln>
+          </p:spPr>
+          <p:style>
+            <a:lnRef idx="1">
+              <a:schemeClr val="accent1"/>
+            </a:lnRef>
+            <a:fillRef idx="0">
+              <a:schemeClr val="accent1"/>
+            </a:fillRef>
+            <a:effectRef idx="0">
+              <a:schemeClr val="accent1"/>
+            </a:effectRef>
+            <a:fontRef idx="minor">
+              <a:schemeClr val="tx1"/>
+            </a:fontRef>
+          </p:style>
+        </p:cxnSp>
+        <p:cxnSp>
+          <p:nvCxnSpPr>
+            <p:cNvPr id="16" name="Straight Connector 15">
+              <a:extLst>
+                <a:ext uri="{FF2B5EF4-FFF2-40B4-BE49-F238E27FC236}">
+                  <a16:creationId xmlns:a16="http://schemas.microsoft.com/office/drawing/2014/main" id="{90F03633-4CAB-4B57-BF94-CF91E87AB7AE}"/>
+                </a:ext>
+              </a:extLst>
+            </p:cNvPr>
+            <p:cNvCxnSpPr>
+              <a:cxnSpLocks/>
+            </p:cNvCxnSpPr>
+            <p:nvPr/>
+          </p:nvCxnSpPr>
+          <p:spPr>
+            <a:xfrm flipV="1">
+              <a:off x="9491750" y="83129"/>
+              <a:ext cx="1" cy="754394"/>
+            </a:xfrm>
+            <a:prstGeom prst="line">
+              <a:avLst/>
+            </a:prstGeom>
+            <a:ln w="19050">
+              <a:solidFill>
+                <a:srgbClr val="0072C6"/>
+              </a:solidFill>
+            </a:ln>
+          </p:spPr>
+          <p:style>
+            <a:lnRef idx="1">
+              <a:schemeClr val="accent1"/>
+            </a:lnRef>
+            <a:fillRef idx="0">
+              <a:schemeClr val="accent1"/>
+            </a:fillRef>
+            <a:effectRef idx="0">
+              <a:schemeClr val="accent1"/>
+            </a:effectRef>
+            <a:fontRef idx="minor">
+              <a:schemeClr val="tx1"/>
+            </a:fontRef>
+          </p:style>
+        </p:cxnSp>
+      </p:grpSp>
+      <p:pic>
+        <p:nvPicPr>
+          <p:cNvPr id="20" name="Picture 2">
+            <a:extLst>
+              <a:ext uri="{FF2B5EF4-FFF2-40B4-BE49-F238E27FC236}">
+                <a16:creationId xmlns:a16="http://schemas.microsoft.com/office/drawing/2014/main" id="{775211BE-DA3A-41DA-8578-4E52F07B6AB9}"/>
+              </a:ext>
+            </a:extLst>
+          </p:cNvPr>
+          <p:cNvPicPr>
+            <a:picLocks noChangeAspect="1" noChangeArrowheads="1"/>
+          </p:cNvPicPr>
+          <p:nvPr/>
+        </p:nvPicPr>
+        <p:blipFill>
+          <a:blip r:embed="rId2">
+            <a:extLst>
+              <a:ext uri="{28A0092B-C50C-407E-A947-70E740481C1C}">
+                <a14:useLocalDpi xmlns:a14="http://schemas.microsoft.com/office/drawing/2010/main" val="0"/>
+              </a:ext>
+            </a:extLst>
+          </a:blip>
+          <a:srcRect/>
+          <a:stretch>
+            <a:fillRect/>
+          </a:stretch>
+        </p:blipFill>
+        <p:spPr bwMode="auto">
+          <a:xfrm>
+            <a:off x="144770" y="111976"/>
+            <a:ext cx="725548" cy="725548"/>
+          </a:xfrm>
+          <a:prstGeom prst="rect">
+            <a:avLst/>
+          </a:prstGeom>
+          <a:noFill/>
+          <a:extLst>
+            <a:ext uri="{909E8E84-426E-40DD-AFC4-6F175D3DCCD1}">
+              <a14:hiddenFill xmlns:a14="http://schemas.microsoft.com/office/drawing/2010/main">
+                <a:solidFill>
+                  <a:srgbClr val="FFFFFF"/>
+                </a:solidFill>
+              </a14:hiddenFill>
+            </a:ext>
+          </a:extLst>
+        </p:spPr>
+      </p:pic>
+      <p:sp>
+        <p:nvSpPr>
+          <p:cNvPr id="21" name="TextBox 20">
+            <a:extLst>
+              <a:ext uri="{FF2B5EF4-FFF2-40B4-BE49-F238E27FC236}">
+                <a16:creationId xmlns:a16="http://schemas.microsoft.com/office/drawing/2014/main" id="{30404CBF-C3F9-43E0-81FA-E9D4D01BC004}"/>
+              </a:ext>
+            </a:extLst>
+          </p:cNvPr>
+          <p:cNvSpPr txBox="1"/>
+          <p:nvPr/>
+        </p:nvSpPr>
+        <p:spPr>
+          <a:xfrm>
+            <a:off x="914402" y="191193"/>
+            <a:ext cx="3483032" cy="646331"/>
+          </a:xfrm>
+          <a:prstGeom prst="rect">
+            <a:avLst/>
+          </a:prstGeom>
+          <a:noFill/>
+        </p:spPr>
+        <p:txBody>
+          <a:bodyPr wrap="square" rtlCol="0">
+            <a:spAutoFit/>
+          </a:bodyPr>
+          <a:lstStyle/>
+          <a:p>
+            <a:pPr marL="0" marR="0" lvl="0" indent="0" algn="l" defTabSz="914400" rtl="0" eaLnBrk="1" fontAlgn="auto" latinLnBrk="0" hangingPunct="1">
+              <a:lnSpc>
+                <a:spcPct val="100000"/>
+              </a:lnSpc>
+              <a:spcBef>
+                <a:spcPts val="0"/>
+              </a:spcBef>
+              <a:spcAft>
+                <a:spcPts val="0"/>
+              </a:spcAft>
+              <a:buClrTx/>
+              <a:buSzTx/>
+              <a:buFontTx/>
+              <a:buNone/>
+              <a:tabLst/>
+              <a:defRPr/>
+            </a:pPr>
+            <a:r>
+              <a:rPr kumimoji="0" lang="en-GB" sz="1800" b="0" i="0" u="none" strike="noStrike" kern="1200" cap="none" spc="0" normalizeH="0" baseline="0" noProof="0" dirty="0">
+                <a:ln>
+                  <a:noFill/>
+                </a:ln>
+                <a:solidFill>
+                  <a:prstClr val="black"/>
+                </a:solidFill>
+                <a:effectLst/>
+                <a:uLnTx/>
+                <a:uFillTx/>
+                <a:latin typeface="Calibri" panose="020F0502020204030204"/>
+                <a:ea typeface="+mn-ea"/>
+                <a:cs typeface="+mn-cs"/>
+              </a:rPr>
+              <a:t>AZ-900 Microsoft Azure Fundamentals</a:t>
+            </a:r>
+          </a:p>
+        </p:txBody>
+      </p:sp>
+      <p:sp>
+        <p:nvSpPr>
+          <p:cNvPr id="12" name="TextBox 11">
+            <a:extLst>
+              <a:ext uri="{FF2B5EF4-FFF2-40B4-BE49-F238E27FC236}">
+                <a16:creationId xmlns:a16="http://schemas.microsoft.com/office/drawing/2014/main" id="{5596F3BE-9357-4855-866B-53B6C29BD18A}"/>
+              </a:ext>
+            </a:extLst>
+          </p:cNvPr>
+          <p:cNvSpPr txBox="1"/>
+          <p:nvPr/>
+        </p:nvSpPr>
+        <p:spPr>
+          <a:xfrm>
+            <a:off x="296357" y="1160593"/>
+            <a:ext cx="7605984" cy="2731773"/>
+          </a:xfrm>
+          <a:prstGeom prst="rect">
+            <a:avLst/>
+          </a:prstGeom>
+          <a:noFill/>
+        </p:spPr>
+        <p:txBody>
+          <a:bodyPr wrap="square" rtlCol="0">
+            <a:spAutoFit/>
+          </a:bodyPr>
+          <a:lstStyle/>
+          <a:p>
+            <a:pPr>
+              <a:lnSpc>
+                <a:spcPct val="120000"/>
+              </a:lnSpc>
+            </a:pPr>
+            <a:r>
+              <a:rPr lang="en-GB" sz="1600" b="1" dirty="0"/>
+              <a:t>Network Security Group</a:t>
+            </a:r>
+          </a:p>
+          <a:p>
+            <a:pPr marL="285750" indent="-285750">
+              <a:lnSpc>
+                <a:spcPct val="120000"/>
+              </a:lnSpc>
+              <a:buFontTx/>
+              <a:buChar char="-"/>
+            </a:pPr>
+            <a:r>
+              <a:rPr lang="en-GB" sz="1600" dirty="0"/>
+              <a:t>When setting up a virtual network we often split into multiple subnets designed for different purposes and with the aim of keeping things separate</a:t>
+            </a:r>
+          </a:p>
+          <a:p>
+            <a:pPr marL="285750" indent="-285750">
+              <a:lnSpc>
+                <a:spcPct val="120000"/>
+              </a:lnSpc>
+              <a:buFontTx/>
+              <a:buChar char="-"/>
+            </a:pPr>
+            <a:r>
+              <a:rPr lang="en-GB" sz="1600" dirty="0"/>
+              <a:t>NSG is a set of rules around a subnet. For example we may grant limited access to certain areas (e.g. VMs in that subnet may only access data from port x say.)</a:t>
+            </a:r>
+          </a:p>
+          <a:p>
+            <a:pPr marL="285750" indent="-285750">
+              <a:lnSpc>
+                <a:spcPct val="120000"/>
+              </a:lnSpc>
+              <a:buFontTx/>
+              <a:buChar char="-"/>
+            </a:pPr>
+            <a:endParaRPr lang="en-GB" sz="1600" dirty="0"/>
+          </a:p>
+          <a:p>
+            <a:pPr>
+              <a:lnSpc>
+                <a:spcPct val="120000"/>
+              </a:lnSpc>
+            </a:pPr>
+            <a:r>
+              <a:rPr lang="en-GB" sz="1600" b="1" dirty="0"/>
+              <a:t>Azure Firewall</a:t>
+            </a:r>
+          </a:p>
+          <a:p>
+            <a:pPr marL="285750" indent="-285750">
+              <a:lnSpc>
+                <a:spcPct val="120000"/>
+              </a:lnSpc>
+              <a:buFontTx/>
+              <a:buChar char="-"/>
+            </a:pPr>
+            <a:r>
+              <a:rPr lang="en-GB" sz="1600" dirty="0"/>
+              <a:t>Analyses traffic trying to come in and see if it matches known bad patterns</a:t>
+            </a:r>
+          </a:p>
+          <a:p>
+            <a:pPr marL="285750" indent="-285750">
+              <a:lnSpc>
+                <a:spcPct val="120000"/>
+              </a:lnSpc>
+              <a:buFontTx/>
+              <a:buChar char="-"/>
+            </a:pPr>
+            <a:endParaRPr lang="en-GB" sz="1600" dirty="0"/>
+          </a:p>
+        </p:txBody>
+      </p:sp>
+      <p:pic>
+        <p:nvPicPr>
+          <p:cNvPr id="3" name="Picture 2">
+            <a:extLst>
+              <a:ext uri="{FF2B5EF4-FFF2-40B4-BE49-F238E27FC236}">
+                <a16:creationId xmlns:a16="http://schemas.microsoft.com/office/drawing/2014/main" id="{CE5BF10D-FE77-472F-8B61-09A0FDC21E97}"/>
+              </a:ext>
+            </a:extLst>
+          </p:cNvPr>
+          <p:cNvPicPr>
+            <a:picLocks noChangeAspect="1"/>
+          </p:cNvPicPr>
+          <p:nvPr/>
+        </p:nvPicPr>
+        <p:blipFill>
+          <a:blip r:embed="rId3"/>
+          <a:stretch>
+            <a:fillRect/>
+          </a:stretch>
+        </p:blipFill>
+        <p:spPr>
+          <a:xfrm>
+            <a:off x="8384739" y="1074403"/>
+            <a:ext cx="3468466" cy="3854543"/>
+          </a:xfrm>
+          <a:prstGeom prst="rect">
+            <a:avLst/>
+          </a:prstGeom>
+        </p:spPr>
+      </p:pic>
+      <p:pic>
+        <p:nvPicPr>
+          <p:cNvPr id="6" name="Picture 5">
+            <a:extLst>
+              <a:ext uri="{FF2B5EF4-FFF2-40B4-BE49-F238E27FC236}">
+                <a16:creationId xmlns:a16="http://schemas.microsoft.com/office/drawing/2014/main" id="{542ADC00-26B5-49A1-B8FB-ABCF5E174725}"/>
+              </a:ext>
+            </a:extLst>
+          </p:cNvPr>
+          <p:cNvPicPr>
+            <a:picLocks noChangeAspect="1"/>
+          </p:cNvPicPr>
+          <p:nvPr/>
+        </p:nvPicPr>
+        <p:blipFill>
+          <a:blip r:embed="rId4"/>
+          <a:stretch>
+            <a:fillRect/>
+          </a:stretch>
+        </p:blipFill>
+        <p:spPr>
+          <a:xfrm>
+            <a:off x="3135810" y="3985717"/>
+            <a:ext cx="4766531" cy="2358369"/>
+          </a:xfrm>
+          <a:prstGeom prst="rect">
+            <a:avLst/>
+          </a:prstGeom>
+        </p:spPr>
+      </p:pic>
+      <p:sp>
+        <p:nvSpPr>
+          <p:cNvPr id="22" name="TextBox 21">
+            <a:extLst>
+              <a:ext uri="{FF2B5EF4-FFF2-40B4-BE49-F238E27FC236}">
+                <a16:creationId xmlns:a16="http://schemas.microsoft.com/office/drawing/2014/main" id="{78DC40C7-595F-462E-8322-976B7253D99E}"/>
+              </a:ext>
+            </a:extLst>
+          </p:cNvPr>
+          <p:cNvSpPr txBox="1"/>
+          <p:nvPr/>
+        </p:nvSpPr>
+        <p:spPr>
+          <a:xfrm>
+            <a:off x="296357" y="3705664"/>
+            <a:ext cx="2741437" cy="2731773"/>
+          </a:xfrm>
+          <a:prstGeom prst="rect">
+            <a:avLst/>
+          </a:prstGeom>
+          <a:noFill/>
+        </p:spPr>
+        <p:txBody>
+          <a:bodyPr wrap="square" rtlCol="0">
+            <a:spAutoFit/>
+          </a:bodyPr>
+          <a:lstStyle/>
+          <a:p>
+            <a:pPr>
+              <a:lnSpc>
+                <a:spcPct val="120000"/>
+              </a:lnSpc>
+            </a:pPr>
+            <a:endParaRPr lang="en-GB" sz="1600" dirty="0"/>
+          </a:p>
+          <a:p>
+            <a:pPr>
+              <a:lnSpc>
+                <a:spcPct val="120000"/>
+              </a:lnSpc>
+            </a:pPr>
+            <a:r>
+              <a:rPr lang="en-GB" sz="1600" b="1" dirty="0"/>
+              <a:t>Azure </a:t>
+            </a:r>
+            <a:r>
+              <a:rPr lang="en-GB" sz="1600" b="1" dirty="0" err="1"/>
+              <a:t>DDoD</a:t>
+            </a:r>
+            <a:r>
+              <a:rPr lang="en-GB" sz="1600" b="1" dirty="0"/>
+              <a:t> Protection</a:t>
+            </a:r>
+          </a:p>
+          <a:p>
+            <a:pPr marL="285750" indent="-285750">
+              <a:lnSpc>
+                <a:spcPct val="120000"/>
+              </a:lnSpc>
+              <a:buFontTx/>
+              <a:buChar char="-"/>
+            </a:pPr>
+            <a:r>
+              <a:rPr lang="en-GB" sz="1600" dirty="0"/>
+              <a:t>Main difference between basic and standard is instead of having general policies, the policies will be specifically tuned to you and your needs.</a:t>
+            </a:r>
+          </a:p>
+          <a:p>
+            <a:pPr marL="285750" indent="-285750">
+              <a:lnSpc>
+                <a:spcPct val="120000"/>
+              </a:lnSpc>
+              <a:buFontTx/>
+              <a:buChar char="-"/>
+            </a:pPr>
+            <a:endParaRPr lang="en-GB" sz="1600" dirty="0"/>
+          </a:p>
+        </p:txBody>
+      </p:sp>
+    </p:spTree>
+    <p:extLst>
+      <p:ext uri="{BB962C8B-B14F-4D97-AF65-F5344CB8AC3E}">
+        <p14:creationId xmlns:p14="http://schemas.microsoft.com/office/powerpoint/2010/main" val="374184079"/>
+      </p:ext>
+    </p:extLst>
+  </p:cSld>
+  <p:clrMapOvr>
+    <a:masterClrMapping/>
+  </p:clrMapOvr>
+</p:sld>
+</file>
+
+<file path=ppt/slides/slide36.xml><?xml version="1.0" encoding="utf-8"?>
+<p:sld xmlns:a="http://schemas.openxmlformats.org/drawingml/2006/main" xmlns:r="http://schemas.openxmlformats.org/officeDocument/2006/relationships" xmlns:p="http://schemas.openxmlformats.org/presentationml/2006/main">
+  <p:cSld>
+    <p:spTree>
+      <p:nvGrpSpPr>
+        <p:cNvPr id="1" name=""/>
+        <p:cNvGrpSpPr/>
+        <p:nvPr/>
+      </p:nvGrpSpPr>
+      <p:grpSpPr>
+        <a:xfrm>
+          <a:off x="0" y="0"/>
+          <a:ext cx="0" cy="0"/>
+          <a:chOff x="0" y="0"/>
+          <a:chExt cx="0" cy="0"/>
+        </a:xfrm>
+      </p:grpSpPr>
       <p:pic>
         <p:nvPicPr>
           <p:cNvPr id="7" name="Picture 2">
@@ -22299,7 +23104,715 @@
 </p:sld>
 </file>
 
-<file path=ppt/slides/slide36.xml><?xml version="1.0" encoding="utf-8"?>
+<file path=ppt/slides/slide37.xml><?xml version="1.0" encoding="utf-8"?>
+<p:sld xmlns:a="http://schemas.openxmlformats.org/drawingml/2006/main" xmlns:r="http://schemas.openxmlformats.org/officeDocument/2006/relationships" xmlns:p="http://schemas.openxmlformats.org/presentationml/2006/main">
+  <p:cSld>
+    <p:spTree>
+      <p:nvGrpSpPr>
+        <p:cNvPr id="1" name=""/>
+        <p:cNvGrpSpPr/>
+        <p:nvPr/>
+      </p:nvGrpSpPr>
+      <p:grpSpPr>
+        <a:xfrm>
+          <a:off x="0" y="0"/>
+          <a:ext cx="0" cy="0"/>
+          <a:chOff x="0" y="0"/>
+          <a:chExt cx="0" cy="0"/>
+        </a:xfrm>
+      </p:grpSpPr>
+      <p:grpSp>
+        <p:nvGrpSpPr>
+          <p:cNvPr id="18" name="Group 17">
+            <a:extLst>
+              <a:ext uri="{FF2B5EF4-FFF2-40B4-BE49-F238E27FC236}">
+                <a16:creationId xmlns:a16="http://schemas.microsoft.com/office/drawing/2014/main" id="{6185BE9B-87C8-4B46-9293-0E71CF17E76A}"/>
+              </a:ext>
+            </a:extLst>
+          </p:cNvPr>
+          <p:cNvGrpSpPr/>
+          <p:nvPr/>
+        </p:nvGrpSpPr>
+        <p:grpSpPr>
+          <a:xfrm>
+            <a:off x="99755" y="83129"/>
+            <a:ext cx="11953701" cy="872834"/>
+            <a:chOff x="99755" y="83129"/>
+            <a:chExt cx="11953701" cy="872834"/>
+          </a:xfrm>
+        </p:grpSpPr>
+        <p:cxnSp>
+          <p:nvCxnSpPr>
+            <p:cNvPr id="5" name="Straight Connector 4">
+              <a:extLst>
+                <a:ext uri="{FF2B5EF4-FFF2-40B4-BE49-F238E27FC236}">
+                  <a16:creationId xmlns:a16="http://schemas.microsoft.com/office/drawing/2014/main" id="{A8BE4EF8-406C-4035-940C-AB752B29BA18}"/>
+                </a:ext>
+              </a:extLst>
+            </p:cNvPr>
+            <p:cNvCxnSpPr/>
+            <p:nvPr/>
+          </p:nvCxnSpPr>
+          <p:spPr>
+            <a:xfrm>
+              <a:off x="99755" y="955963"/>
+              <a:ext cx="11953701" cy="0"/>
+            </a:xfrm>
+            <a:prstGeom prst="line">
+              <a:avLst/>
+            </a:prstGeom>
+            <a:ln w="19050">
+              <a:solidFill>
+                <a:srgbClr val="0072C6"/>
+              </a:solidFill>
+            </a:ln>
+          </p:spPr>
+          <p:style>
+            <a:lnRef idx="1">
+              <a:schemeClr val="accent1"/>
+            </a:lnRef>
+            <a:fillRef idx="0">
+              <a:schemeClr val="accent1"/>
+            </a:fillRef>
+            <a:effectRef idx="0">
+              <a:schemeClr val="accent1"/>
+            </a:effectRef>
+            <a:fontRef idx="minor">
+              <a:schemeClr val="tx1"/>
+            </a:fontRef>
+          </p:style>
+        </p:cxnSp>
+        <p:sp>
+          <p:nvSpPr>
+            <p:cNvPr id="8" name="TextBox 7">
+              <a:extLst>
+                <a:ext uri="{FF2B5EF4-FFF2-40B4-BE49-F238E27FC236}">
+                  <a16:creationId xmlns:a16="http://schemas.microsoft.com/office/drawing/2014/main" id="{C61B684E-FDA7-4625-9CC3-79C17CC59ED7}"/>
+                </a:ext>
+              </a:extLst>
+            </p:cNvPr>
+            <p:cNvSpPr txBox="1"/>
+            <p:nvPr/>
+          </p:nvSpPr>
+          <p:spPr>
+            <a:xfrm>
+              <a:off x="4372494" y="180818"/>
+              <a:ext cx="2686392" cy="369332"/>
+            </a:xfrm>
+            <a:prstGeom prst="rect">
+              <a:avLst/>
+            </a:prstGeom>
+            <a:noFill/>
+          </p:spPr>
+          <p:txBody>
+            <a:bodyPr wrap="square" rtlCol="0">
+              <a:spAutoFit/>
+            </a:bodyPr>
+            <a:lstStyle/>
+            <a:p>
+              <a:pPr marL="0" marR="0" lvl="0" indent="0" algn="l" defTabSz="914400" rtl="0" eaLnBrk="1" fontAlgn="auto" latinLnBrk="0" hangingPunct="1">
+                <a:lnSpc>
+                  <a:spcPct val="100000"/>
+                </a:lnSpc>
+                <a:spcBef>
+                  <a:spcPts val="0"/>
+                </a:spcBef>
+                <a:spcAft>
+                  <a:spcPts val="0"/>
+                </a:spcAft>
+                <a:buClrTx/>
+                <a:buSzTx/>
+                <a:buFontTx/>
+                <a:buNone/>
+                <a:tabLst/>
+                <a:defRPr/>
+              </a:pPr>
+              <a:r>
+                <a:rPr kumimoji="0" lang="en-GB" sz="1800" b="0" i="0" u="none" strike="noStrike" kern="1200" cap="none" spc="0" normalizeH="0" baseline="0" noProof="0" dirty="0">
+                  <a:ln>
+                    <a:noFill/>
+                  </a:ln>
+                  <a:solidFill>
+                    <a:prstClr val="black"/>
+                  </a:solidFill>
+                  <a:effectLst/>
+                  <a:uLnTx/>
+                  <a:uFillTx/>
+                  <a:latin typeface="Calibri" panose="020F0502020204030204"/>
+                  <a:ea typeface="+mn-ea"/>
+                  <a:cs typeface="+mn-cs"/>
+                </a:rPr>
+                <a:t>Azure Identity Services</a:t>
+              </a:r>
+            </a:p>
+          </p:txBody>
+        </p:sp>
+        <p:sp>
+          <p:nvSpPr>
+            <p:cNvPr id="9" name="TextBox 8">
+              <a:extLst>
+                <a:ext uri="{FF2B5EF4-FFF2-40B4-BE49-F238E27FC236}">
+                  <a16:creationId xmlns:a16="http://schemas.microsoft.com/office/drawing/2014/main" id="{F6943DFB-F258-4603-B2D8-7E2958123510}"/>
+                </a:ext>
+              </a:extLst>
+            </p:cNvPr>
+            <p:cNvSpPr txBox="1"/>
+            <p:nvPr/>
+          </p:nvSpPr>
+          <p:spPr>
+            <a:xfrm>
+              <a:off x="7197436" y="190641"/>
+              <a:ext cx="2155764" cy="369332"/>
+            </a:xfrm>
+            <a:prstGeom prst="rect">
+              <a:avLst/>
+            </a:prstGeom>
+            <a:noFill/>
+          </p:spPr>
+          <p:txBody>
+            <a:bodyPr wrap="square" rtlCol="0">
+              <a:spAutoFit/>
+            </a:bodyPr>
+            <a:lstStyle/>
+            <a:p>
+              <a:pPr marL="0" marR="0" lvl="0" indent="0" algn="l" defTabSz="914400" rtl="0" eaLnBrk="1" fontAlgn="auto" latinLnBrk="0" hangingPunct="1">
+                <a:lnSpc>
+                  <a:spcPct val="100000"/>
+                </a:lnSpc>
+                <a:spcBef>
+                  <a:spcPts val="0"/>
+                </a:spcBef>
+                <a:spcAft>
+                  <a:spcPts val="0"/>
+                </a:spcAft>
+                <a:buClrTx/>
+                <a:buSzTx/>
+                <a:buFontTx/>
+                <a:buNone/>
+                <a:tabLst/>
+                <a:defRPr/>
+              </a:pPr>
+              <a:r>
+                <a:rPr kumimoji="0" lang="en-GB" sz="1800" b="0" i="0" u="none" strike="noStrike" kern="1200" cap="none" spc="0" normalizeH="0" baseline="0" noProof="0" dirty="0">
+                  <a:ln>
+                    <a:noFill/>
+                  </a:ln>
+                  <a:solidFill>
+                    <a:prstClr val="black"/>
+                  </a:solidFill>
+                  <a:effectLst/>
+                  <a:uLnTx/>
+                  <a:uFillTx/>
+                  <a:latin typeface="Calibri" panose="020F0502020204030204"/>
+                  <a:ea typeface="+mn-ea"/>
+                  <a:cs typeface="+mn-cs"/>
+                </a:rPr>
+                <a:t>Section: 10.43</a:t>
+              </a:r>
+            </a:p>
+          </p:txBody>
+        </p:sp>
+        <p:sp>
+          <p:nvSpPr>
+            <p:cNvPr id="10" name="TextBox 9">
+              <a:extLst>
+                <a:ext uri="{FF2B5EF4-FFF2-40B4-BE49-F238E27FC236}">
+                  <a16:creationId xmlns:a16="http://schemas.microsoft.com/office/drawing/2014/main" id="{4E568F0D-7E90-4A0C-8070-6C806D992954}"/>
+                </a:ext>
+              </a:extLst>
+            </p:cNvPr>
+            <p:cNvSpPr txBox="1"/>
+            <p:nvPr/>
+          </p:nvSpPr>
+          <p:spPr>
+            <a:xfrm>
+              <a:off x="9534699" y="180818"/>
+              <a:ext cx="2155764" cy="369332"/>
+            </a:xfrm>
+            <a:prstGeom prst="rect">
+              <a:avLst/>
+            </a:prstGeom>
+            <a:noFill/>
+          </p:spPr>
+          <p:txBody>
+            <a:bodyPr wrap="square" rtlCol="0">
+              <a:spAutoFit/>
+            </a:bodyPr>
+            <a:lstStyle/>
+            <a:p>
+              <a:pPr marL="0" marR="0" lvl="0" indent="0" algn="l" defTabSz="914400" rtl="0" eaLnBrk="1" fontAlgn="auto" latinLnBrk="0" hangingPunct="1">
+                <a:lnSpc>
+                  <a:spcPct val="100000"/>
+                </a:lnSpc>
+                <a:spcBef>
+                  <a:spcPts val="0"/>
+                </a:spcBef>
+                <a:spcAft>
+                  <a:spcPts val="0"/>
+                </a:spcAft>
+                <a:buClrTx/>
+                <a:buSzTx/>
+                <a:buFontTx/>
+                <a:buNone/>
+                <a:tabLst/>
+                <a:defRPr/>
+              </a:pPr>
+              <a:r>
+                <a:rPr kumimoji="0" lang="en-GB" sz="1800" b="0" i="0" u="none" strike="noStrike" kern="1200" cap="none" spc="0" normalizeH="0" baseline="0" noProof="0" dirty="0">
+                  <a:ln>
+                    <a:noFill/>
+                  </a:ln>
+                  <a:solidFill>
+                    <a:prstClr val="black"/>
+                  </a:solidFill>
+                  <a:effectLst/>
+                  <a:uLnTx/>
+                  <a:uFillTx/>
+                  <a:latin typeface="Calibri" panose="020F0502020204030204"/>
+                  <a:ea typeface="+mn-ea"/>
+                  <a:cs typeface="+mn-cs"/>
+                </a:rPr>
+                <a:t>Date: </a:t>
+              </a:r>
+              <a:r>
+                <a:rPr lang="en-GB" dirty="0">
+                  <a:solidFill>
+                    <a:prstClr val="black"/>
+                  </a:solidFill>
+                  <a:latin typeface="Calibri" panose="020F0502020204030204"/>
+                </a:rPr>
+                <a:t>01</a:t>
+              </a:r>
+              <a:r>
+                <a:rPr kumimoji="0" lang="en-GB" sz="1800" b="0" i="0" u="none" strike="noStrike" kern="1200" cap="none" spc="0" normalizeH="0" baseline="0" noProof="0" dirty="0">
+                  <a:ln>
+                    <a:noFill/>
+                  </a:ln>
+                  <a:solidFill>
+                    <a:prstClr val="black"/>
+                  </a:solidFill>
+                  <a:effectLst/>
+                  <a:uLnTx/>
+                  <a:uFillTx/>
+                  <a:latin typeface="Calibri" panose="020F0502020204030204"/>
+                  <a:ea typeface="+mn-ea"/>
+                  <a:cs typeface="+mn-cs"/>
+                </a:rPr>
+                <a:t>/03/22 </a:t>
+              </a:r>
+            </a:p>
+          </p:txBody>
+        </p:sp>
+        <p:cxnSp>
+          <p:nvCxnSpPr>
+            <p:cNvPr id="11" name="Straight Connector 10">
+              <a:extLst>
+                <a:ext uri="{FF2B5EF4-FFF2-40B4-BE49-F238E27FC236}">
+                  <a16:creationId xmlns:a16="http://schemas.microsoft.com/office/drawing/2014/main" id="{F70ABCF3-BE60-426F-8C8C-059C854869C6}"/>
+                </a:ext>
+              </a:extLst>
+            </p:cNvPr>
+            <p:cNvCxnSpPr>
+              <a:cxnSpLocks/>
+            </p:cNvCxnSpPr>
+            <p:nvPr/>
+          </p:nvCxnSpPr>
+          <p:spPr>
+            <a:xfrm flipV="1">
+              <a:off x="4267202" y="93505"/>
+              <a:ext cx="1" cy="754394"/>
+            </a:xfrm>
+            <a:prstGeom prst="line">
+              <a:avLst/>
+            </a:prstGeom>
+            <a:ln w="19050">
+              <a:solidFill>
+                <a:srgbClr val="0072C6"/>
+              </a:solidFill>
+            </a:ln>
+          </p:spPr>
+          <p:style>
+            <a:lnRef idx="1">
+              <a:schemeClr val="accent1"/>
+            </a:lnRef>
+            <a:fillRef idx="0">
+              <a:schemeClr val="accent1"/>
+            </a:fillRef>
+            <a:effectRef idx="0">
+              <a:schemeClr val="accent1"/>
+            </a:effectRef>
+            <a:fontRef idx="minor">
+              <a:schemeClr val="tx1"/>
+            </a:fontRef>
+          </p:style>
+        </p:cxnSp>
+        <p:cxnSp>
+          <p:nvCxnSpPr>
+            <p:cNvPr id="15" name="Straight Connector 14">
+              <a:extLst>
+                <a:ext uri="{FF2B5EF4-FFF2-40B4-BE49-F238E27FC236}">
+                  <a16:creationId xmlns:a16="http://schemas.microsoft.com/office/drawing/2014/main" id="{D7F750D7-69E5-4FC3-AFB5-134C7587DE8B}"/>
+                </a:ext>
+              </a:extLst>
+            </p:cNvPr>
+            <p:cNvCxnSpPr>
+              <a:cxnSpLocks/>
+            </p:cNvCxnSpPr>
+            <p:nvPr/>
+          </p:nvCxnSpPr>
+          <p:spPr>
+            <a:xfrm flipV="1">
+              <a:off x="7154489" y="88317"/>
+              <a:ext cx="1" cy="754394"/>
+            </a:xfrm>
+            <a:prstGeom prst="line">
+              <a:avLst/>
+            </a:prstGeom>
+            <a:ln w="19050">
+              <a:solidFill>
+                <a:srgbClr val="0072C6"/>
+              </a:solidFill>
+            </a:ln>
+          </p:spPr>
+          <p:style>
+            <a:lnRef idx="1">
+              <a:schemeClr val="accent1"/>
+            </a:lnRef>
+            <a:fillRef idx="0">
+              <a:schemeClr val="accent1"/>
+            </a:fillRef>
+            <a:effectRef idx="0">
+              <a:schemeClr val="accent1"/>
+            </a:effectRef>
+            <a:fontRef idx="minor">
+              <a:schemeClr val="tx1"/>
+            </a:fontRef>
+          </p:style>
+        </p:cxnSp>
+        <p:cxnSp>
+          <p:nvCxnSpPr>
+            <p:cNvPr id="16" name="Straight Connector 15">
+              <a:extLst>
+                <a:ext uri="{FF2B5EF4-FFF2-40B4-BE49-F238E27FC236}">
+                  <a16:creationId xmlns:a16="http://schemas.microsoft.com/office/drawing/2014/main" id="{90F03633-4CAB-4B57-BF94-CF91E87AB7AE}"/>
+                </a:ext>
+              </a:extLst>
+            </p:cNvPr>
+            <p:cNvCxnSpPr>
+              <a:cxnSpLocks/>
+            </p:cNvCxnSpPr>
+            <p:nvPr/>
+          </p:nvCxnSpPr>
+          <p:spPr>
+            <a:xfrm flipV="1">
+              <a:off x="9491750" y="83129"/>
+              <a:ext cx="1" cy="754394"/>
+            </a:xfrm>
+            <a:prstGeom prst="line">
+              <a:avLst/>
+            </a:prstGeom>
+            <a:ln w="19050">
+              <a:solidFill>
+                <a:srgbClr val="0072C6"/>
+              </a:solidFill>
+            </a:ln>
+          </p:spPr>
+          <p:style>
+            <a:lnRef idx="1">
+              <a:schemeClr val="accent1"/>
+            </a:lnRef>
+            <a:fillRef idx="0">
+              <a:schemeClr val="accent1"/>
+            </a:fillRef>
+            <a:effectRef idx="0">
+              <a:schemeClr val="accent1"/>
+            </a:effectRef>
+            <a:fontRef idx="minor">
+              <a:schemeClr val="tx1"/>
+            </a:fontRef>
+          </p:style>
+        </p:cxnSp>
+      </p:grpSp>
+      <p:pic>
+        <p:nvPicPr>
+          <p:cNvPr id="20" name="Picture 2">
+            <a:extLst>
+              <a:ext uri="{FF2B5EF4-FFF2-40B4-BE49-F238E27FC236}">
+                <a16:creationId xmlns:a16="http://schemas.microsoft.com/office/drawing/2014/main" id="{775211BE-DA3A-41DA-8578-4E52F07B6AB9}"/>
+              </a:ext>
+            </a:extLst>
+          </p:cNvPr>
+          <p:cNvPicPr>
+            <a:picLocks noChangeAspect="1" noChangeArrowheads="1"/>
+          </p:cNvPicPr>
+          <p:nvPr/>
+        </p:nvPicPr>
+        <p:blipFill>
+          <a:blip r:embed="rId2">
+            <a:extLst>
+              <a:ext uri="{28A0092B-C50C-407E-A947-70E740481C1C}">
+                <a14:useLocalDpi xmlns:a14="http://schemas.microsoft.com/office/drawing/2010/main" val="0"/>
+              </a:ext>
+            </a:extLst>
+          </a:blip>
+          <a:srcRect/>
+          <a:stretch>
+            <a:fillRect/>
+          </a:stretch>
+        </p:blipFill>
+        <p:spPr bwMode="auto">
+          <a:xfrm>
+            <a:off x="144770" y="111976"/>
+            <a:ext cx="725548" cy="725548"/>
+          </a:xfrm>
+          <a:prstGeom prst="rect">
+            <a:avLst/>
+          </a:prstGeom>
+          <a:noFill/>
+          <a:extLst>
+            <a:ext uri="{909E8E84-426E-40DD-AFC4-6F175D3DCCD1}">
+              <a14:hiddenFill xmlns:a14="http://schemas.microsoft.com/office/drawing/2010/main">
+                <a:solidFill>
+                  <a:srgbClr val="FFFFFF"/>
+                </a:solidFill>
+              </a14:hiddenFill>
+            </a:ext>
+          </a:extLst>
+        </p:spPr>
+      </p:pic>
+      <p:sp>
+        <p:nvSpPr>
+          <p:cNvPr id="21" name="TextBox 20">
+            <a:extLst>
+              <a:ext uri="{FF2B5EF4-FFF2-40B4-BE49-F238E27FC236}">
+                <a16:creationId xmlns:a16="http://schemas.microsoft.com/office/drawing/2014/main" id="{30404CBF-C3F9-43E0-81FA-E9D4D01BC004}"/>
+              </a:ext>
+            </a:extLst>
+          </p:cNvPr>
+          <p:cNvSpPr txBox="1"/>
+          <p:nvPr/>
+        </p:nvSpPr>
+        <p:spPr>
+          <a:xfrm>
+            <a:off x="914402" y="191193"/>
+            <a:ext cx="3483032" cy="646331"/>
+          </a:xfrm>
+          <a:prstGeom prst="rect">
+            <a:avLst/>
+          </a:prstGeom>
+          <a:noFill/>
+        </p:spPr>
+        <p:txBody>
+          <a:bodyPr wrap="square" rtlCol="0">
+            <a:spAutoFit/>
+          </a:bodyPr>
+          <a:lstStyle/>
+          <a:p>
+            <a:pPr marL="0" marR="0" lvl="0" indent="0" algn="l" defTabSz="914400" rtl="0" eaLnBrk="1" fontAlgn="auto" latinLnBrk="0" hangingPunct="1">
+              <a:lnSpc>
+                <a:spcPct val="100000"/>
+              </a:lnSpc>
+              <a:spcBef>
+                <a:spcPts val="0"/>
+              </a:spcBef>
+              <a:spcAft>
+                <a:spcPts val="0"/>
+              </a:spcAft>
+              <a:buClrTx/>
+              <a:buSzTx/>
+              <a:buFontTx/>
+              <a:buNone/>
+              <a:tabLst/>
+              <a:defRPr/>
+            </a:pPr>
+            <a:r>
+              <a:rPr kumimoji="0" lang="en-GB" sz="1800" b="0" i="0" u="none" strike="noStrike" kern="1200" cap="none" spc="0" normalizeH="0" baseline="0" noProof="0" dirty="0">
+                <a:ln>
+                  <a:noFill/>
+                </a:ln>
+                <a:solidFill>
+                  <a:prstClr val="black"/>
+                </a:solidFill>
+                <a:effectLst/>
+                <a:uLnTx/>
+                <a:uFillTx/>
+                <a:latin typeface="Calibri" panose="020F0502020204030204"/>
+                <a:ea typeface="+mn-ea"/>
+                <a:cs typeface="+mn-cs"/>
+              </a:rPr>
+              <a:t>AZ-900 Microsoft Azure Fundamentals</a:t>
+            </a:r>
+          </a:p>
+        </p:txBody>
+      </p:sp>
+      <p:sp>
+        <p:nvSpPr>
+          <p:cNvPr id="12" name="TextBox 11">
+            <a:extLst>
+              <a:ext uri="{FF2B5EF4-FFF2-40B4-BE49-F238E27FC236}">
+                <a16:creationId xmlns:a16="http://schemas.microsoft.com/office/drawing/2014/main" id="{5596F3BE-9357-4855-866B-53B6C29BD18A}"/>
+              </a:ext>
+            </a:extLst>
+          </p:cNvPr>
+          <p:cNvSpPr txBox="1"/>
+          <p:nvPr/>
+        </p:nvSpPr>
+        <p:spPr>
+          <a:xfrm>
+            <a:off x="296357" y="1584103"/>
+            <a:ext cx="11494590" cy="2731773"/>
+          </a:xfrm>
+          <a:prstGeom prst="rect">
+            <a:avLst/>
+          </a:prstGeom>
+          <a:noFill/>
+        </p:spPr>
+        <p:txBody>
+          <a:bodyPr wrap="square" rtlCol="0">
+            <a:spAutoFit/>
+          </a:bodyPr>
+          <a:lstStyle/>
+          <a:p>
+            <a:pPr>
+              <a:lnSpc>
+                <a:spcPct val="120000"/>
+              </a:lnSpc>
+            </a:pPr>
+            <a:r>
+              <a:rPr lang="en-GB" sz="1600" dirty="0"/>
+              <a:t>Identity is a very important in cloud computing, its all about how you identify who people are and what access privileges they have to applications and to Azure. Applications also have their own identity, because sometimes an application needs to run like it’s a person controlling something, it may need to access data from a certain location, just like a person may want to do that. So the identity of a person or application and what permissions they have is very important.</a:t>
+            </a:r>
+          </a:p>
+          <a:p>
+            <a:pPr marL="285750" indent="-285750">
+              <a:lnSpc>
+                <a:spcPct val="120000"/>
+              </a:lnSpc>
+              <a:buFontTx/>
+              <a:buChar char="-"/>
+            </a:pPr>
+            <a:r>
+              <a:rPr lang="en-GB" sz="1600" dirty="0"/>
+              <a:t>Usually a password, key or certificate is required to grant access.</a:t>
+            </a:r>
+          </a:p>
+          <a:p>
+            <a:pPr marL="285750" indent="-285750">
+              <a:lnSpc>
+                <a:spcPct val="120000"/>
+              </a:lnSpc>
+              <a:buFontTx/>
+              <a:buChar char="-"/>
+            </a:pPr>
+            <a:endParaRPr lang="en-GB" sz="1600" dirty="0"/>
+          </a:p>
+          <a:p>
+            <a:pPr>
+              <a:lnSpc>
+                <a:spcPct val="120000"/>
+              </a:lnSpc>
+            </a:pPr>
+            <a:endParaRPr lang="en-GB" sz="1600" dirty="0"/>
+          </a:p>
+          <a:p>
+            <a:pPr>
+              <a:lnSpc>
+                <a:spcPct val="120000"/>
+              </a:lnSpc>
+            </a:pPr>
+            <a:endParaRPr lang="en-GB" sz="1600" dirty="0"/>
+          </a:p>
+          <a:p>
+            <a:pPr marL="285750" indent="-285750">
+              <a:lnSpc>
+                <a:spcPct val="120000"/>
+              </a:lnSpc>
+              <a:buFontTx/>
+              <a:buChar char="-"/>
+            </a:pPr>
+            <a:endParaRPr lang="en-GB" sz="1600" dirty="0"/>
+          </a:p>
+        </p:txBody>
+      </p:sp>
+      <p:sp>
+        <p:nvSpPr>
+          <p:cNvPr id="19" name="TextBox 18">
+            <a:extLst>
+              <a:ext uri="{FF2B5EF4-FFF2-40B4-BE49-F238E27FC236}">
+                <a16:creationId xmlns:a16="http://schemas.microsoft.com/office/drawing/2014/main" id="{D5E13F83-83ED-4309-86E5-511760953432}"/>
+              </a:ext>
+            </a:extLst>
+          </p:cNvPr>
+          <p:cNvSpPr txBox="1"/>
+          <p:nvPr/>
+        </p:nvSpPr>
+        <p:spPr>
+          <a:xfrm>
+            <a:off x="276015" y="1084778"/>
+            <a:ext cx="11639970" cy="402546"/>
+          </a:xfrm>
+          <a:prstGeom prst="rect">
+            <a:avLst/>
+          </a:prstGeom>
+          <a:noFill/>
+        </p:spPr>
+        <p:txBody>
+          <a:bodyPr wrap="square" rtlCol="0">
+            <a:spAutoFit/>
+          </a:bodyPr>
+          <a:lstStyle/>
+          <a:p>
+            <a:pPr marL="0" marR="0" lvl="0" indent="0" algn="ctr" defTabSz="914400" rtl="0" eaLnBrk="1" fontAlgn="auto" latinLnBrk="0" hangingPunct="1">
+              <a:lnSpc>
+                <a:spcPct val="120000"/>
+              </a:lnSpc>
+              <a:spcBef>
+                <a:spcPts val="0"/>
+              </a:spcBef>
+              <a:spcAft>
+                <a:spcPts val="0"/>
+              </a:spcAft>
+              <a:buClrTx/>
+              <a:buSzTx/>
+              <a:buFontTx/>
+              <a:buNone/>
+              <a:tabLst/>
+              <a:defRPr/>
+            </a:pPr>
+            <a:r>
+              <a:rPr kumimoji="0" lang="en-GB" sz="1800" b="1" i="0" u="none" strike="noStrike" kern="1200" cap="none" spc="0" normalizeH="0" baseline="0" noProof="0" dirty="0">
+                <a:ln>
+                  <a:noFill/>
+                </a:ln>
+                <a:solidFill>
+                  <a:prstClr val="black"/>
+                </a:solidFill>
+                <a:effectLst/>
+                <a:uLnTx/>
+                <a:uFillTx/>
+                <a:latin typeface="Calibri" panose="020F0502020204030204"/>
+                <a:ea typeface="+mn-ea"/>
+                <a:cs typeface="+mn-cs"/>
+              </a:rPr>
+              <a:t>Describe Identity Governance, Privacy and Compliance Features (20-25%)</a:t>
+            </a:r>
+          </a:p>
+        </p:txBody>
+      </p:sp>
+    </p:spTree>
+    <p:extLst>
+      <p:ext uri="{BB962C8B-B14F-4D97-AF65-F5344CB8AC3E}">
+        <p14:creationId xmlns:p14="http://schemas.microsoft.com/office/powerpoint/2010/main" val="576463024"/>
+      </p:ext>
+    </p:extLst>
+  </p:cSld>
+  <p:clrMapOvr>
+    <a:masterClrMapping/>
+  </p:clrMapOvr>
+</p:sld>
+</file>
+
+<file path=ppt/slides/slide38.xml><?xml version="1.0" encoding="utf-8"?>
 <p:sld xmlns:a="http://schemas.openxmlformats.org/drawingml/2006/main" xmlns:r="http://schemas.openxmlformats.org/officeDocument/2006/relationships" xmlns:p="http://schemas.openxmlformats.org/presentationml/2006/main">
   <p:cSld>
     <p:spTree>
@@ -22616,7 +24129,7 @@
 </p:sld>
 </file>
 
-<file path=ppt/slides/slide37.xml><?xml version="1.0" encoding="utf-8"?>
+<file path=ppt/slides/slide39.xml><?xml version="1.0" encoding="utf-8"?>
 <p:sld xmlns:a="http://schemas.openxmlformats.org/drawingml/2006/main" xmlns:r="http://schemas.openxmlformats.org/officeDocument/2006/relationships" xmlns:p="http://schemas.openxmlformats.org/presentationml/2006/main">
   <p:cSld>
     <p:spTree>
@@ -22956,7 +24469,7 @@
 </p:sld>
 </file>
 
-<file path=ppt/slides/slide38.xml><?xml version="1.0" encoding="utf-8"?>
+<file path=ppt/slides/slide4.xml><?xml version="1.0" encoding="utf-8"?>
 <p:sld xmlns:a="http://schemas.openxmlformats.org/drawingml/2006/main" xmlns:r="http://schemas.openxmlformats.org/officeDocument/2006/relationships" xmlns:p="http://schemas.openxmlformats.org/presentationml/2006/main">
   <p:cSld>
     <p:spTree>
@@ -23186,31 +24699,8 @@
                 <a:ea typeface="+mn-ea"/>
                 <a:cs typeface="+mn-cs"/>
               </a:rPr>
-              <a:t>Section </a:t>
-            </a:r>
-            <a:r>
-              <a:rPr lang="en-GB" sz="3200" dirty="0">
-                <a:solidFill>
-                  <a:prstClr val="black"/>
-                </a:solidFill>
-                <a:latin typeface="Calibri" panose="020F0502020204030204"/>
-              </a:rPr>
-              <a:t>13</a:t>
-            </a:r>
-            <a:endParaRPr kumimoji="0" lang="en-GB" sz="3200" i="0" u="none" strike="noStrike" kern="1200" cap="none" spc="0" normalizeH="0" baseline="0" noProof="0" dirty="0">
-              <a:ln>
-                <a:noFill/>
-              </a:ln>
-              <a:solidFill>
-                <a:prstClr val="black"/>
-              </a:solidFill>
-              <a:effectLst/>
-              <a:uLnTx/>
-              <a:uFillTx/>
-              <a:latin typeface="Calibri" panose="020F0502020204030204"/>
-              <a:ea typeface="+mn-ea"/>
-              <a:cs typeface="+mn-cs"/>
-            </a:endParaRPr>
+              <a:t>Section 3</a:t>
+            </a:r>
           </a:p>
           <a:p>
             <a:pPr marL="0" marR="0" lvl="0" indent="0" algn="ctr" defTabSz="914400" rtl="0" eaLnBrk="1" fontAlgn="auto" latinLnBrk="0" hangingPunct="1">
@@ -23278,7 +24768,7 @@
                 <a:ea typeface="+mn-ea"/>
                 <a:cs typeface="+mn-cs"/>
               </a:rPr>
-              <a:t>Managing Azure Costs</a:t>
+              <a:t>Cloud Models and Cloud Types</a:t>
             </a:r>
           </a:p>
         </p:txBody>
@@ -23286,7 +24776,7 @@
     </p:spTree>
     <p:extLst>
       <p:ext uri="{BB962C8B-B14F-4D97-AF65-F5344CB8AC3E}">
-        <p14:creationId xmlns:p14="http://schemas.microsoft.com/office/powerpoint/2010/main" val="508385947"/>
+        <p14:creationId xmlns:p14="http://schemas.microsoft.com/office/powerpoint/2010/main" val="3878292750"/>
       </p:ext>
     </p:extLst>
   </p:cSld>
@@ -23296,7 +24786,7 @@
 </p:sld>
 </file>
 
-<file path=ppt/slides/slide39.xml><?xml version="1.0" encoding="utf-8"?>
+<file path=ppt/slides/slide40.xml><?xml version="1.0" encoding="utf-8"?>
 <p:sld xmlns:a="http://schemas.openxmlformats.org/drawingml/2006/main" xmlns:r="http://schemas.openxmlformats.org/officeDocument/2006/relationships" xmlns:p="http://schemas.openxmlformats.org/presentationml/2006/main">
   <p:cSld>
     <p:spTree>
@@ -23526,8 +25016,31 @@
                 <a:ea typeface="+mn-ea"/>
                 <a:cs typeface="+mn-cs"/>
               </a:rPr>
-              <a:t>Section 14</a:t>
-            </a:r>
+              <a:t>Section </a:t>
+            </a:r>
+            <a:r>
+              <a:rPr lang="en-GB" sz="3200" dirty="0">
+                <a:solidFill>
+                  <a:prstClr val="black"/>
+                </a:solidFill>
+                <a:latin typeface="Calibri" panose="020F0502020204030204"/>
+              </a:rPr>
+              <a:t>13</a:t>
+            </a:r>
+            <a:endParaRPr kumimoji="0" lang="en-GB" sz="3200" i="0" u="none" strike="noStrike" kern="1200" cap="none" spc="0" normalizeH="0" baseline="0" noProof="0" dirty="0">
+              <a:ln>
+                <a:noFill/>
+              </a:ln>
+              <a:solidFill>
+                <a:prstClr val="black"/>
+              </a:solidFill>
+              <a:effectLst/>
+              <a:uLnTx/>
+              <a:uFillTx/>
+              <a:latin typeface="Calibri" panose="020F0502020204030204"/>
+              <a:ea typeface="+mn-ea"/>
+              <a:cs typeface="+mn-cs"/>
+            </a:endParaRPr>
           </a:p>
           <a:p>
             <a:pPr marL="0" marR="0" lvl="0" indent="0" algn="ctr" defTabSz="914400" rtl="0" eaLnBrk="1" fontAlgn="auto" latinLnBrk="0" hangingPunct="1">
@@ -23595,7 +25108,7 @@
                 <a:ea typeface="+mn-ea"/>
                 <a:cs typeface="+mn-cs"/>
               </a:rPr>
-              <a:t>Azure Service Level Agreement</a:t>
+              <a:t>Managing Azure Costs</a:t>
             </a:r>
           </a:p>
         </p:txBody>
@@ -23603,7 +25116,7 @@
     </p:spTree>
     <p:extLst>
       <p:ext uri="{BB962C8B-B14F-4D97-AF65-F5344CB8AC3E}">
-        <p14:creationId xmlns:p14="http://schemas.microsoft.com/office/powerpoint/2010/main" val="1136276068"/>
+        <p14:creationId xmlns:p14="http://schemas.microsoft.com/office/powerpoint/2010/main" val="508385947"/>
       </p:ext>
     </p:extLst>
   </p:cSld>
@@ -23613,7 +25126,7 @@
 </p:sld>
 </file>
 
-<file path=ppt/slides/slide4.xml><?xml version="1.0" encoding="utf-8"?>
+<file path=ppt/slides/slide41.xml><?xml version="1.0" encoding="utf-8"?>
 <p:sld xmlns:a="http://schemas.openxmlformats.org/drawingml/2006/main" xmlns:r="http://schemas.openxmlformats.org/officeDocument/2006/relationships" xmlns:p="http://schemas.openxmlformats.org/presentationml/2006/main">
   <p:cSld>
     <p:spTree>
@@ -23843,7 +25356,7 @@
                 <a:ea typeface="+mn-ea"/>
                 <a:cs typeface="+mn-cs"/>
               </a:rPr>
-              <a:t>Section 3</a:t>
+              <a:t>Section 14</a:t>
             </a:r>
           </a:p>
           <a:p>
@@ -23912,7 +25425,7 @@
                 <a:ea typeface="+mn-ea"/>
                 <a:cs typeface="+mn-cs"/>
               </a:rPr>
-              <a:t>Cloud Models and Cloud Types</a:t>
+              <a:t>Azure Service Level Agreement</a:t>
             </a:r>
           </a:p>
         </p:txBody>
@@ -23920,7 +25433,7 @@
     </p:spTree>
     <p:extLst>
       <p:ext uri="{BB962C8B-B14F-4D97-AF65-F5344CB8AC3E}">
-        <p14:creationId xmlns:p14="http://schemas.microsoft.com/office/powerpoint/2010/main" val="3878292750"/>
+        <p14:creationId xmlns:p14="http://schemas.microsoft.com/office/powerpoint/2010/main" val="1136276068"/>
       </p:ext>
     </p:extLst>
   </p:cSld>

</xml_diff>

<commit_message>
AZ Fundamentals Training - Slides Update
</commit_message>
<xml_diff>
--- a/Azure_AZ-900_Fundamentals/MJH_AZ-900_Azure_Fundamentals_Notes.pptx
+++ b/Azure_AZ-900_Fundamentals/MJH_AZ-900_Azure_Fundamentals_Notes.pptx
@@ -46,6 +46,8 @@
     <p:sldId id="300" r:id="rId40"/>
     <p:sldId id="301" r:id="rId41"/>
     <p:sldId id="302" r:id="rId42"/>
+    <p:sldId id="330" r:id="rId43"/>
+    <p:sldId id="331" r:id="rId44"/>
   </p:sldIdLst>
   <p:sldSz cx="12192000" cy="6858000"/>
   <p:notesSz cx="6858000" cy="9144000"/>
@@ -301,7 +303,7 @@
           <a:p>
             <a:fld id="{655AA731-BE5F-44DA-AAEA-300254B29F16}" type="datetimeFigureOut">
               <a:rPr lang="en-GB" smtClean="0"/>
-              <a:t>01/03/2022</a:t>
+              <a:t>16/05/2022</a:t>
             </a:fld>
             <a:endParaRPr lang="en-GB"/>
           </a:p>
@@ -501,7 +503,7 @@
           <a:p>
             <a:fld id="{655AA731-BE5F-44DA-AAEA-300254B29F16}" type="datetimeFigureOut">
               <a:rPr lang="en-GB" smtClean="0"/>
-              <a:t>01/03/2022</a:t>
+              <a:t>16/05/2022</a:t>
             </a:fld>
             <a:endParaRPr lang="en-GB"/>
           </a:p>
@@ -711,7 +713,7 @@
           <a:p>
             <a:fld id="{655AA731-BE5F-44DA-AAEA-300254B29F16}" type="datetimeFigureOut">
               <a:rPr lang="en-GB" smtClean="0"/>
-              <a:t>01/03/2022</a:t>
+              <a:t>16/05/2022</a:t>
             </a:fld>
             <a:endParaRPr lang="en-GB"/>
           </a:p>
@@ -911,7 +913,7 @@
           <a:p>
             <a:fld id="{655AA731-BE5F-44DA-AAEA-300254B29F16}" type="datetimeFigureOut">
               <a:rPr lang="en-GB" smtClean="0"/>
-              <a:t>01/03/2022</a:t>
+              <a:t>16/05/2022</a:t>
             </a:fld>
             <a:endParaRPr lang="en-GB"/>
           </a:p>
@@ -1187,7 +1189,7 @@
           <a:p>
             <a:fld id="{655AA731-BE5F-44DA-AAEA-300254B29F16}" type="datetimeFigureOut">
               <a:rPr lang="en-GB" smtClean="0"/>
-              <a:t>01/03/2022</a:t>
+              <a:t>16/05/2022</a:t>
             </a:fld>
             <a:endParaRPr lang="en-GB"/>
           </a:p>
@@ -1455,7 +1457,7 @@
           <a:p>
             <a:fld id="{655AA731-BE5F-44DA-AAEA-300254B29F16}" type="datetimeFigureOut">
               <a:rPr lang="en-GB" smtClean="0"/>
-              <a:t>01/03/2022</a:t>
+              <a:t>16/05/2022</a:t>
             </a:fld>
             <a:endParaRPr lang="en-GB"/>
           </a:p>
@@ -1870,7 +1872,7 @@
           <a:p>
             <a:fld id="{655AA731-BE5F-44DA-AAEA-300254B29F16}" type="datetimeFigureOut">
               <a:rPr lang="en-GB" smtClean="0"/>
-              <a:t>01/03/2022</a:t>
+              <a:t>16/05/2022</a:t>
             </a:fld>
             <a:endParaRPr lang="en-GB"/>
           </a:p>
@@ -2012,7 +2014,7 @@
           <a:p>
             <a:fld id="{655AA731-BE5F-44DA-AAEA-300254B29F16}" type="datetimeFigureOut">
               <a:rPr lang="en-GB" smtClean="0"/>
-              <a:t>01/03/2022</a:t>
+              <a:t>16/05/2022</a:t>
             </a:fld>
             <a:endParaRPr lang="en-GB"/>
           </a:p>
@@ -2125,7 +2127,7 @@
           <a:p>
             <a:fld id="{655AA731-BE5F-44DA-AAEA-300254B29F16}" type="datetimeFigureOut">
               <a:rPr lang="en-GB" smtClean="0"/>
-              <a:t>01/03/2022</a:t>
+              <a:t>16/05/2022</a:t>
             </a:fld>
             <a:endParaRPr lang="en-GB"/>
           </a:p>
@@ -2438,7 +2440,7 @@
           <a:p>
             <a:fld id="{655AA731-BE5F-44DA-AAEA-300254B29F16}" type="datetimeFigureOut">
               <a:rPr lang="en-GB" smtClean="0"/>
-              <a:t>01/03/2022</a:t>
+              <a:t>16/05/2022</a:t>
             </a:fld>
             <a:endParaRPr lang="en-GB"/>
           </a:p>
@@ -2727,7 +2729,7 @@
           <a:p>
             <a:fld id="{655AA731-BE5F-44DA-AAEA-300254B29F16}" type="datetimeFigureOut">
               <a:rPr lang="en-GB" smtClean="0"/>
-              <a:t>01/03/2022</a:t>
+              <a:t>16/05/2022</a:t>
             </a:fld>
             <a:endParaRPr lang="en-GB"/>
           </a:p>
@@ -2970,7 +2972,7 @@
           <a:p>
             <a:fld id="{655AA731-BE5F-44DA-AAEA-300254B29F16}" type="datetimeFigureOut">
               <a:rPr lang="en-GB" smtClean="0"/>
-              <a:t>01/03/2022</a:t>
+              <a:t>16/05/2022</a:t>
             </a:fld>
             <a:endParaRPr lang="en-GB"/>
           </a:p>
@@ -5042,7 +5044,7 @@
         <p:spPr>
           <a:xfrm>
             <a:off x="327581" y="1143501"/>
-            <a:ext cx="11864419" cy="3322704"/>
+            <a:ext cx="11864419" cy="3618170"/>
           </a:xfrm>
           <a:prstGeom prst="rect">
             <a:avLst/>
@@ -5102,7 +5104,7 @@
             </a:pPr>
             <a:r>
               <a:rPr lang="en-GB" sz="1600" dirty="0"/>
-              <a:t>Its important that the pair is located where there are the same data laws and in a similar location so the latency is low.</a:t>
+              <a:t>Its important that the pair is located where there are the same data laws and in a similar location so the latency is low (typically ~300 miles apart)</a:t>
             </a:r>
           </a:p>
           <a:p>
@@ -5340,8 +5342,8 @@
         </p:nvSpPr>
         <p:spPr>
           <a:xfrm>
-            <a:off x="327581" y="4652026"/>
-            <a:ext cx="7801351" cy="1980863"/>
+            <a:off x="327581" y="4994926"/>
+            <a:ext cx="7801351" cy="1549911"/>
           </a:xfrm>
           <a:prstGeom prst="rect">
             <a:avLst/>
@@ -5389,21 +5391,6 @@
               <a:rPr lang="en-GB" sz="1600" dirty="0"/>
               <a:t>Each availability zone is physically separated. They are separate buildings (but on the same property perhaps) but with their own network, power supply etc. So if there is a power outage, it will likely only effect one availability centre. </a:t>
             </a:r>
-          </a:p>
-          <a:p>
-            <a:pPr>
-              <a:lnSpc>
-                <a:spcPct val="120000"/>
-              </a:lnSpc>
-            </a:pPr>
-            <a:endParaRPr lang="en-GB" sz="1200" dirty="0"/>
-          </a:p>
-          <a:p>
-            <a:pPr>
-              <a:lnSpc>
-                <a:spcPct val="120000"/>
-              </a:lnSpc>
-            </a:pPr>
             <a:endParaRPr lang="en-GB" sz="1100" dirty="0"/>
           </a:p>
         </p:txBody>
@@ -6322,7 +6309,7 @@
             </a:pPr>
             <a:r>
               <a:rPr lang="en-GB" sz="1600" dirty="0"/>
-              <a:t>An example of how a company set this all up is on the left.</a:t>
+              <a:t>An example of how a company set this all up is on the right.</a:t>
             </a:r>
             <a:endParaRPr lang="en-GB" sz="1200" dirty="0"/>
           </a:p>
@@ -6958,7 +6945,7 @@
         <p:spPr>
           <a:xfrm>
             <a:off x="366526" y="1232962"/>
-            <a:ext cx="11470340" cy="958980"/>
+            <a:ext cx="11470340" cy="1549911"/>
           </a:xfrm>
           <a:prstGeom prst="rect">
             <a:avLst/>
@@ -6991,8 +6978,31 @@
             </a:pPr>
             <a:r>
               <a:rPr lang="en-GB" sz="1600" dirty="0"/>
-              <a:t>This is how Azure manages resources behind the scenes.</a:t>
-            </a:r>
+              <a:t>Allows you to use azure PowerShell and other tools to create, update and delete resource and resource groups.</a:t>
+            </a:r>
+          </a:p>
+          <a:p>
+            <a:pPr marL="285750" indent="-285750">
+              <a:lnSpc>
+                <a:spcPct val="120000"/>
+              </a:lnSpc>
+              <a:buFontTx/>
+              <a:buChar char="-"/>
+            </a:pPr>
+            <a:r>
+              <a:rPr lang="en-GB" sz="1600" dirty="0"/>
+              <a:t>ARM template can be used (these are JSON files that can be easily updated). </a:t>
+            </a:r>
+          </a:p>
+          <a:p>
+            <a:pPr marL="285750" indent="-285750">
+              <a:lnSpc>
+                <a:spcPct val="120000"/>
+              </a:lnSpc>
+              <a:buFontTx/>
+              <a:buChar char="-"/>
+            </a:pPr>
+            <a:endParaRPr lang="en-GB" sz="1600" dirty="0"/>
           </a:p>
           <a:p>
             <a:pPr marL="285750" indent="-285750">
@@ -7952,8 +7962,8 @@
         </p:nvSpPr>
         <p:spPr>
           <a:xfrm>
-            <a:off x="366526" y="1232962"/>
-            <a:ext cx="11470340" cy="5390963"/>
+            <a:off x="220122" y="1088443"/>
+            <a:ext cx="11833333" cy="5686428"/>
           </a:xfrm>
           <a:prstGeom prst="rect">
             <a:avLst/>
@@ -8107,7 +8117,7 @@
             </a:pPr>
             <a:r>
               <a:rPr lang="en-GB" sz="1600" dirty="0"/>
-              <a:t>Containers contain everything the app needs to run in a ‘container or docker image’. Azure Container Instance runs on a single instance and is quick to deploy. Azure Kubernetes Service runs on a cluster of servers. You can run a container in a virtual machine.</a:t>
+              <a:t>Containers contain everything the app needs to run in a ‘container or docker image’. Azure Container Instance runs on a single instance and is quick to deploy. Azure Kubernetes Service runs on a cluster of servers (orchestration tool that is used to control running of container instances). You can run a container in a virtual machine.</a:t>
             </a:r>
           </a:p>
           <a:p>
@@ -11658,8 +11668,8 @@
         </p:nvSpPr>
         <p:spPr>
           <a:xfrm>
-            <a:off x="276015" y="1914040"/>
-            <a:ext cx="11501426" cy="4470134"/>
+            <a:off x="207279" y="1885464"/>
+            <a:ext cx="11777441" cy="4637552"/>
           </a:xfrm>
           <a:prstGeom prst="rect">
             <a:avLst/>
@@ -11678,7 +11688,7 @@
               </a:lnSpc>
             </a:pPr>
             <a:r>
-              <a:rPr lang="en-GB" sz="1400" b="1" dirty="0"/>
+              <a:rPr lang="en-GB" sz="1300" b="1" dirty="0"/>
               <a:t>Cost Saving</a:t>
             </a:r>
           </a:p>
@@ -11691,7 +11701,7 @@
               <a:buChar char="-"/>
             </a:pPr>
             <a:r>
-              <a:rPr lang="en-GB" sz="1400" dirty="0"/>
+              <a:rPr lang="en-GB" sz="1300" dirty="0"/>
               <a:t>Generally cloud companies can manage a server much cheaper than you can. More efficient air-conditioning, bulk buying hardware (economies of scale)</a:t>
             </a:r>
           </a:p>
@@ -11704,7 +11714,7 @@
               <a:buChar char="-"/>
             </a:pPr>
             <a:r>
-              <a:rPr lang="en-GB" sz="1400" dirty="0"/>
+              <a:rPr lang="en-GB" sz="1300" dirty="0"/>
               <a:t>Don’t have to overprovision resources like you do in your own environment. This is auto scaled, you pay for what you use.</a:t>
             </a:r>
           </a:p>
@@ -11717,35 +11727,35 @@
               <a:buChar char="-"/>
             </a:pPr>
             <a:r>
-              <a:rPr lang="en-GB" sz="1400" dirty="0" err="1"/>
+              <a:rPr lang="en-GB" sz="1300" dirty="0" err="1"/>
               <a:t>CapEx</a:t>
             </a:r>
             <a:r>
-              <a:rPr lang="en-GB" sz="1400" dirty="0"/>
+              <a:rPr lang="en-GB" sz="1300" dirty="0"/>
               <a:t> (capital expenditure) is money invested in assets like computers that return investment over time. </a:t>
             </a:r>
             <a:r>
-              <a:rPr lang="en-GB" sz="1400" dirty="0" err="1"/>
+              <a:rPr lang="en-GB" sz="1300" dirty="0" err="1"/>
               <a:t>OpEx</a:t>
             </a:r>
             <a:r>
-              <a:rPr lang="en-GB" sz="1400" dirty="0"/>
+              <a:rPr lang="en-GB" sz="1300" dirty="0"/>
               <a:t> (operational expenditure) is  money spent on day to day operating expenditure. All of a sudden instead of having to invest loads of money in hardware in one go, we now don’t need any </a:t>
             </a:r>
             <a:r>
-              <a:rPr lang="en-GB" sz="1400" dirty="0" err="1"/>
+              <a:rPr lang="en-GB" sz="1300" dirty="0" err="1"/>
               <a:t>CapEx</a:t>
             </a:r>
             <a:r>
-              <a:rPr lang="en-GB" sz="1400" dirty="0"/>
+              <a:rPr lang="en-GB" sz="1300" dirty="0"/>
               <a:t> on servers, paying for the cloud is entirely </a:t>
             </a:r>
             <a:r>
-              <a:rPr lang="en-GB" sz="1400" dirty="0" err="1"/>
+              <a:rPr lang="en-GB" sz="1300" dirty="0" err="1"/>
               <a:t>OpEx</a:t>
             </a:r>
             <a:r>
-              <a:rPr lang="en-GB" sz="1400" dirty="0"/>
+              <a:rPr lang="en-GB" sz="1300" dirty="0"/>
               <a:t> and this is better for tax purposes, to have only a steady amount of money going out.</a:t>
             </a:r>
           </a:p>
@@ -11757,7 +11767,7 @@
               <a:buFontTx/>
               <a:buChar char="-"/>
             </a:pPr>
-            <a:endParaRPr lang="en-GB" sz="1400" dirty="0"/>
+            <a:endParaRPr lang="en-GB" sz="1300" dirty="0"/>
           </a:p>
           <a:p>
             <a:pPr>
@@ -11766,11 +11776,11 @@
               </a:lnSpc>
             </a:pPr>
             <a:r>
-              <a:rPr lang="en-GB" sz="1400" b="1" dirty="0"/>
+              <a:rPr lang="en-GB" sz="1300" b="1" dirty="0"/>
               <a:t>Agility </a:t>
             </a:r>
             <a:r>
-              <a:rPr lang="en-GB" sz="1400" dirty="0"/>
+              <a:rPr lang="en-GB" sz="1300" dirty="0"/>
               <a:t>(respond to marketplace, to demand etc.)</a:t>
             </a:r>
           </a:p>
@@ -11783,7 +11793,7 @@
               <a:buChar char="-"/>
             </a:pPr>
             <a:r>
-              <a:rPr lang="en-GB" sz="1400" dirty="0"/>
+              <a:rPr lang="en-GB" sz="1300" dirty="0"/>
               <a:t>Agility is the ability to change rapidly based on changes to the market or environment (say you have a critical period of the day, for an hour then you can add more servers.)</a:t>
             </a:r>
           </a:p>
@@ -11796,7 +11806,7 @@
               <a:buChar char="-"/>
             </a:pPr>
             <a:r>
-              <a:rPr lang="en-GB" sz="1400" dirty="0"/>
+              <a:rPr lang="en-GB" sz="1300" dirty="0"/>
               <a:t>Elasticity is the ability of a system to automatically grow and shrink based on application demand. </a:t>
             </a:r>
           </a:p>
@@ -11806,7 +11816,7 @@
                 <a:spcPct val="120000"/>
               </a:lnSpc>
             </a:pPr>
-            <a:endParaRPr lang="en-GB" sz="1400" dirty="0"/>
+            <a:endParaRPr lang="en-GB" sz="1300" dirty="0"/>
           </a:p>
           <a:p>
             <a:pPr>
@@ -11815,11 +11825,11 @@
               </a:lnSpc>
             </a:pPr>
             <a:r>
-              <a:rPr lang="en-GB" sz="1400" b="1" dirty="0"/>
+              <a:rPr lang="en-GB" sz="1300" b="1" dirty="0"/>
               <a:t>Availability</a:t>
             </a:r>
             <a:r>
-              <a:rPr lang="en-GB" sz="1400" dirty="0"/>
+              <a:rPr lang="en-GB" sz="1300" dirty="0"/>
               <a:t> (often have duplicate data on the cloud so if a storm hits one centre, the application can still function as normal)</a:t>
             </a:r>
           </a:p>
@@ -11832,7 +11842,7 @@
               <a:buChar char="-"/>
             </a:pPr>
             <a:r>
-              <a:rPr lang="en-GB" sz="1400" dirty="0"/>
+              <a:rPr lang="en-GB" sz="1300" dirty="0"/>
               <a:t>Generally achievable to get four nines availability (99.99%). That equates to around 4 minutes a month of downtime. Importance of this depends on the use case of the application. Maybe its internal and only being used 9-5, that will have lower importance that say Facebook.</a:t>
             </a:r>
           </a:p>
@@ -11845,8 +11855,45 @@
               <a:buChar char="-"/>
             </a:pPr>
             <a:r>
-              <a:rPr lang="en-GB" sz="1400" dirty="0"/>
+              <a:rPr lang="en-GB" sz="1300" dirty="0"/>
               <a:t>Disaster recover is the ability of a system to recover from failure within a period of time and how much data is lost. Can be done easily and automatically in the cloud.</a:t>
+            </a:r>
+          </a:p>
+          <a:p>
+            <a:pPr>
+              <a:lnSpc>
+                <a:spcPct val="120000"/>
+              </a:lnSpc>
+            </a:pPr>
+            <a:r>
+              <a:rPr lang="en-GB" sz="1300" b="1" dirty="0"/>
+              <a:t>Scalability</a:t>
+            </a:r>
+          </a:p>
+          <a:p>
+            <a:pPr marL="285750" indent="-285750">
+              <a:lnSpc>
+                <a:spcPct val="120000"/>
+              </a:lnSpc>
+              <a:buFontTx/>
+              <a:buChar char="-"/>
+            </a:pPr>
+            <a:r>
+              <a:rPr lang="en-GB" sz="1300" dirty="0"/>
+              <a:t>Scaling out = adding more resource e.g. more VMs. </a:t>
+            </a:r>
+          </a:p>
+          <a:p>
+            <a:pPr marL="285750" indent="-285750">
+              <a:lnSpc>
+                <a:spcPct val="120000"/>
+              </a:lnSpc>
+              <a:buFontTx/>
+              <a:buChar char="-"/>
+            </a:pPr>
+            <a:r>
+              <a:rPr lang="en-GB" sz="1300" dirty="0"/>
+              <a:t>Scaling up = adding more  power to existing resource e.g. more CPU </a:t>
             </a:r>
           </a:p>
         </p:txBody>
@@ -13387,7 +13434,7 @@
             </a:pPr>
             <a:r>
               <a:rPr lang="en-GB" sz="1600" dirty="0"/>
-              <a:t>IoT Central </a:t>
+              <a:t>IoT Central: connect monitor and manage IoT assets at scale.</a:t>
             </a:r>
           </a:p>
           <a:p>
@@ -13479,7 +13526,15 @@
             </a:r>
             <a:r>
               <a:rPr lang="en-GB" sz="1600" dirty="0"/>
-              <a:t> environment, main functionality appears to be using a jupyter notebook.</a:t>
+              <a:t> environment, main functionality appears to be using a jupyter notebook. ML dependencies in here like </a:t>
+            </a:r>
+            <a:r>
+              <a:rPr lang="en-GB" sz="1600" dirty="0" err="1"/>
+              <a:t>tensorflow</a:t>
+            </a:r>
+            <a:r>
+              <a:rPr lang="en-GB" sz="1600" dirty="0"/>
+              <a:t>.</a:t>
             </a:r>
           </a:p>
         </p:txBody>
@@ -14921,7 +14976,7 @@
             </a:pPr>
             <a:r>
               <a:rPr lang="en-GB" sz="1600" dirty="0"/>
-              <a:t>Azure DevOps</a:t>
+              <a:t>Azure DevOps (Kanban boards, pipelines etc.)</a:t>
             </a:r>
           </a:p>
           <a:p>
@@ -14960,7 +15015,7 @@
             </a:pPr>
             <a:r>
               <a:rPr lang="en-GB" sz="1600" dirty="0"/>
-              <a:t>Azure DevTest Labs</a:t>
+              <a:t>Azure DevTest Labs (create environments)</a:t>
             </a:r>
           </a:p>
           <a:p>
@@ -25443,6 +25498,766 @@
 </p:sld>
 </file>
 
+<file path=ppt/slides/slide42.xml><?xml version="1.0" encoding="utf-8"?>
+<p:sld xmlns:a="http://schemas.openxmlformats.org/drawingml/2006/main" xmlns:r="http://schemas.openxmlformats.org/officeDocument/2006/relationships" xmlns:p="http://schemas.openxmlformats.org/presentationml/2006/main">
+  <p:cSld>
+    <p:spTree>
+      <p:nvGrpSpPr>
+        <p:cNvPr id="1" name=""/>
+        <p:cNvGrpSpPr/>
+        <p:nvPr/>
+      </p:nvGrpSpPr>
+      <p:grpSpPr>
+        <a:xfrm>
+          <a:off x="0" y="0"/>
+          <a:ext cx="0" cy="0"/>
+          <a:chOff x="0" y="0"/>
+          <a:chExt cx="0" cy="0"/>
+        </a:xfrm>
+      </p:grpSpPr>
+      <p:pic>
+        <p:nvPicPr>
+          <p:cNvPr id="7" name="Picture 2">
+            <a:extLst>
+              <a:ext uri="{FF2B5EF4-FFF2-40B4-BE49-F238E27FC236}">
+                <a16:creationId xmlns:a16="http://schemas.microsoft.com/office/drawing/2014/main" id="{656D77DE-6845-4DF0-A4E8-FCEE79C806B5}"/>
+              </a:ext>
+            </a:extLst>
+          </p:cNvPr>
+          <p:cNvPicPr>
+            <a:picLocks noChangeAspect="1" noChangeArrowheads="1"/>
+          </p:cNvPicPr>
+          <p:nvPr/>
+        </p:nvPicPr>
+        <p:blipFill>
+          <a:blip r:embed="rId2">
+            <a:extLst>
+              <a:ext uri="{28A0092B-C50C-407E-A947-70E740481C1C}">
+                <a14:useLocalDpi xmlns:a14="http://schemas.microsoft.com/office/drawing/2010/main" val="0"/>
+              </a:ext>
+            </a:extLst>
+          </a:blip>
+          <a:srcRect/>
+          <a:stretch>
+            <a:fillRect/>
+          </a:stretch>
+        </p:blipFill>
+        <p:spPr bwMode="auto">
+          <a:xfrm>
+            <a:off x="144770" y="111976"/>
+            <a:ext cx="725548" cy="725548"/>
+          </a:xfrm>
+          <a:prstGeom prst="rect">
+            <a:avLst/>
+          </a:prstGeom>
+          <a:noFill/>
+          <a:extLst>
+            <a:ext uri="{909E8E84-426E-40DD-AFC4-6F175D3DCCD1}">
+              <a14:hiddenFill xmlns:a14="http://schemas.microsoft.com/office/drawing/2010/main">
+                <a:solidFill>
+                  <a:srgbClr val="FFFFFF"/>
+                </a:solidFill>
+              </a14:hiddenFill>
+            </a:ext>
+          </a:extLst>
+        </p:spPr>
+      </p:pic>
+      <p:cxnSp>
+        <p:nvCxnSpPr>
+          <p:cNvPr id="5" name="Straight Connector 4">
+            <a:extLst>
+              <a:ext uri="{FF2B5EF4-FFF2-40B4-BE49-F238E27FC236}">
+                <a16:creationId xmlns:a16="http://schemas.microsoft.com/office/drawing/2014/main" id="{A8BE4EF8-406C-4035-940C-AB752B29BA18}"/>
+              </a:ext>
+            </a:extLst>
+          </p:cNvPr>
+          <p:cNvCxnSpPr/>
+          <p:nvPr/>
+        </p:nvCxnSpPr>
+        <p:spPr>
+          <a:xfrm>
+            <a:off x="99755" y="955963"/>
+            <a:ext cx="11953701" cy="0"/>
+          </a:xfrm>
+          <a:prstGeom prst="line">
+            <a:avLst/>
+          </a:prstGeom>
+          <a:ln w="19050">
+            <a:solidFill>
+              <a:srgbClr val="0072C6"/>
+            </a:solidFill>
+          </a:ln>
+        </p:spPr>
+        <p:style>
+          <a:lnRef idx="1">
+            <a:schemeClr val="accent1"/>
+          </a:lnRef>
+          <a:fillRef idx="0">
+            <a:schemeClr val="accent1"/>
+          </a:fillRef>
+          <a:effectRef idx="0">
+            <a:schemeClr val="accent1"/>
+          </a:effectRef>
+          <a:fontRef idx="minor">
+            <a:schemeClr val="tx1"/>
+          </a:fontRef>
+        </p:style>
+      </p:cxnSp>
+      <p:sp>
+        <p:nvSpPr>
+          <p:cNvPr id="6" name="TextBox 5">
+            <a:extLst>
+              <a:ext uri="{FF2B5EF4-FFF2-40B4-BE49-F238E27FC236}">
+                <a16:creationId xmlns:a16="http://schemas.microsoft.com/office/drawing/2014/main" id="{4A5E75BC-B6AC-4138-AB81-9DEC0096C5A8}"/>
+              </a:ext>
+            </a:extLst>
+          </p:cNvPr>
+          <p:cNvSpPr txBox="1"/>
+          <p:nvPr/>
+        </p:nvSpPr>
+        <p:spPr>
+          <a:xfrm>
+            <a:off x="914402" y="191193"/>
+            <a:ext cx="3483032" cy="646331"/>
+          </a:xfrm>
+          <a:prstGeom prst="rect">
+            <a:avLst/>
+          </a:prstGeom>
+          <a:noFill/>
+        </p:spPr>
+        <p:txBody>
+          <a:bodyPr wrap="square" rtlCol="0">
+            <a:spAutoFit/>
+          </a:bodyPr>
+          <a:lstStyle/>
+          <a:p>
+            <a:pPr marL="0" marR="0" lvl="0" indent="0" algn="l" defTabSz="914400" rtl="0" eaLnBrk="1" fontAlgn="auto" latinLnBrk="0" hangingPunct="1">
+              <a:lnSpc>
+                <a:spcPct val="100000"/>
+              </a:lnSpc>
+              <a:spcBef>
+                <a:spcPts val="0"/>
+              </a:spcBef>
+              <a:spcAft>
+                <a:spcPts val="0"/>
+              </a:spcAft>
+              <a:buClrTx/>
+              <a:buSzTx/>
+              <a:buFontTx/>
+              <a:buNone/>
+              <a:tabLst/>
+              <a:defRPr/>
+            </a:pPr>
+            <a:r>
+              <a:rPr kumimoji="0" lang="en-GB" sz="1800" b="0" i="0" u="none" strike="noStrike" kern="1200" cap="none" spc="0" normalizeH="0" baseline="0" noProof="0" dirty="0">
+                <a:ln>
+                  <a:noFill/>
+                </a:ln>
+                <a:solidFill>
+                  <a:prstClr val="black"/>
+                </a:solidFill>
+                <a:effectLst/>
+                <a:uLnTx/>
+                <a:uFillTx/>
+                <a:latin typeface="Calibri" panose="020F0502020204030204"/>
+                <a:ea typeface="+mn-ea"/>
+                <a:cs typeface="+mn-cs"/>
+              </a:rPr>
+              <a:t>AZ-900 Microsoft Azure Fundamentals</a:t>
+            </a:r>
+          </a:p>
+        </p:txBody>
+      </p:sp>
+      <p:sp>
+        <p:nvSpPr>
+          <p:cNvPr id="8" name="TextBox 7">
+            <a:extLst>
+              <a:ext uri="{FF2B5EF4-FFF2-40B4-BE49-F238E27FC236}">
+                <a16:creationId xmlns:a16="http://schemas.microsoft.com/office/drawing/2014/main" id="{C61B684E-FDA7-4625-9CC3-79C17CC59ED7}"/>
+              </a:ext>
+            </a:extLst>
+          </p:cNvPr>
+          <p:cNvSpPr txBox="1"/>
+          <p:nvPr/>
+        </p:nvSpPr>
+        <p:spPr>
+          <a:xfrm>
+            <a:off x="320040" y="2479578"/>
+            <a:ext cx="11484864" cy="1569660"/>
+          </a:xfrm>
+          <a:prstGeom prst="rect">
+            <a:avLst/>
+          </a:prstGeom>
+          <a:noFill/>
+        </p:spPr>
+        <p:txBody>
+          <a:bodyPr wrap="square" rtlCol="0">
+            <a:spAutoFit/>
+          </a:bodyPr>
+          <a:lstStyle/>
+          <a:p>
+            <a:pPr marL="0" marR="0" lvl="0" indent="0" algn="ctr" defTabSz="914400" rtl="0" eaLnBrk="1" fontAlgn="auto" latinLnBrk="0" hangingPunct="1">
+              <a:lnSpc>
+                <a:spcPct val="100000"/>
+              </a:lnSpc>
+              <a:spcBef>
+                <a:spcPts val="0"/>
+              </a:spcBef>
+              <a:spcAft>
+                <a:spcPts val="0"/>
+              </a:spcAft>
+              <a:buClrTx/>
+              <a:buSzTx/>
+              <a:buFontTx/>
+              <a:buNone/>
+              <a:tabLst/>
+              <a:defRPr/>
+            </a:pPr>
+            <a:r>
+              <a:rPr kumimoji="0" lang="en-GB" sz="3200" i="0" u="none" strike="noStrike" kern="1200" cap="none" spc="0" normalizeH="0" baseline="0" noProof="0" dirty="0">
+                <a:ln>
+                  <a:noFill/>
+                </a:ln>
+                <a:solidFill>
+                  <a:prstClr val="black"/>
+                </a:solidFill>
+                <a:effectLst/>
+                <a:uLnTx/>
+                <a:uFillTx/>
+                <a:latin typeface="Calibri" panose="020F0502020204030204"/>
+                <a:ea typeface="+mn-ea"/>
+                <a:cs typeface="+mn-cs"/>
+              </a:rPr>
+              <a:t>Additional</a:t>
+            </a:r>
+          </a:p>
+          <a:p>
+            <a:pPr marL="0" marR="0" lvl="0" indent="0" algn="ctr" defTabSz="914400" rtl="0" eaLnBrk="1" fontAlgn="auto" latinLnBrk="0" hangingPunct="1">
+              <a:lnSpc>
+                <a:spcPct val="100000"/>
+              </a:lnSpc>
+              <a:spcBef>
+                <a:spcPts val="0"/>
+              </a:spcBef>
+              <a:spcAft>
+                <a:spcPts val="0"/>
+              </a:spcAft>
+              <a:buClrTx/>
+              <a:buSzTx/>
+              <a:buFontTx/>
+              <a:buNone/>
+              <a:tabLst/>
+              <a:defRPr/>
+            </a:pPr>
+            <a:endParaRPr kumimoji="0" lang="en-GB" sz="3200" b="1" i="0" u="none" strike="noStrike" kern="1200" cap="none" spc="0" normalizeH="0" baseline="0" noProof="0" dirty="0">
+              <a:ln>
+                <a:noFill/>
+              </a:ln>
+              <a:solidFill>
+                <a:prstClr val="black"/>
+              </a:solidFill>
+              <a:effectLst/>
+              <a:uLnTx/>
+              <a:uFillTx/>
+              <a:latin typeface="Calibri" panose="020F0502020204030204"/>
+              <a:ea typeface="+mn-ea"/>
+              <a:cs typeface="+mn-cs"/>
+            </a:endParaRPr>
+          </a:p>
+          <a:p>
+            <a:pPr marL="0" marR="0" lvl="0" indent="0" algn="ctr" defTabSz="914400" rtl="0" eaLnBrk="1" fontAlgn="auto" latinLnBrk="0" hangingPunct="1">
+              <a:lnSpc>
+                <a:spcPct val="100000"/>
+              </a:lnSpc>
+              <a:spcBef>
+                <a:spcPts val="0"/>
+              </a:spcBef>
+              <a:spcAft>
+                <a:spcPts val="0"/>
+              </a:spcAft>
+              <a:buClrTx/>
+              <a:buSzTx/>
+              <a:buFontTx/>
+              <a:buNone/>
+              <a:tabLst/>
+              <a:defRPr/>
+            </a:pPr>
+            <a:r>
+              <a:rPr kumimoji="0" lang="en-GB" sz="3200" b="1" i="0" u="none" strike="noStrike" kern="1200" cap="none" spc="0" normalizeH="0" baseline="0" noProof="0" dirty="0">
+                <a:ln>
+                  <a:noFill/>
+                </a:ln>
+                <a:solidFill>
+                  <a:prstClr val="black"/>
+                </a:solidFill>
+                <a:effectLst/>
+                <a:uLnTx/>
+                <a:uFillTx/>
+                <a:latin typeface="Calibri" panose="020F0502020204030204"/>
+                <a:ea typeface="+mn-ea"/>
+                <a:cs typeface="+mn-cs"/>
+              </a:rPr>
+              <a:t>Microsoft</a:t>
+            </a:r>
+            <a:r>
+              <a:rPr lang="en-GB" sz="3200" b="1" dirty="0">
+                <a:solidFill>
+                  <a:prstClr val="black"/>
+                </a:solidFill>
+                <a:latin typeface="Calibri" panose="020F0502020204030204"/>
+              </a:rPr>
+              <a:t>t Azure Virtual Training</a:t>
+            </a:r>
+            <a:endParaRPr kumimoji="0" lang="en-GB" sz="3200" b="1" i="0" u="none" strike="noStrike" kern="1200" cap="none" spc="0" normalizeH="0" baseline="0" noProof="0" dirty="0">
+              <a:ln>
+                <a:noFill/>
+              </a:ln>
+              <a:solidFill>
+                <a:prstClr val="black"/>
+              </a:solidFill>
+              <a:effectLst/>
+              <a:uLnTx/>
+              <a:uFillTx/>
+              <a:latin typeface="Calibri" panose="020F0502020204030204"/>
+              <a:ea typeface="+mn-ea"/>
+              <a:cs typeface="+mn-cs"/>
+            </a:endParaRPr>
+          </a:p>
+        </p:txBody>
+      </p:sp>
+    </p:spTree>
+    <p:extLst>
+      <p:ext uri="{BB962C8B-B14F-4D97-AF65-F5344CB8AC3E}">
+        <p14:creationId xmlns:p14="http://schemas.microsoft.com/office/powerpoint/2010/main" val="421601139"/>
+      </p:ext>
+    </p:extLst>
+  </p:cSld>
+  <p:clrMapOvr>
+    <a:masterClrMapping/>
+  </p:clrMapOvr>
+</p:sld>
+</file>
+
+<file path=ppt/slides/slide43.xml><?xml version="1.0" encoding="utf-8"?>
+<p:sld xmlns:a="http://schemas.openxmlformats.org/drawingml/2006/main" xmlns:r="http://schemas.openxmlformats.org/officeDocument/2006/relationships" xmlns:p="http://schemas.openxmlformats.org/presentationml/2006/main">
+  <p:cSld>
+    <p:spTree>
+      <p:nvGrpSpPr>
+        <p:cNvPr id="1" name=""/>
+        <p:cNvGrpSpPr/>
+        <p:nvPr/>
+      </p:nvGrpSpPr>
+      <p:grpSpPr>
+        <a:xfrm>
+          <a:off x="0" y="0"/>
+          <a:ext cx="0" cy="0"/>
+          <a:chOff x="0" y="0"/>
+          <a:chExt cx="0" cy="0"/>
+        </a:xfrm>
+      </p:grpSpPr>
+      <p:grpSp>
+        <p:nvGrpSpPr>
+          <p:cNvPr id="18" name="Group 17">
+            <a:extLst>
+              <a:ext uri="{FF2B5EF4-FFF2-40B4-BE49-F238E27FC236}">
+                <a16:creationId xmlns:a16="http://schemas.microsoft.com/office/drawing/2014/main" id="{6185BE9B-87C8-4B46-9293-0E71CF17E76A}"/>
+              </a:ext>
+            </a:extLst>
+          </p:cNvPr>
+          <p:cNvGrpSpPr/>
+          <p:nvPr/>
+        </p:nvGrpSpPr>
+        <p:grpSpPr>
+          <a:xfrm>
+            <a:off x="99755" y="83129"/>
+            <a:ext cx="11953701" cy="872834"/>
+            <a:chOff x="99755" y="83129"/>
+            <a:chExt cx="11953701" cy="872834"/>
+          </a:xfrm>
+        </p:grpSpPr>
+        <p:cxnSp>
+          <p:nvCxnSpPr>
+            <p:cNvPr id="5" name="Straight Connector 4">
+              <a:extLst>
+                <a:ext uri="{FF2B5EF4-FFF2-40B4-BE49-F238E27FC236}">
+                  <a16:creationId xmlns:a16="http://schemas.microsoft.com/office/drawing/2014/main" id="{A8BE4EF8-406C-4035-940C-AB752B29BA18}"/>
+                </a:ext>
+              </a:extLst>
+            </p:cNvPr>
+            <p:cNvCxnSpPr/>
+            <p:nvPr/>
+          </p:nvCxnSpPr>
+          <p:spPr>
+            <a:xfrm>
+              <a:off x="99755" y="955963"/>
+              <a:ext cx="11953701" cy="0"/>
+            </a:xfrm>
+            <a:prstGeom prst="line">
+              <a:avLst/>
+            </a:prstGeom>
+            <a:ln w="19050">
+              <a:solidFill>
+                <a:srgbClr val="0072C6"/>
+              </a:solidFill>
+            </a:ln>
+          </p:spPr>
+          <p:style>
+            <a:lnRef idx="1">
+              <a:schemeClr val="accent1"/>
+            </a:lnRef>
+            <a:fillRef idx="0">
+              <a:schemeClr val="accent1"/>
+            </a:fillRef>
+            <a:effectRef idx="0">
+              <a:schemeClr val="accent1"/>
+            </a:effectRef>
+            <a:fontRef idx="minor">
+              <a:schemeClr val="tx1"/>
+            </a:fontRef>
+          </p:style>
+        </p:cxnSp>
+        <p:sp>
+          <p:nvSpPr>
+            <p:cNvPr id="8" name="TextBox 7">
+              <a:extLst>
+                <a:ext uri="{FF2B5EF4-FFF2-40B4-BE49-F238E27FC236}">
+                  <a16:creationId xmlns:a16="http://schemas.microsoft.com/office/drawing/2014/main" id="{C61B684E-FDA7-4625-9CC3-79C17CC59ED7}"/>
+                </a:ext>
+              </a:extLst>
+            </p:cNvPr>
+            <p:cNvSpPr txBox="1"/>
+            <p:nvPr/>
+          </p:nvSpPr>
+          <p:spPr>
+            <a:xfrm>
+              <a:off x="4372493" y="180818"/>
+              <a:ext cx="4742931" cy="369332"/>
+            </a:xfrm>
+            <a:prstGeom prst="rect">
+              <a:avLst/>
+            </a:prstGeom>
+            <a:noFill/>
+          </p:spPr>
+          <p:txBody>
+            <a:bodyPr wrap="square" rtlCol="0">
+              <a:spAutoFit/>
+            </a:bodyPr>
+            <a:lstStyle/>
+            <a:p>
+              <a:pPr marL="0" marR="0" lvl="0" indent="0" algn="l" defTabSz="914400" rtl="0" eaLnBrk="1" fontAlgn="auto" latinLnBrk="0" hangingPunct="1">
+                <a:lnSpc>
+                  <a:spcPct val="100000"/>
+                </a:lnSpc>
+                <a:spcBef>
+                  <a:spcPts val="0"/>
+                </a:spcBef>
+                <a:spcAft>
+                  <a:spcPts val="0"/>
+                </a:spcAft>
+                <a:buClrTx/>
+                <a:buSzTx/>
+                <a:buFontTx/>
+                <a:buNone/>
+                <a:tabLst/>
+                <a:defRPr/>
+              </a:pPr>
+              <a:r>
+                <a:rPr kumimoji="0" lang="en-GB" sz="1800" b="0" i="0" u="none" strike="noStrike" kern="1200" cap="none" spc="0" normalizeH="0" baseline="0" noProof="0" dirty="0">
+                  <a:ln>
+                    <a:noFill/>
+                  </a:ln>
+                  <a:solidFill>
+                    <a:prstClr val="black"/>
+                  </a:solidFill>
+                  <a:effectLst/>
+                  <a:uLnTx/>
+                  <a:uFillTx/>
+                  <a:latin typeface="Calibri" panose="020F0502020204030204"/>
+                  <a:ea typeface="+mn-ea"/>
+                  <a:cs typeface="+mn-cs"/>
+                </a:rPr>
+                <a:t>Azure Fundamental Virtual Course</a:t>
+              </a:r>
+            </a:p>
+          </p:txBody>
+        </p:sp>
+        <p:sp>
+          <p:nvSpPr>
+            <p:cNvPr id="10" name="TextBox 9">
+              <a:extLst>
+                <a:ext uri="{FF2B5EF4-FFF2-40B4-BE49-F238E27FC236}">
+                  <a16:creationId xmlns:a16="http://schemas.microsoft.com/office/drawing/2014/main" id="{4E568F0D-7E90-4A0C-8070-6C806D992954}"/>
+                </a:ext>
+              </a:extLst>
+            </p:cNvPr>
+            <p:cNvSpPr txBox="1"/>
+            <p:nvPr/>
+          </p:nvSpPr>
+          <p:spPr>
+            <a:xfrm>
+              <a:off x="9534699" y="180818"/>
+              <a:ext cx="2155764" cy="369332"/>
+            </a:xfrm>
+            <a:prstGeom prst="rect">
+              <a:avLst/>
+            </a:prstGeom>
+            <a:noFill/>
+          </p:spPr>
+          <p:txBody>
+            <a:bodyPr wrap="square" rtlCol="0">
+              <a:spAutoFit/>
+            </a:bodyPr>
+            <a:lstStyle/>
+            <a:p>
+              <a:pPr marL="0" marR="0" lvl="0" indent="0" algn="l" defTabSz="914400" rtl="0" eaLnBrk="1" fontAlgn="auto" latinLnBrk="0" hangingPunct="1">
+                <a:lnSpc>
+                  <a:spcPct val="100000"/>
+                </a:lnSpc>
+                <a:spcBef>
+                  <a:spcPts val="0"/>
+                </a:spcBef>
+                <a:spcAft>
+                  <a:spcPts val="0"/>
+                </a:spcAft>
+                <a:buClrTx/>
+                <a:buSzTx/>
+                <a:buFontTx/>
+                <a:buNone/>
+                <a:tabLst/>
+                <a:defRPr/>
+              </a:pPr>
+              <a:r>
+                <a:rPr kumimoji="0" lang="en-GB" sz="1800" b="0" i="0" u="none" strike="noStrike" kern="1200" cap="none" spc="0" normalizeH="0" baseline="0" noProof="0" dirty="0">
+                  <a:ln>
+                    <a:noFill/>
+                  </a:ln>
+                  <a:solidFill>
+                    <a:prstClr val="black"/>
+                  </a:solidFill>
+                  <a:effectLst/>
+                  <a:uLnTx/>
+                  <a:uFillTx/>
+                  <a:latin typeface="Calibri" panose="020F0502020204030204"/>
+                  <a:ea typeface="+mn-ea"/>
+                  <a:cs typeface="+mn-cs"/>
+                </a:rPr>
+                <a:t>Date: 16/05/22 </a:t>
+              </a:r>
+            </a:p>
+          </p:txBody>
+        </p:sp>
+        <p:cxnSp>
+          <p:nvCxnSpPr>
+            <p:cNvPr id="11" name="Straight Connector 10">
+              <a:extLst>
+                <a:ext uri="{FF2B5EF4-FFF2-40B4-BE49-F238E27FC236}">
+                  <a16:creationId xmlns:a16="http://schemas.microsoft.com/office/drawing/2014/main" id="{F70ABCF3-BE60-426F-8C8C-059C854869C6}"/>
+                </a:ext>
+              </a:extLst>
+            </p:cNvPr>
+            <p:cNvCxnSpPr>
+              <a:cxnSpLocks/>
+            </p:cNvCxnSpPr>
+            <p:nvPr/>
+          </p:nvCxnSpPr>
+          <p:spPr>
+            <a:xfrm flipV="1">
+              <a:off x="4267202" y="93505"/>
+              <a:ext cx="1" cy="754394"/>
+            </a:xfrm>
+            <a:prstGeom prst="line">
+              <a:avLst/>
+            </a:prstGeom>
+            <a:ln w="19050">
+              <a:solidFill>
+                <a:srgbClr val="0072C6"/>
+              </a:solidFill>
+            </a:ln>
+          </p:spPr>
+          <p:style>
+            <a:lnRef idx="1">
+              <a:schemeClr val="accent1"/>
+            </a:lnRef>
+            <a:fillRef idx="0">
+              <a:schemeClr val="accent1"/>
+            </a:fillRef>
+            <a:effectRef idx="0">
+              <a:schemeClr val="accent1"/>
+            </a:effectRef>
+            <a:fontRef idx="minor">
+              <a:schemeClr val="tx1"/>
+            </a:fontRef>
+          </p:style>
+        </p:cxnSp>
+        <p:cxnSp>
+          <p:nvCxnSpPr>
+            <p:cNvPr id="16" name="Straight Connector 15">
+              <a:extLst>
+                <a:ext uri="{FF2B5EF4-FFF2-40B4-BE49-F238E27FC236}">
+                  <a16:creationId xmlns:a16="http://schemas.microsoft.com/office/drawing/2014/main" id="{90F03633-4CAB-4B57-BF94-CF91E87AB7AE}"/>
+                </a:ext>
+              </a:extLst>
+            </p:cNvPr>
+            <p:cNvCxnSpPr>
+              <a:cxnSpLocks/>
+            </p:cNvCxnSpPr>
+            <p:nvPr/>
+          </p:nvCxnSpPr>
+          <p:spPr>
+            <a:xfrm flipV="1">
+              <a:off x="9491750" y="83129"/>
+              <a:ext cx="1" cy="754394"/>
+            </a:xfrm>
+            <a:prstGeom prst="line">
+              <a:avLst/>
+            </a:prstGeom>
+            <a:ln w="19050">
+              <a:solidFill>
+                <a:srgbClr val="0072C6"/>
+              </a:solidFill>
+            </a:ln>
+          </p:spPr>
+          <p:style>
+            <a:lnRef idx="1">
+              <a:schemeClr val="accent1"/>
+            </a:lnRef>
+            <a:fillRef idx="0">
+              <a:schemeClr val="accent1"/>
+            </a:fillRef>
+            <a:effectRef idx="0">
+              <a:schemeClr val="accent1"/>
+            </a:effectRef>
+            <a:fontRef idx="minor">
+              <a:schemeClr val="tx1"/>
+            </a:fontRef>
+          </p:style>
+        </p:cxnSp>
+      </p:grpSp>
+      <p:pic>
+        <p:nvPicPr>
+          <p:cNvPr id="20" name="Picture 2">
+            <a:extLst>
+              <a:ext uri="{FF2B5EF4-FFF2-40B4-BE49-F238E27FC236}">
+                <a16:creationId xmlns:a16="http://schemas.microsoft.com/office/drawing/2014/main" id="{775211BE-DA3A-41DA-8578-4E52F07B6AB9}"/>
+              </a:ext>
+            </a:extLst>
+          </p:cNvPr>
+          <p:cNvPicPr>
+            <a:picLocks noChangeAspect="1" noChangeArrowheads="1"/>
+          </p:cNvPicPr>
+          <p:nvPr/>
+        </p:nvPicPr>
+        <p:blipFill>
+          <a:blip r:embed="rId2">
+            <a:extLst>
+              <a:ext uri="{28A0092B-C50C-407E-A947-70E740481C1C}">
+                <a14:useLocalDpi xmlns:a14="http://schemas.microsoft.com/office/drawing/2010/main" val="0"/>
+              </a:ext>
+            </a:extLst>
+          </a:blip>
+          <a:srcRect/>
+          <a:stretch>
+            <a:fillRect/>
+          </a:stretch>
+        </p:blipFill>
+        <p:spPr bwMode="auto">
+          <a:xfrm>
+            <a:off x="144770" y="111976"/>
+            <a:ext cx="725548" cy="725548"/>
+          </a:xfrm>
+          <a:prstGeom prst="rect">
+            <a:avLst/>
+          </a:prstGeom>
+          <a:noFill/>
+          <a:extLst>
+            <a:ext uri="{909E8E84-426E-40DD-AFC4-6F175D3DCCD1}">
+              <a14:hiddenFill xmlns:a14="http://schemas.microsoft.com/office/drawing/2010/main">
+                <a:solidFill>
+                  <a:srgbClr val="FFFFFF"/>
+                </a:solidFill>
+              </a14:hiddenFill>
+            </a:ext>
+          </a:extLst>
+        </p:spPr>
+      </p:pic>
+      <p:sp>
+        <p:nvSpPr>
+          <p:cNvPr id="21" name="TextBox 20">
+            <a:extLst>
+              <a:ext uri="{FF2B5EF4-FFF2-40B4-BE49-F238E27FC236}">
+                <a16:creationId xmlns:a16="http://schemas.microsoft.com/office/drawing/2014/main" id="{30404CBF-C3F9-43E0-81FA-E9D4D01BC004}"/>
+              </a:ext>
+            </a:extLst>
+          </p:cNvPr>
+          <p:cNvSpPr txBox="1"/>
+          <p:nvPr/>
+        </p:nvSpPr>
+        <p:spPr>
+          <a:xfrm>
+            <a:off x="914402" y="191193"/>
+            <a:ext cx="3483032" cy="646331"/>
+          </a:xfrm>
+          <a:prstGeom prst="rect">
+            <a:avLst/>
+          </a:prstGeom>
+          <a:noFill/>
+        </p:spPr>
+        <p:txBody>
+          <a:bodyPr wrap="square" rtlCol="0">
+            <a:spAutoFit/>
+          </a:bodyPr>
+          <a:lstStyle/>
+          <a:p>
+            <a:pPr marL="0" marR="0" lvl="0" indent="0" algn="l" defTabSz="914400" rtl="0" eaLnBrk="1" fontAlgn="auto" latinLnBrk="0" hangingPunct="1">
+              <a:lnSpc>
+                <a:spcPct val="100000"/>
+              </a:lnSpc>
+              <a:spcBef>
+                <a:spcPts val="0"/>
+              </a:spcBef>
+              <a:spcAft>
+                <a:spcPts val="0"/>
+              </a:spcAft>
+              <a:buClrTx/>
+              <a:buSzTx/>
+              <a:buFontTx/>
+              <a:buNone/>
+              <a:tabLst/>
+              <a:defRPr/>
+            </a:pPr>
+            <a:r>
+              <a:rPr kumimoji="0" lang="en-GB" sz="1800" b="0" i="0" u="none" strike="noStrike" kern="1200" cap="none" spc="0" normalizeH="0" baseline="0" noProof="0" dirty="0">
+                <a:ln>
+                  <a:noFill/>
+                </a:ln>
+                <a:solidFill>
+                  <a:prstClr val="black"/>
+                </a:solidFill>
+                <a:effectLst/>
+                <a:uLnTx/>
+                <a:uFillTx/>
+                <a:latin typeface="Calibri" panose="020F0502020204030204"/>
+                <a:ea typeface="+mn-ea"/>
+                <a:cs typeface="+mn-cs"/>
+              </a:rPr>
+              <a:t>AZ-900 Microsoft Azure Fundamentals</a:t>
+            </a:r>
+          </a:p>
+        </p:txBody>
+      </p:sp>
+    </p:spTree>
+    <p:extLst>
+      <p:ext uri="{BB962C8B-B14F-4D97-AF65-F5344CB8AC3E}">
+        <p14:creationId xmlns:p14="http://schemas.microsoft.com/office/powerpoint/2010/main" val="687039839"/>
+      </p:ext>
+    </p:extLst>
+  </p:cSld>
+  <p:clrMapOvr>
+    <a:masterClrMapping/>
+  </p:clrMapOvr>
+</p:sld>
+</file>
+
 <file path=ppt/slides/slide5.xml><?xml version="1.0" encoding="utf-8"?>
 <p:sld xmlns:a="http://schemas.openxmlformats.org/drawingml/2006/main" xmlns:r="http://schemas.openxmlformats.org/officeDocument/2006/relationships" xmlns:p="http://schemas.openxmlformats.org/presentationml/2006/main">
   <p:cSld>
@@ -26030,15 +26845,7 @@
             </a:pPr>
             <a:r>
               <a:rPr lang="en-GB" sz="1400" dirty="0"/>
-              <a:t>All of these are ‘as a service’. The reason for this is that we don’t own the thing, we rent it and therefore it is a service. In IaaS we don’t own the virtual machine we provision we rent them. A great </a:t>
-            </a:r>
-            <a:r>
-              <a:rPr lang="en-GB" sz="1400" dirty="0" err="1"/>
-              <a:t>anaology</a:t>
-            </a:r>
-            <a:r>
-              <a:rPr lang="en-GB" sz="1400" dirty="0"/>
-              <a:t> is cooking at home versus going to a restaurant. Going to a restaurant could be described as CaaS (cooking as a service). We don’t have any </a:t>
+              <a:t>All of these are ‘as a service’. The reason for this is that we don’t own the thing, we rent it and therefore it is a service. In IaaS we don’t own the virtual machine we provision we rent them. A great analogy is cooking at home versus going to a restaurant. Going to a restaurant could be described as CaaS (cooking as a service). We don’t have any </a:t>
             </a:r>
             <a:r>
               <a:rPr lang="en-GB" sz="1400" dirty="0" err="1"/>
@@ -28119,7 +28926,7 @@
         <p:spPr>
           <a:xfrm>
             <a:off x="189036" y="1149987"/>
-            <a:ext cx="11864419" cy="5248232"/>
+            <a:ext cx="11864419" cy="5506764"/>
           </a:xfrm>
           <a:prstGeom prst="rect">
             <a:avLst/>
@@ -28276,15 +29083,20 @@
             </a:pPr>
             <a:r>
               <a:rPr lang="en-GB" sz="1400" dirty="0"/>
-              <a:t>It’s a combination of public and private clouds. You could have agents installed on a local machine that allows you to connect to the public cloud. If I understand correctly you don’t even need a full private cloud, the private part can simply be your own </a:t>
-            </a:r>
-            <a:r>
-              <a:rPr lang="en-GB" sz="1400" dirty="0" err="1"/>
-              <a:t>manchine</a:t>
-            </a:r>
+              <a:t>It’s a combination of public and private clouds. You could have agents installed on a local machine that allows you to connect to the public cloud. If I understand correctly you don’t even need a full private cloud, the private part can simply be your own machine. </a:t>
+            </a:r>
+          </a:p>
+          <a:p>
+            <a:pPr marL="285750" indent="-285750">
+              <a:lnSpc>
+                <a:spcPct val="120000"/>
+              </a:lnSpc>
+              <a:buFontTx/>
+              <a:buChar char="-"/>
+            </a:pPr>
             <a:r>
               <a:rPr lang="en-GB" sz="1400" dirty="0"/>
-              <a:t>. </a:t>
+              <a:t>Usually useful if there are regulation around where some data needs to be stored and processed.</a:t>
             </a:r>
           </a:p>
           <a:p>

</xml_diff>

<commit_message>
Azure AZ-900 Section 11
</commit_message>
<xml_diff>
--- a/Azure_AZ-900_Fundamentals/MJH_AZ-900_Azure_Fundamentals_Notes.pptx
+++ b/Azure_AZ-900_Fundamentals/MJH_AZ-900_Azure_Fundamentals_Notes.pptx
@@ -48,8 +48,12 @@
     <p:sldId id="336" r:id="rId42"/>
     <p:sldId id="298" r:id="rId43"/>
     <p:sldId id="329" r:id="rId44"/>
-    <p:sldId id="300" r:id="rId45"/>
-    <p:sldId id="302" r:id="rId46"/>
+    <p:sldId id="338" r:id="rId45"/>
+    <p:sldId id="339" r:id="rId46"/>
+    <p:sldId id="340" r:id="rId47"/>
+    <p:sldId id="337" r:id="rId48"/>
+    <p:sldId id="300" r:id="rId49"/>
+    <p:sldId id="302" r:id="rId50"/>
   </p:sldIdLst>
   <p:sldSz cx="12192000" cy="6858000"/>
   <p:notesSz cx="6858000" cy="9144000"/>
@@ -28114,6 +28118,230 @@
           </a:p>
         </p:txBody>
       </p:sp>
+      <p:sp>
+        <p:nvSpPr>
+          <p:cNvPr id="12" name="TextBox 11">
+            <a:extLst>
+              <a:ext uri="{FF2B5EF4-FFF2-40B4-BE49-F238E27FC236}">
+                <a16:creationId xmlns:a16="http://schemas.microsoft.com/office/drawing/2014/main" id="{A48842C8-EFC7-F1D7-CA9F-9D69E7C11F18}"/>
+              </a:ext>
+            </a:extLst>
+          </p:cNvPr>
+          <p:cNvSpPr txBox="1"/>
+          <p:nvPr/>
+        </p:nvSpPr>
+        <p:spPr>
+          <a:xfrm>
+            <a:off x="343441" y="1163750"/>
+            <a:ext cx="11563010" cy="5390963"/>
+          </a:xfrm>
+          <a:prstGeom prst="rect">
+            <a:avLst/>
+          </a:prstGeom>
+          <a:noFill/>
+        </p:spPr>
+        <p:txBody>
+          <a:bodyPr wrap="square" rtlCol="0">
+            <a:spAutoFit/>
+          </a:bodyPr>
+          <a:lstStyle/>
+          <a:p>
+            <a:pPr>
+              <a:lnSpc>
+                <a:spcPct val="120000"/>
+              </a:lnSpc>
+            </a:pPr>
+            <a:r>
+              <a:rPr lang="en-GB" sz="1600" b="1" dirty="0"/>
+              <a:t>Azure Governance and Compliance</a:t>
+            </a:r>
+          </a:p>
+          <a:p>
+            <a:pPr marL="285750" indent="-285750">
+              <a:lnSpc>
+                <a:spcPct val="120000"/>
+              </a:lnSpc>
+              <a:buFontTx/>
+              <a:buChar char="-"/>
+            </a:pPr>
+            <a:r>
+              <a:rPr lang="en-GB" sz="1600" dirty="0"/>
+              <a:t>Likely that a company will have a set of rules that need to be followed. </a:t>
+            </a:r>
+          </a:p>
+          <a:p>
+            <a:pPr marL="285750" indent="-285750">
+              <a:lnSpc>
+                <a:spcPct val="120000"/>
+              </a:lnSpc>
+              <a:buFontTx/>
+              <a:buChar char="-"/>
+            </a:pPr>
+            <a:r>
+              <a:rPr lang="en-GB" sz="1600" dirty="0"/>
+              <a:t>An example of this is: always have a daily backup enabled on every server. This could be a rule or policy over the organisation.</a:t>
+            </a:r>
+          </a:p>
+          <a:p>
+            <a:pPr>
+              <a:lnSpc>
+                <a:spcPct val="120000"/>
+              </a:lnSpc>
+            </a:pPr>
+            <a:endParaRPr lang="en-GB" sz="1600" dirty="0"/>
+          </a:p>
+          <a:p>
+            <a:pPr>
+              <a:lnSpc>
+                <a:spcPct val="120000"/>
+              </a:lnSpc>
+            </a:pPr>
+            <a:r>
+              <a:rPr lang="en-GB" sz="1600" b="1" dirty="0"/>
+              <a:t>How to Manage or Ensure Governance is being Followed?</a:t>
+            </a:r>
+          </a:p>
+          <a:p>
+            <a:pPr marL="285750" indent="-285750">
+              <a:lnSpc>
+                <a:spcPct val="120000"/>
+              </a:lnSpc>
+              <a:buFontTx/>
+              <a:buChar char="-"/>
+            </a:pPr>
+            <a:r>
+              <a:rPr lang="en-GB" sz="1600" dirty="0"/>
+              <a:t>One option is to simply send an email and assume that everyone reads it and follows it.</a:t>
+            </a:r>
+          </a:p>
+          <a:p>
+            <a:pPr marL="285750" indent="-285750">
+              <a:lnSpc>
+                <a:spcPct val="120000"/>
+              </a:lnSpc>
+              <a:buFontTx/>
+              <a:buChar char="-"/>
+            </a:pPr>
+            <a:r>
+              <a:rPr lang="en-GB" sz="1600" dirty="0"/>
+              <a:t>Another option is to use Azure tools to enforce the riles or audit compliance (for the previous example the former would be forcing people to have backups whereas the latter would be monitoring the number of servers with and without backups – this would then need to be followed up on). There are 4 topics we need to be aware of:</a:t>
+            </a:r>
+          </a:p>
+          <a:p>
+            <a:pPr marL="742950" lvl="1" indent="-285750">
+              <a:lnSpc>
+                <a:spcPct val="120000"/>
+              </a:lnSpc>
+              <a:buFont typeface="Arial" panose="020B0604020202020204" pitchFamily="34" charset="0"/>
+              <a:buChar char="•"/>
+            </a:pPr>
+            <a:r>
+              <a:rPr lang="en-GB" sz="1600" dirty="0"/>
+              <a:t>Service Trust Portal</a:t>
+            </a:r>
+          </a:p>
+          <a:p>
+            <a:pPr marL="742950" lvl="1" indent="-285750">
+              <a:lnSpc>
+                <a:spcPct val="120000"/>
+              </a:lnSpc>
+              <a:buFont typeface="Arial" panose="020B0604020202020204" pitchFamily="34" charset="0"/>
+              <a:buChar char="•"/>
+            </a:pPr>
+            <a:r>
+              <a:rPr lang="en-GB" sz="1600" dirty="0"/>
+              <a:t>Azure Blueprints</a:t>
+            </a:r>
+          </a:p>
+          <a:p>
+            <a:pPr marL="742950" lvl="1" indent="-285750">
+              <a:lnSpc>
+                <a:spcPct val="120000"/>
+              </a:lnSpc>
+              <a:buFont typeface="Arial" panose="020B0604020202020204" pitchFamily="34" charset="0"/>
+              <a:buChar char="•"/>
+            </a:pPr>
+            <a:r>
+              <a:rPr lang="en-GB" sz="1600" dirty="0"/>
+              <a:t>Azure Policy</a:t>
+            </a:r>
+          </a:p>
+          <a:p>
+            <a:pPr marL="742950" lvl="1" indent="-285750">
+              <a:lnSpc>
+                <a:spcPct val="120000"/>
+              </a:lnSpc>
+              <a:buFont typeface="Arial" panose="020B0604020202020204" pitchFamily="34" charset="0"/>
+              <a:buChar char="•"/>
+            </a:pPr>
+            <a:r>
+              <a:rPr lang="en-GB" sz="1600" dirty="0"/>
+              <a:t>Resource Locks</a:t>
+            </a:r>
+          </a:p>
+          <a:p>
+            <a:pPr marL="285750" indent="-285750">
+              <a:lnSpc>
+                <a:spcPct val="120000"/>
+              </a:lnSpc>
+              <a:buFontTx/>
+              <a:buChar char="-"/>
+            </a:pPr>
+            <a:endParaRPr lang="en-GB" sz="1600" dirty="0"/>
+          </a:p>
+          <a:p>
+            <a:pPr>
+              <a:lnSpc>
+                <a:spcPct val="120000"/>
+              </a:lnSpc>
+            </a:pPr>
+            <a:r>
+              <a:rPr lang="en-GB" sz="1600" b="1" dirty="0"/>
+              <a:t>Service Trust Portal</a:t>
+            </a:r>
+          </a:p>
+          <a:p>
+            <a:pPr>
+              <a:lnSpc>
+                <a:spcPct val="120000"/>
+              </a:lnSpc>
+            </a:pPr>
+            <a:r>
+              <a:rPr lang="en-GB" sz="1600" dirty="0">
+                <a:hlinkClick r:id="rId3"/>
+              </a:rPr>
+              <a:t>https://servicetrust.microsoft.com/</a:t>
+            </a:r>
+            <a:endParaRPr lang="en-GB" sz="1600" dirty="0"/>
+          </a:p>
+          <a:p>
+            <a:pPr marL="285750" indent="-285750">
+              <a:lnSpc>
+                <a:spcPct val="120000"/>
+              </a:lnSpc>
+              <a:buFontTx/>
+              <a:buChar char="-"/>
+            </a:pPr>
+            <a:r>
+              <a:rPr lang="en-GB" sz="1600" dirty="0"/>
+              <a:t>Location of documents required for MS regulatory standards. </a:t>
+            </a:r>
+          </a:p>
+          <a:p>
+            <a:pPr marL="285750" indent="-285750">
+              <a:lnSpc>
+                <a:spcPct val="120000"/>
+              </a:lnSpc>
+              <a:buFontTx/>
+              <a:buChar char="-"/>
+            </a:pPr>
+            <a:r>
+              <a:rPr lang="en-GB" sz="1600" dirty="0"/>
+              <a:t>This is how MS Azure complies with different standards such as GDPR.</a:t>
+            </a:r>
+          </a:p>
+        </p:txBody>
+      </p:sp>
     </p:spTree>
     <p:extLst>
       <p:ext uri="{BB962C8B-B14F-4D97-AF65-F5344CB8AC3E}">
@@ -28128,6 +28356,2738 @@
 </file>
 
 <file path=ppt/slides/slide44.xml><?xml version="1.0" encoding="utf-8"?>
+<p:sld xmlns:a="http://schemas.openxmlformats.org/drawingml/2006/main" xmlns:r="http://schemas.openxmlformats.org/officeDocument/2006/relationships" xmlns:p="http://schemas.openxmlformats.org/presentationml/2006/main">
+  <p:cSld>
+    <p:spTree>
+      <p:nvGrpSpPr>
+        <p:cNvPr id="1" name=""/>
+        <p:cNvGrpSpPr/>
+        <p:nvPr/>
+      </p:nvGrpSpPr>
+      <p:grpSpPr>
+        <a:xfrm>
+          <a:off x="0" y="0"/>
+          <a:ext cx="0" cy="0"/>
+          <a:chOff x="0" y="0"/>
+          <a:chExt cx="0" cy="0"/>
+        </a:xfrm>
+      </p:grpSpPr>
+      <p:grpSp>
+        <p:nvGrpSpPr>
+          <p:cNvPr id="18" name="Group 17">
+            <a:extLst>
+              <a:ext uri="{FF2B5EF4-FFF2-40B4-BE49-F238E27FC236}">
+                <a16:creationId xmlns:a16="http://schemas.microsoft.com/office/drawing/2014/main" id="{6185BE9B-87C8-4B46-9293-0E71CF17E76A}"/>
+              </a:ext>
+            </a:extLst>
+          </p:cNvPr>
+          <p:cNvGrpSpPr/>
+          <p:nvPr/>
+        </p:nvGrpSpPr>
+        <p:grpSpPr>
+          <a:xfrm>
+            <a:off x="99755" y="83129"/>
+            <a:ext cx="11953701" cy="872834"/>
+            <a:chOff x="99755" y="83129"/>
+            <a:chExt cx="11953701" cy="872834"/>
+          </a:xfrm>
+        </p:grpSpPr>
+        <p:cxnSp>
+          <p:nvCxnSpPr>
+            <p:cNvPr id="5" name="Straight Connector 4">
+              <a:extLst>
+                <a:ext uri="{FF2B5EF4-FFF2-40B4-BE49-F238E27FC236}">
+                  <a16:creationId xmlns:a16="http://schemas.microsoft.com/office/drawing/2014/main" id="{A8BE4EF8-406C-4035-940C-AB752B29BA18}"/>
+                </a:ext>
+              </a:extLst>
+            </p:cNvPr>
+            <p:cNvCxnSpPr/>
+            <p:nvPr/>
+          </p:nvCxnSpPr>
+          <p:spPr>
+            <a:xfrm>
+              <a:off x="99755" y="955963"/>
+              <a:ext cx="11953701" cy="0"/>
+            </a:xfrm>
+            <a:prstGeom prst="line">
+              <a:avLst/>
+            </a:prstGeom>
+            <a:ln w="19050">
+              <a:solidFill>
+                <a:srgbClr val="0072C6"/>
+              </a:solidFill>
+            </a:ln>
+          </p:spPr>
+          <p:style>
+            <a:lnRef idx="1">
+              <a:schemeClr val="accent1"/>
+            </a:lnRef>
+            <a:fillRef idx="0">
+              <a:schemeClr val="accent1"/>
+            </a:fillRef>
+            <a:effectRef idx="0">
+              <a:schemeClr val="accent1"/>
+            </a:effectRef>
+            <a:fontRef idx="minor">
+              <a:schemeClr val="tx1"/>
+            </a:fontRef>
+          </p:style>
+        </p:cxnSp>
+        <p:sp>
+          <p:nvSpPr>
+            <p:cNvPr id="8" name="TextBox 7">
+              <a:extLst>
+                <a:ext uri="{FF2B5EF4-FFF2-40B4-BE49-F238E27FC236}">
+                  <a16:creationId xmlns:a16="http://schemas.microsoft.com/office/drawing/2014/main" id="{C61B684E-FDA7-4625-9CC3-79C17CC59ED7}"/>
+                </a:ext>
+              </a:extLst>
+            </p:cNvPr>
+            <p:cNvSpPr txBox="1"/>
+            <p:nvPr/>
+          </p:nvSpPr>
+          <p:spPr>
+            <a:xfrm>
+              <a:off x="4372494" y="180818"/>
+              <a:ext cx="2686392" cy="369332"/>
+            </a:xfrm>
+            <a:prstGeom prst="rect">
+              <a:avLst/>
+            </a:prstGeom>
+            <a:noFill/>
+          </p:spPr>
+          <p:txBody>
+            <a:bodyPr wrap="square" rtlCol="0">
+              <a:spAutoFit/>
+            </a:bodyPr>
+            <a:lstStyle/>
+            <a:p>
+              <a:pPr marL="0" marR="0" lvl="0" indent="0" algn="l" defTabSz="914400" rtl="0" eaLnBrk="1" fontAlgn="auto" latinLnBrk="0" hangingPunct="1">
+                <a:lnSpc>
+                  <a:spcPct val="100000"/>
+                </a:lnSpc>
+                <a:spcBef>
+                  <a:spcPts val="0"/>
+                </a:spcBef>
+                <a:spcAft>
+                  <a:spcPts val="0"/>
+                </a:spcAft>
+                <a:buClrTx/>
+                <a:buSzTx/>
+                <a:buFontTx/>
+                <a:buNone/>
+                <a:tabLst/>
+                <a:defRPr/>
+              </a:pPr>
+              <a:r>
+                <a:rPr kumimoji="0" lang="en-GB" sz="1800" b="0" i="0" u="none" strike="noStrike" kern="1200" cap="none" spc="0" normalizeH="0" baseline="0" noProof="0" dirty="0">
+                  <a:ln>
+                    <a:noFill/>
+                  </a:ln>
+                  <a:solidFill>
+                    <a:prstClr val="black"/>
+                  </a:solidFill>
+                  <a:effectLst/>
+                  <a:uLnTx/>
+                  <a:uFillTx/>
+                  <a:latin typeface="Calibri" panose="020F0502020204030204"/>
+                  <a:ea typeface="+mn-ea"/>
+                  <a:cs typeface="+mn-cs"/>
+                </a:rPr>
+                <a:t>Azure Identity Services</a:t>
+              </a:r>
+            </a:p>
+          </p:txBody>
+        </p:sp>
+        <p:sp>
+          <p:nvSpPr>
+            <p:cNvPr id="9" name="TextBox 8">
+              <a:extLst>
+                <a:ext uri="{FF2B5EF4-FFF2-40B4-BE49-F238E27FC236}">
+                  <a16:creationId xmlns:a16="http://schemas.microsoft.com/office/drawing/2014/main" id="{F6943DFB-F258-4603-B2D8-7E2958123510}"/>
+                </a:ext>
+              </a:extLst>
+            </p:cNvPr>
+            <p:cNvSpPr txBox="1"/>
+            <p:nvPr/>
+          </p:nvSpPr>
+          <p:spPr>
+            <a:xfrm>
+              <a:off x="7197436" y="190641"/>
+              <a:ext cx="2155764" cy="369332"/>
+            </a:xfrm>
+            <a:prstGeom prst="rect">
+              <a:avLst/>
+            </a:prstGeom>
+            <a:noFill/>
+          </p:spPr>
+          <p:txBody>
+            <a:bodyPr wrap="square" rtlCol="0">
+              <a:spAutoFit/>
+            </a:bodyPr>
+            <a:lstStyle/>
+            <a:p>
+              <a:pPr marL="0" marR="0" lvl="0" indent="0" algn="l" defTabSz="914400" rtl="0" eaLnBrk="1" fontAlgn="auto" latinLnBrk="0" hangingPunct="1">
+                <a:lnSpc>
+                  <a:spcPct val="100000"/>
+                </a:lnSpc>
+                <a:spcBef>
+                  <a:spcPts val="0"/>
+                </a:spcBef>
+                <a:spcAft>
+                  <a:spcPts val="0"/>
+                </a:spcAft>
+                <a:buClrTx/>
+                <a:buSzTx/>
+                <a:buFontTx/>
+                <a:buNone/>
+                <a:tabLst/>
+                <a:defRPr/>
+              </a:pPr>
+              <a:r>
+                <a:rPr kumimoji="0" lang="en-GB" sz="1800" b="0" i="0" u="none" strike="noStrike" kern="1200" cap="none" spc="0" normalizeH="0" baseline="0" noProof="0" dirty="0">
+                  <a:ln>
+                    <a:noFill/>
+                  </a:ln>
+                  <a:solidFill>
+                    <a:prstClr val="black"/>
+                  </a:solidFill>
+                  <a:effectLst/>
+                  <a:uLnTx/>
+                  <a:uFillTx/>
+                  <a:latin typeface="Calibri" panose="020F0502020204030204"/>
+                  <a:ea typeface="+mn-ea"/>
+                  <a:cs typeface="+mn-cs"/>
+                </a:rPr>
+                <a:t>Section: 11.44</a:t>
+              </a:r>
+            </a:p>
+          </p:txBody>
+        </p:sp>
+        <p:sp>
+          <p:nvSpPr>
+            <p:cNvPr id="10" name="TextBox 9">
+              <a:extLst>
+                <a:ext uri="{FF2B5EF4-FFF2-40B4-BE49-F238E27FC236}">
+                  <a16:creationId xmlns:a16="http://schemas.microsoft.com/office/drawing/2014/main" id="{4E568F0D-7E90-4A0C-8070-6C806D992954}"/>
+                </a:ext>
+              </a:extLst>
+            </p:cNvPr>
+            <p:cNvSpPr txBox="1"/>
+            <p:nvPr/>
+          </p:nvSpPr>
+          <p:spPr>
+            <a:xfrm>
+              <a:off x="9534699" y="180818"/>
+              <a:ext cx="2155764" cy="369332"/>
+            </a:xfrm>
+            <a:prstGeom prst="rect">
+              <a:avLst/>
+            </a:prstGeom>
+            <a:noFill/>
+          </p:spPr>
+          <p:txBody>
+            <a:bodyPr wrap="square" rtlCol="0">
+              <a:spAutoFit/>
+            </a:bodyPr>
+            <a:lstStyle/>
+            <a:p>
+              <a:pPr marL="0" marR="0" lvl="0" indent="0" algn="l" defTabSz="914400" rtl="0" eaLnBrk="1" fontAlgn="auto" latinLnBrk="0" hangingPunct="1">
+                <a:lnSpc>
+                  <a:spcPct val="100000"/>
+                </a:lnSpc>
+                <a:spcBef>
+                  <a:spcPts val="0"/>
+                </a:spcBef>
+                <a:spcAft>
+                  <a:spcPts val="0"/>
+                </a:spcAft>
+                <a:buClrTx/>
+                <a:buSzTx/>
+                <a:buFontTx/>
+                <a:buNone/>
+                <a:tabLst/>
+                <a:defRPr/>
+              </a:pPr>
+              <a:r>
+                <a:rPr kumimoji="0" lang="en-GB" sz="1800" b="0" i="0" u="none" strike="noStrike" kern="1200" cap="none" spc="0" normalizeH="0" baseline="0" noProof="0" dirty="0">
+                  <a:ln>
+                    <a:noFill/>
+                  </a:ln>
+                  <a:solidFill>
+                    <a:prstClr val="black"/>
+                  </a:solidFill>
+                  <a:effectLst/>
+                  <a:uLnTx/>
+                  <a:uFillTx/>
+                  <a:latin typeface="Calibri" panose="020F0502020204030204"/>
+                  <a:ea typeface="+mn-ea"/>
+                  <a:cs typeface="+mn-cs"/>
+                </a:rPr>
+                <a:t>Date: 21/06/22 </a:t>
+              </a:r>
+            </a:p>
+          </p:txBody>
+        </p:sp>
+        <p:cxnSp>
+          <p:nvCxnSpPr>
+            <p:cNvPr id="11" name="Straight Connector 10">
+              <a:extLst>
+                <a:ext uri="{FF2B5EF4-FFF2-40B4-BE49-F238E27FC236}">
+                  <a16:creationId xmlns:a16="http://schemas.microsoft.com/office/drawing/2014/main" id="{F70ABCF3-BE60-426F-8C8C-059C854869C6}"/>
+                </a:ext>
+              </a:extLst>
+            </p:cNvPr>
+            <p:cNvCxnSpPr>
+              <a:cxnSpLocks/>
+            </p:cNvCxnSpPr>
+            <p:nvPr/>
+          </p:nvCxnSpPr>
+          <p:spPr>
+            <a:xfrm flipV="1">
+              <a:off x="4267202" y="93505"/>
+              <a:ext cx="1" cy="754394"/>
+            </a:xfrm>
+            <a:prstGeom prst="line">
+              <a:avLst/>
+            </a:prstGeom>
+            <a:ln w="19050">
+              <a:solidFill>
+                <a:srgbClr val="0072C6"/>
+              </a:solidFill>
+            </a:ln>
+          </p:spPr>
+          <p:style>
+            <a:lnRef idx="1">
+              <a:schemeClr val="accent1"/>
+            </a:lnRef>
+            <a:fillRef idx="0">
+              <a:schemeClr val="accent1"/>
+            </a:fillRef>
+            <a:effectRef idx="0">
+              <a:schemeClr val="accent1"/>
+            </a:effectRef>
+            <a:fontRef idx="minor">
+              <a:schemeClr val="tx1"/>
+            </a:fontRef>
+          </p:style>
+        </p:cxnSp>
+        <p:cxnSp>
+          <p:nvCxnSpPr>
+            <p:cNvPr id="15" name="Straight Connector 14">
+              <a:extLst>
+                <a:ext uri="{FF2B5EF4-FFF2-40B4-BE49-F238E27FC236}">
+                  <a16:creationId xmlns:a16="http://schemas.microsoft.com/office/drawing/2014/main" id="{D7F750D7-69E5-4FC3-AFB5-134C7587DE8B}"/>
+                </a:ext>
+              </a:extLst>
+            </p:cNvPr>
+            <p:cNvCxnSpPr>
+              <a:cxnSpLocks/>
+            </p:cNvCxnSpPr>
+            <p:nvPr/>
+          </p:nvCxnSpPr>
+          <p:spPr>
+            <a:xfrm flipV="1">
+              <a:off x="7154489" y="88317"/>
+              <a:ext cx="1" cy="754394"/>
+            </a:xfrm>
+            <a:prstGeom prst="line">
+              <a:avLst/>
+            </a:prstGeom>
+            <a:ln w="19050">
+              <a:solidFill>
+                <a:srgbClr val="0072C6"/>
+              </a:solidFill>
+            </a:ln>
+          </p:spPr>
+          <p:style>
+            <a:lnRef idx="1">
+              <a:schemeClr val="accent1"/>
+            </a:lnRef>
+            <a:fillRef idx="0">
+              <a:schemeClr val="accent1"/>
+            </a:fillRef>
+            <a:effectRef idx="0">
+              <a:schemeClr val="accent1"/>
+            </a:effectRef>
+            <a:fontRef idx="minor">
+              <a:schemeClr val="tx1"/>
+            </a:fontRef>
+          </p:style>
+        </p:cxnSp>
+        <p:cxnSp>
+          <p:nvCxnSpPr>
+            <p:cNvPr id="16" name="Straight Connector 15">
+              <a:extLst>
+                <a:ext uri="{FF2B5EF4-FFF2-40B4-BE49-F238E27FC236}">
+                  <a16:creationId xmlns:a16="http://schemas.microsoft.com/office/drawing/2014/main" id="{90F03633-4CAB-4B57-BF94-CF91E87AB7AE}"/>
+                </a:ext>
+              </a:extLst>
+            </p:cNvPr>
+            <p:cNvCxnSpPr>
+              <a:cxnSpLocks/>
+            </p:cNvCxnSpPr>
+            <p:nvPr/>
+          </p:nvCxnSpPr>
+          <p:spPr>
+            <a:xfrm flipV="1">
+              <a:off x="9491750" y="83129"/>
+              <a:ext cx="1" cy="754394"/>
+            </a:xfrm>
+            <a:prstGeom prst="line">
+              <a:avLst/>
+            </a:prstGeom>
+            <a:ln w="19050">
+              <a:solidFill>
+                <a:srgbClr val="0072C6"/>
+              </a:solidFill>
+            </a:ln>
+          </p:spPr>
+          <p:style>
+            <a:lnRef idx="1">
+              <a:schemeClr val="accent1"/>
+            </a:lnRef>
+            <a:fillRef idx="0">
+              <a:schemeClr val="accent1"/>
+            </a:fillRef>
+            <a:effectRef idx="0">
+              <a:schemeClr val="accent1"/>
+            </a:effectRef>
+            <a:fontRef idx="minor">
+              <a:schemeClr val="tx1"/>
+            </a:fontRef>
+          </p:style>
+        </p:cxnSp>
+      </p:grpSp>
+      <p:pic>
+        <p:nvPicPr>
+          <p:cNvPr id="20" name="Picture 2">
+            <a:extLst>
+              <a:ext uri="{FF2B5EF4-FFF2-40B4-BE49-F238E27FC236}">
+                <a16:creationId xmlns:a16="http://schemas.microsoft.com/office/drawing/2014/main" id="{775211BE-DA3A-41DA-8578-4E52F07B6AB9}"/>
+              </a:ext>
+            </a:extLst>
+          </p:cNvPr>
+          <p:cNvPicPr>
+            <a:picLocks noChangeAspect="1" noChangeArrowheads="1"/>
+          </p:cNvPicPr>
+          <p:nvPr/>
+        </p:nvPicPr>
+        <p:blipFill>
+          <a:blip r:embed="rId2">
+            <a:extLst>
+              <a:ext uri="{28A0092B-C50C-407E-A947-70E740481C1C}">
+                <a14:useLocalDpi xmlns:a14="http://schemas.microsoft.com/office/drawing/2010/main" val="0"/>
+              </a:ext>
+            </a:extLst>
+          </a:blip>
+          <a:srcRect/>
+          <a:stretch>
+            <a:fillRect/>
+          </a:stretch>
+        </p:blipFill>
+        <p:spPr bwMode="auto">
+          <a:xfrm>
+            <a:off x="144770" y="111976"/>
+            <a:ext cx="725548" cy="725548"/>
+          </a:xfrm>
+          <a:prstGeom prst="rect">
+            <a:avLst/>
+          </a:prstGeom>
+          <a:noFill/>
+          <a:extLst>
+            <a:ext uri="{909E8E84-426E-40DD-AFC4-6F175D3DCCD1}">
+              <a14:hiddenFill xmlns:a14="http://schemas.microsoft.com/office/drawing/2010/main">
+                <a:solidFill>
+                  <a:srgbClr val="FFFFFF"/>
+                </a:solidFill>
+              </a14:hiddenFill>
+            </a:ext>
+          </a:extLst>
+        </p:spPr>
+      </p:pic>
+      <p:sp>
+        <p:nvSpPr>
+          <p:cNvPr id="21" name="TextBox 20">
+            <a:extLst>
+              <a:ext uri="{FF2B5EF4-FFF2-40B4-BE49-F238E27FC236}">
+                <a16:creationId xmlns:a16="http://schemas.microsoft.com/office/drawing/2014/main" id="{30404CBF-C3F9-43E0-81FA-E9D4D01BC004}"/>
+              </a:ext>
+            </a:extLst>
+          </p:cNvPr>
+          <p:cNvSpPr txBox="1"/>
+          <p:nvPr/>
+        </p:nvSpPr>
+        <p:spPr>
+          <a:xfrm>
+            <a:off x="914402" y="191193"/>
+            <a:ext cx="3483032" cy="646331"/>
+          </a:xfrm>
+          <a:prstGeom prst="rect">
+            <a:avLst/>
+          </a:prstGeom>
+          <a:noFill/>
+        </p:spPr>
+        <p:txBody>
+          <a:bodyPr wrap="square" rtlCol="0">
+            <a:spAutoFit/>
+          </a:bodyPr>
+          <a:lstStyle/>
+          <a:p>
+            <a:pPr marL="0" marR="0" lvl="0" indent="0" algn="l" defTabSz="914400" rtl="0" eaLnBrk="1" fontAlgn="auto" latinLnBrk="0" hangingPunct="1">
+              <a:lnSpc>
+                <a:spcPct val="100000"/>
+              </a:lnSpc>
+              <a:spcBef>
+                <a:spcPts val="0"/>
+              </a:spcBef>
+              <a:spcAft>
+                <a:spcPts val="0"/>
+              </a:spcAft>
+              <a:buClrTx/>
+              <a:buSzTx/>
+              <a:buFontTx/>
+              <a:buNone/>
+              <a:tabLst/>
+              <a:defRPr/>
+            </a:pPr>
+            <a:r>
+              <a:rPr kumimoji="0" lang="en-GB" sz="1800" b="0" i="0" u="none" strike="noStrike" kern="1200" cap="none" spc="0" normalizeH="0" baseline="0" noProof="0" dirty="0">
+                <a:ln>
+                  <a:noFill/>
+                </a:ln>
+                <a:solidFill>
+                  <a:prstClr val="black"/>
+                </a:solidFill>
+                <a:effectLst/>
+                <a:uLnTx/>
+                <a:uFillTx/>
+                <a:latin typeface="Calibri" panose="020F0502020204030204"/>
+                <a:ea typeface="+mn-ea"/>
+                <a:cs typeface="+mn-cs"/>
+              </a:rPr>
+              <a:t>AZ-900 Microsoft Azure Fundamentals</a:t>
+            </a:r>
+          </a:p>
+        </p:txBody>
+      </p:sp>
+      <p:sp>
+        <p:nvSpPr>
+          <p:cNvPr id="12" name="TextBox 11">
+            <a:extLst>
+              <a:ext uri="{FF2B5EF4-FFF2-40B4-BE49-F238E27FC236}">
+                <a16:creationId xmlns:a16="http://schemas.microsoft.com/office/drawing/2014/main" id="{A48842C8-EFC7-F1D7-CA9F-9D69E7C11F18}"/>
+              </a:ext>
+            </a:extLst>
+          </p:cNvPr>
+          <p:cNvSpPr txBox="1"/>
+          <p:nvPr/>
+        </p:nvSpPr>
+        <p:spPr>
+          <a:xfrm>
+            <a:off x="343441" y="1163750"/>
+            <a:ext cx="4979330" cy="4504566"/>
+          </a:xfrm>
+          <a:prstGeom prst="rect">
+            <a:avLst/>
+          </a:prstGeom>
+          <a:noFill/>
+        </p:spPr>
+        <p:txBody>
+          <a:bodyPr wrap="square" rtlCol="0">
+            <a:spAutoFit/>
+          </a:bodyPr>
+          <a:lstStyle/>
+          <a:p>
+            <a:pPr>
+              <a:lnSpc>
+                <a:spcPct val="120000"/>
+              </a:lnSpc>
+            </a:pPr>
+            <a:r>
+              <a:rPr lang="en-GB" sz="1600" b="1" dirty="0"/>
+              <a:t>Azure Blueprints</a:t>
+            </a:r>
+          </a:p>
+          <a:p>
+            <a:pPr>
+              <a:lnSpc>
+                <a:spcPct val="120000"/>
+              </a:lnSpc>
+            </a:pPr>
+            <a:r>
+              <a:rPr lang="en-GB" sz="1600" dirty="0">
+                <a:hlinkClick r:id="rId3"/>
+              </a:rPr>
+              <a:t>https://docs.microsoft.com/en-us/azure/governance/blueprints/overview</a:t>
+            </a:r>
+            <a:endParaRPr lang="en-GB" sz="1600" dirty="0"/>
+          </a:p>
+          <a:p>
+            <a:pPr>
+              <a:lnSpc>
+                <a:spcPct val="120000"/>
+              </a:lnSpc>
+            </a:pPr>
+            <a:endParaRPr lang="en-GB" sz="1600" dirty="0"/>
+          </a:p>
+          <a:p>
+            <a:pPr marL="285750" indent="-285750">
+              <a:lnSpc>
+                <a:spcPct val="120000"/>
+              </a:lnSpc>
+              <a:buFontTx/>
+              <a:buChar char="-"/>
+            </a:pPr>
+            <a:r>
+              <a:rPr lang="en-GB" sz="1600" dirty="0"/>
+              <a:t>Basically, a template for a subscription that will allow us to make the same resources repeatedly. </a:t>
+            </a:r>
+          </a:p>
+          <a:p>
+            <a:pPr marL="285750" indent="-285750">
+              <a:lnSpc>
+                <a:spcPct val="120000"/>
+              </a:lnSpc>
+              <a:buFontTx/>
+              <a:buChar char="-"/>
+            </a:pPr>
+            <a:endParaRPr lang="en-GB" sz="1600" dirty="0"/>
+          </a:p>
+          <a:p>
+            <a:pPr marL="285750" indent="-285750">
+              <a:lnSpc>
+                <a:spcPct val="120000"/>
+              </a:lnSpc>
+              <a:buFontTx/>
+              <a:buChar char="-"/>
+            </a:pPr>
+            <a:r>
+              <a:rPr lang="en-GB" sz="1600" dirty="0"/>
+              <a:t>A</a:t>
+            </a:r>
+            <a:r>
+              <a:rPr lang="en-US" sz="1600" dirty="0"/>
+              <a:t> blueprint definition is a collection of azure components role assignments resource groups resources and policy assignments allowing you to deploy those with a single press of a button.</a:t>
+            </a:r>
+          </a:p>
+          <a:p>
+            <a:pPr marL="285750" indent="-285750">
+              <a:lnSpc>
+                <a:spcPct val="120000"/>
+              </a:lnSpc>
+              <a:buFontTx/>
+              <a:buChar char="-"/>
+            </a:pPr>
+            <a:endParaRPr lang="en-US" sz="1600" dirty="0"/>
+          </a:p>
+          <a:p>
+            <a:pPr marL="285750" indent="-285750">
+              <a:lnSpc>
+                <a:spcPct val="120000"/>
+              </a:lnSpc>
+              <a:buFontTx/>
+              <a:buChar char="-"/>
+            </a:pPr>
+            <a:r>
+              <a:rPr lang="en-US" sz="1600" dirty="0"/>
+              <a:t>When creating a blueprint, we can create one from scratch where we define our own assignments, or we can select commonly used premade templates.</a:t>
+            </a:r>
+            <a:endParaRPr lang="en-GB" sz="1600" dirty="0"/>
+          </a:p>
+        </p:txBody>
+      </p:sp>
+      <p:pic>
+        <p:nvPicPr>
+          <p:cNvPr id="3" name="Picture 2">
+            <a:extLst>
+              <a:ext uri="{FF2B5EF4-FFF2-40B4-BE49-F238E27FC236}">
+                <a16:creationId xmlns:a16="http://schemas.microsoft.com/office/drawing/2014/main" id="{52FDF92F-790F-BFAA-5DF9-218F3DD4267D}"/>
+              </a:ext>
+            </a:extLst>
+          </p:cNvPr>
+          <p:cNvPicPr>
+            <a:picLocks noChangeAspect="1"/>
+          </p:cNvPicPr>
+          <p:nvPr/>
+        </p:nvPicPr>
+        <p:blipFill>
+          <a:blip r:embed="rId4"/>
+          <a:stretch>
+            <a:fillRect/>
+          </a:stretch>
+        </p:blipFill>
+        <p:spPr>
+          <a:xfrm>
+            <a:off x="5538707" y="1243336"/>
+            <a:ext cx="6309852" cy="5273305"/>
+          </a:xfrm>
+          <a:prstGeom prst="rect">
+            <a:avLst/>
+          </a:prstGeom>
+        </p:spPr>
+      </p:pic>
+    </p:spTree>
+    <p:extLst>
+      <p:ext uri="{BB962C8B-B14F-4D97-AF65-F5344CB8AC3E}">
+        <p14:creationId xmlns:p14="http://schemas.microsoft.com/office/powerpoint/2010/main" val="3241978008"/>
+      </p:ext>
+    </p:extLst>
+  </p:cSld>
+  <p:clrMapOvr>
+    <a:masterClrMapping/>
+  </p:clrMapOvr>
+</p:sld>
+</file>
+
+<file path=ppt/slides/slide45.xml><?xml version="1.0" encoding="utf-8"?>
+<p:sld xmlns:a="http://schemas.openxmlformats.org/drawingml/2006/main" xmlns:r="http://schemas.openxmlformats.org/officeDocument/2006/relationships" xmlns:p="http://schemas.openxmlformats.org/presentationml/2006/main">
+  <p:cSld>
+    <p:spTree>
+      <p:nvGrpSpPr>
+        <p:cNvPr id="1" name=""/>
+        <p:cNvGrpSpPr/>
+        <p:nvPr/>
+      </p:nvGrpSpPr>
+      <p:grpSpPr>
+        <a:xfrm>
+          <a:off x="0" y="0"/>
+          <a:ext cx="0" cy="0"/>
+          <a:chOff x="0" y="0"/>
+          <a:chExt cx="0" cy="0"/>
+        </a:xfrm>
+      </p:grpSpPr>
+      <p:grpSp>
+        <p:nvGrpSpPr>
+          <p:cNvPr id="18" name="Group 17">
+            <a:extLst>
+              <a:ext uri="{FF2B5EF4-FFF2-40B4-BE49-F238E27FC236}">
+                <a16:creationId xmlns:a16="http://schemas.microsoft.com/office/drawing/2014/main" id="{6185BE9B-87C8-4B46-9293-0E71CF17E76A}"/>
+              </a:ext>
+            </a:extLst>
+          </p:cNvPr>
+          <p:cNvGrpSpPr/>
+          <p:nvPr/>
+        </p:nvGrpSpPr>
+        <p:grpSpPr>
+          <a:xfrm>
+            <a:off x="99755" y="83129"/>
+            <a:ext cx="11953701" cy="872834"/>
+            <a:chOff x="99755" y="83129"/>
+            <a:chExt cx="11953701" cy="872834"/>
+          </a:xfrm>
+        </p:grpSpPr>
+        <p:cxnSp>
+          <p:nvCxnSpPr>
+            <p:cNvPr id="5" name="Straight Connector 4">
+              <a:extLst>
+                <a:ext uri="{FF2B5EF4-FFF2-40B4-BE49-F238E27FC236}">
+                  <a16:creationId xmlns:a16="http://schemas.microsoft.com/office/drawing/2014/main" id="{A8BE4EF8-406C-4035-940C-AB752B29BA18}"/>
+                </a:ext>
+              </a:extLst>
+            </p:cNvPr>
+            <p:cNvCxnSpPr/>
+            <p:nvPr/>
+          </p:nvCxnSpPr>
+          <p:spPr>
+            <a:xfrm>
+              <a:off x="99755" y="955963"/>
+              <a:ext cx="11953701" cy="0"/>
+            </a:xfrm>
+            <a:prstGeom prst="line">
+              <a:avLst/>
+            </a:prstGeom>
+            <a:ln w="19050">
+              <a:solidFill>
+                <a:srgbClr val="0072C6"/>
+              </a:solidFill>
+            </a:ln>
+          </p:spPr>
+          <p:style>
+            <a:lnRef idx="1">
+              <a:schemeClr val="accent1"/>
+            </a:lnRef>
+            <a:fillRef idx="0">
+              <a:schemeClr val="accent1"/>
+            </a:fillRef>
+            <a:effectRef idx="0">
+              <a:schemeClr val="accent1"/>
+            </a:effectRef>
+            <a:fontRef idx="minor">
+              <a:schemeClr val="tx1"/>
+            </a:fontRef>
+          </p:style>
+        </p:cxnSp>
+        <p:sp>
+          <p:nvSpPr>
+            <p:cNvPr id="8" name="TextBox 7">
+              <a:extLst>
+                <a:ext uri="{FF2B5EF4-FFF2-40B4-BE49-F238E27FC236}">
+                  <a16:creationId xmlns:a16="http://schemas.microsoft.com/office/drawing/2014/main" id="{C61B684E-FDA7-4625-9CC3-79C17CC59ED7}"/>
+                </a:ext>
+              </a:extLst>
+            </p:cNvPr>
+            <p:cNvSpPr txBox="1"/>
+            <p:nvPr/>
+          </p:nvSpPr>
+          <p:spPr>
+            <a:xfrm>
+              <a:off x="4372494" y="180818"/>
+              <a:ext cx="2686392" cy="369332"/>
+            </a:xfrm>
+            <a:prstGeom prst="rect">
+              <a:avLst/>
+            </a:prstGeom>
+            <a:noFill/>
+          </p:spPr>
+          <p:txBody>
+            <a:bodyPr wrap="square" rtlCol="0">
+              <a:spAutoFit/>
+            </a:bodyPr>
+            <a:lstStyle/>
+            <a:p>
+              <a:pPr marL="0" marR="0" lvl="0" indent="0" algn="l" defTabSz="914400" rtl="0" eaLnBrk="1" fontAlgn="auto" latinLnBrk="0" hangingPunct="1">
+                <a:lnSpc>
+                  <a:spcPct val="100000"/>
+                </a:lnSpc>
+                <a:spcBef>
+                  <a:spcPts val="0"/>
+                </a:spcBef>
+                <a:spcAft>
+                  <a:spcPts val="0"/>
+                </a:spcAft>
+                <a:buClrTx/>
+                <a:buSzTx/>
+                <a:buFontTx/>
+                <a:buNone/>
+                <a:tabLst/>
+                <a:defRPr/>
+              </a:pPr>
+              <a:r>
+                <a:rPr kumimoji="0" lang="en-GB" sz="1800" b="0" i="0" u="none" strike="noStrike" kern="1200" cap="none" spc="0" normalizeH="0" baseline="0" noProof="0" dirty="0">
+                  <a:ln>
+                    <a:noFill/>
+                  </a:ln>
+                  <a:solidFill>
+                    <a:prstClr val="black"/>
+                  </a:solidFill>
+                  <a:effectLst/>
+                  <a:uLnTx/>
+                  <a:uFillTx/>
+                  <a:latin typeface="Calibri" panose="020F0502020204030204"/>
+                  <a:ea typeface="+mn-ea"/>
+                  <a:cs typeface="+mn-cs"/>
+                </a:rPr>
+                <a:t>Azure Identity Services</a:t>
+              </a:r>
+            </a:p>
+          </p:txBody>
+        </p:sp>
+        <p:sp>
+          <p:nvSpPr>
+            <p:cNvPr id="9" name="TextBox 8">
+              <a:extLst>
+                <a:ext uri="{FF2B5EF4-FFF2-40B4-BE49-F238E27FC236}">
+                  <a16:creationId xmlns:a16="http://schemas.microsoft.com/office/drawing/2014/main" id="{F6943DFB-F258-4603-B2D8-7E2958123510}"/>
+                </a:ext>
+              </a:extLst>
+            </p:cNvPr>
+            <p:cNvSpPr txBox="1"/>
+            <p:nvPr/>
+          </p:nvSpPr>
+          <p:spPr>
+            <a:xfrm>
+              <a:off x="7197436" y="190641"/>
+              <a:ext cx="2155764" cy="369332"/>
+            </a:xfrm>
+            <a:prstGeom prst="rect">
+              <a:avLst/>
+            </a:prstGeom>
+            <a:noFill/>
+          </p:spPr>
+          <p:txBody>
+            <a:bodyPr wrap="square" rtlCol="0">
+              <a:spAutoFit/>
+            </a:bodyPr>
+            <a:lstStyle/>
+            <a:p>
+              <a:pPr marL="0" marR="0" lvl="0" indent="0" algn="l" defTabSz="914400" rtl="0" eaLnBrk="1" fontAlgn="auto" latinLnBrk="0" hangingPunct="1">
+                <a:lnSpc>
+                  <a:spcPct val="100000"/>
+                </a:lnSpc>
+                <a:spcBef>
+                  <a:spcPts val="0"/>
+                </a:spcBef>
+                <a:spcAft>
+                  <a:spcPts val="0"/>
+                </a:spcAft>
+                <a:buClrTx/>
+                <a:buSzTx/>
+                <a:buFontTx/>
+                <a:buNone/>
+                <a:tabLst/>
+                <a:defRPr/>
+              </a:pPr>
+              <a:r>
+                <a:rPr kumimoji="0" lang="en-GB" sz="1800" b="0" i="0" u="none" strike="noStrike" kern="1200" cap="none" spc="0" normalizeH="0" baseline="0" noProof="0" dirty="0">
+                  <a:ln>
+                    <a:noFill/>
+                  </a:ln>
+                  <a:solidFill>
+                    <a:prstClr val="black"/>
+                  </a:solidFill>
+                  <a:effectLst/>
+                  <a:uLnTx/>
+                  <a:uFillTx/>
+                  <a:latin typeface="Calibri" panose="020F0502020204030204"/>
+                  <a:ea typeface="+mn-ea"/>
+                  <a:cs typeface="+mn-cs"/>
+                </a:rPr>
+                <a:t>Section: 11.44</a:t>
+              </a:r>
+            </a:p>
+          </p:txBody>
+        </p:sp>
+        <p:sp>
+          <p:nvSpPr>
+            <p:cNvPr id="10" name="TextBox 9">
+              <a:extLst>
+                <a:ext uri="{FF2B5EF4-FFF2-40B4-BE49-F238E27FC236}">
+                  <a16:creationId xmlns:a16="http://schemas.microsoft.com/office/drawing/2014/main" id="{4E568F0D-7E90-4A0C-8070-6C806D992954}"/>
+                </a:ext>
+              </a:extLst>
+            </p:cNvPr>
+            <p:cNvSpPr txBox="1"/>
+            <p:nvPr/>
+          </p:nvSpPr>
+          <p:spPr>
+            <a:xfrm>
+              <a:off x="9534699" y="180818"/>
+              <a:ext cx="2155764" cy="369332"/>
+            </a:xfrm>
+            <a:prstGeom prst="rect">
+              <a:avLst/>
+            </a:prstGeom>
+            <a:noFill/>
+          </p:spPr>
+          <p:txBody>
+            <a:bodyPr wrap="square" rtlCol="0">
+              <a:spAutoFit/>
+            </a:bodyPr>
+            <a:lstStyle/>
+            <a:p>
+              <a:pPr marL="0" marR="0" lvl="0" indent="0" algn="l" defTabSz="914400" rtl="0" eaLnBrk="1" fontAlgn="auto" latinLnBrk="0" hangingPunct="1">
+                <a:lnSpc>
+                  <a:spcPct val="100000"/>
+                </a:lnSpc>
+                <a:spcBef>
+                  <a:spcPts val="0"/>
+                </a:spcBef>
+                <a:spcAft>
+                  <a:spcPts val="0"/>
+                </a:spcAft>
+                <a:buClrTx/>
+                <a:buSzTx/>
+                <a:buFontTx/>
+                <a:buNone/>
+                <a:tabLst/>
+                <a:defRPr/>
+              </a:pPr>
+              <a:r>
+                <a:rPr kumimoji="0" lang="en-GB" sz="1800" b="0" i="0" u="none" strike="noStrike" kern="1200" cap="none" spc="0" normalizeH="0" baseline="0" noProof="0" dirty="0">
+                  <a:ln>
+                    <a:noFill/>
+                  </a:ln>
+                  <a:solidFill>
+                    <a:prstClr val="black"/>
+                  </a:solidFill>
+                  <a:effectLst/>
+                  <a:uLnTx/>
+                  <a:uFillTx/>
+                  <a:latin typeface="Calibri" panose="020F0502020204030204"/>
+                  <a:ea typeface="+mn-ea"/>
+                  <a:cs typeface="+mn-cs"/>
+                </a:rPr>
+                <a:t>Date: 21/06/22 </a:t>
+              </a:r>
+            </a:p>
+          </p:txBody>
+        </p:sp>
+        <p:cxnSp>
+          <p:nvCxnSpPr>
+            <p:cNvPr id="11" name="Straight Connector 10">
+              <a:extLst>
+                <a:ext uri="{FF2B5EF4-FFF2-40B4-BE49-F238E27FC236}">
+                  <a16:creationId xmlns:a16="http://schemas.microsoft.com/office/drawing/2014/main" id="{F70ABCF3-BE60-426F-8C8C-059C854869C6}"/>
+                </a:ext>
+              </a:extLst>
+            </p:cNvPr>
+            <p:cNvCxnSpPr>
+              <a:cxnSpLocks/>
+            </p:cNvCxnSpPr>
+            <p:nvPr/>
+          </p:nvCxnSpPr>
+          <p:spPr>
+            <a:xfrm flipV="1">
+              <a:off x="4267202" y="93505"/>
+              <a:ext cx="1" cy="754394"/>
+            </a:xfrm>
+            <a:prstGeom prst="line">
+              <a:avLst/>
+            </a:prstGeom>
+            <a:ln w="19050">
+              <a:solidFill>
+                <a:srgbClr val="0072C6"/>
+              </a:solidFill>
+            </a:ln>
+          </p:spPr>
+          <p:style>
+            <a:lnRef idx="1">
+              <a:schemeClr val="accent1"/>
+            </a:lnRef>
+            <a:fillRef idx="0">
+              <a:schemeClr val="accent1"/>
+            </a:fillRef>
+            <a:effectRef idx="0">
+              <a:schemeClr val="accent1"/>
+            </a:effectRef>
+            <a:fontRef idx="minor">
+              <a:schemeClr val="tx1"/>
+            </a:fontRef>
+          </p:style>
+        </p:cxnSp>
+        <p:cxnSp>
+          <p:nvCxnSpPr>
+            <p:cNvPr id="15" name="Straight Connector 14">
+              <a:extLst>
+                <a:ext uri="{FF2B5EF4-FFF2-40B4-BE49-F238E27FC236}">
+                  <a16:creationId xmlns:a16="http://schemas.microsoft.com/office/drawing/2014/main" id="{D7F750D7-69E5-4FC3-AFB5-134C7587DE8B}"/>
+                </a:ext>
+              </a:extLst>
+            </p:cNvPr>
+            <p:cNvCxnSpPr>
+              <a:cxnSpLocks/>
+            </p:cNvCxnSpPr>
+            <p:nvPr/>
+          </p:nvCxnSpPr>
+          <p:spPr>
+            <a:xfrm flipV="1">
+              <a:off x="7154489" y="88317"/>
+              <a:ext cx="1" cy="754394"/>
+            </a:xfrm>
+            <a:prstGeom prst="line">
+              <a:avLst/>
+            </a:prstGeom>
+            <a:ln w="19050">
+              <a:solidFill>
+                <a:srgbClr val="0072C6"/>
+              </a:solidFill>
+            </a:ln>
+          </p:spPr>
+          <p:style>
+            <a:lnRef idx="1">
+              <a:schemeClr val="accent1"/>
+            </a:lnRef>
+            <a:fillRef idx="0">
+              <a:schemeClr val="accent1"/>
+            </a:fillRef>
+            <a:effectRef idx="0">
+              <a:schemeClr val="accent1"/>
+            </a:effectRef>
+            <a:fontRef idx="minor">
+              <a:schemeClr val="tx1"/>
+            </a:fontRef>
+          </p:style>
+        </p:cxnSp>
+        <p:cxnSp>
+          <p:nvCxnSpPr>
+            <p:cNvPr id="16" name="Straight Connector 15">
+              <a:extLst>
+                <a:ext uri="{FF2B5EF4-FFF2-40B4-BE49-F238E27FC236}">
+                  <a16:creationId xmlns:a16="http://schemas.microsoft.com/office/drawing/2014/main" id="{90F03633-4CAB-4B57-BF94-CF91E87AB7AE}"/>
+                </a:ext>
+              </a:extLst>
+            </p:cNvPr>
+            <p:cNvCxnSpPr>
+              <a:cxnSpLocks/>
+            </p:cNvCxnSpPr>
+            <p:nvPr/>
+          </p:nvCxnSpPr>
+          <p:spPr>
+            <a:xfrm flipV="1">
+              <a:off x="9491750" y="83129"/>
+              <a:ext cx="1" cy="754394"/>
+            </a:xfrm>
+            <a:prstGeom prst="line">
+              <a:avLst/>
+            </a:prstGeom>
+            <a:ln w="19050">
+              <a:solidFill>
+                <a:srgbClr val="0072C6"/>
+              </a:solidFill>
+            </a:ln>
+          </p:spPr>
+          <p:style>
+            <a:lnRef idx="1">
+              <a:schemeClr val="accent1"/>
+            </a:lnRef>
+            <a:fillRef idx="0">
+              <a:schemeClr val="accent1"/>
+            </a:fillRef>
+            <a:effectRef idx="0">
+              <a:schemeClr val="accent1"/>
+            </a:effectRef>
+            <a:fontRef idx="minor">
+              <a:schemeClr val="tx1"/>
+            </a:fontRef>
+          </p:style>
+        </p:cxnSp>
+      </p:grpSp>
+      <p:pic>
+        <p:nvPicPr>
+          <p:cNvPr id="20" name="Picture 2">
+            <a:extLst>
+              <a:ext uri="{FF2B5EF4-FFF2-40B4-BE49-F238E27FC236}">
+                <a16:creationId xmlns:a16="http://schemas.microsoft.com/office/drawing/2014/main" id="{775211BE-DA3A-41DA-8578-4E52F07B6AB9}"/>
+              </a:ext>
+            </a:extLst>
+          </p:cNvPr>
+          <p:cNvPicPr>
+            <a:picLocks noChangeAspect="1" noChangeArrowheads="1"/>
+          </p:cNvPicPr>
+          <p:nvPr/>
+        </p:nvPicPr>
+        <p:blipFill>
+          <a:blip r:embed="rId2">
+            <a:extLst>
+              <a:ext uri="{28A0092B-C50C-407E-A947-70E740481C1C}">
+                <a14:useLocalDpi xmlns:a14="http://schemas.microsoft.com/office/drawing/2010/main" val="0"/>
+              </a:ext>
+            </a:extLst>
+          </a:blip>
+          <a:srcRect/>
+          <a:stretch>
+            <a:fillRect/>
+          </a:stretch>
+        </p:blipFill>
+        <p:spPr bwMode="auto">
+          <a:xfrm>
+            <a:off x="144770" y="111976"/>
+            <a:ext cx="725548" cy="725548"/>
+          </a:xfrm>
+          <a:prstGeom prst="rect">
+            <a:avLst/>
+          </a:prstGeom>
+          <a:noFill/>
+          <a:extLst>
+            <a:ext uri="{909E8E84-426E-40DD-AFC4-6F175D3DCCD1}">
+              <a14:hiddenFill xmlns:a14="http://schemas.microsoft.com/office/drawing/2010/main">
+                <a:solidFill>
+                  <a:srgbClr val="FFFFFF"/>
+                </a:solidFill>
+              </a14:hiddenFill>
+            </a:ext>
+          </a:extLst>
+        </p:spPr>
+      </p:pic>
+      <p:sp>
+        <p:nvSpPr>
+          <p:cNvPr id="21" name="TextBox 20">
+            <a:extLst>
+              <a:ext uri="{FF2B5EF4-FFF2-40B4-BE49-F238E27FC236}">
+                <a16:creationId xmlns:a16="http://schemas.microsoft.com/office/drawing/2014/main" id="{30404CBF-C3F9-43E0-81FA-E9D4D01BC004}"/>
+              </a:ext>
+            </a:extLst>
+          </p:cNvPr>
+          <p:cNvSpPr txBox="1"/>
+          <p:nvPr/>
+        </p:nvSpPr>
+        <p:spPr>
+          <a:xfrm>
+            <a:off x="914402" y="191193"/>
+            <a:ext cx="3483032" cy="646331"/>
+          </a:xfrm>
+          <a:prstGeom prst="rect">
+            <a:avLst/>
+          </a:prstGeom>
+          <a:noFill/>
+        </p:spPr>
+        <p:txBody>
+          <a:bodyPr wrap="square" rtlCol="0">
+            <a:spAutoFit/>
+          </a:bodyPr>
+          <a:lstStyle/>
+          <a:p>
+            <a:pPr marL="0" marR="0" lvl="0" indent="0" algn="l" defTabSz="914400" rtl="0" eaLnBrk="1" fontAlgn="auto" latinLnBrk="0" hangingPunct="1">
+              <a:lnSpc>
+                <a:spcPct val="100000"/>
+              </a:lnSpc>
+              <a:spcBef>
+                <a:spcPts val="0"/>
+              </a:spcBef>
+              <a:spcAft>
+                <a:spcPts val="0"/>
+              </a:spcAft>
+              <a:buClrTx/>
+              <a:buSzTx/>
+              <a:buFontTx/>
+              <a:buNone/>
+              <a:tabLst/>
+              <a:defRPr/>
+            </a:pPr>
+            <a:r>
+              <a:rPr kumimoji="0" lang="en-GB" sz="1800" b="0" i="0" u="none" strike="noStrike" kern="1200" cap="none" spc="0" normalizeH="0" baseline="0" noProof="0" dirty="0">
+                <a:ln>
+                  <a:noFill/>
+                </a:ln>
+                <a:solidFill>
+                  <a:prstClr val="black"/>
+                </a:solidFill>
+                <a:effectLst/>
+                <a:uLnTx/>
+                <a:uFillTx/>
+                <a:latin typeface="Calibri" panose="020F0502020204030204"/>
+                <a:ea typeface="+mn-ea"/>
+                <a:cs typeface="+mn-cs"/>
+              </a:rPr>
+              <a:t>AZ-900 Microsoft Azure Fundamentals</a:t>
+            </a:r>
+          </a:p>
+        </p:txBody>
+      </p:sp>
+      <p:sp>
+        <p:nvSpPr>
+          <p:cNvPr id="12" name="TextBox 11">
+            <a:extLst>
+              <a:ext uri="{FF2B5EF4-FFF2-40B4-BE49-F238E27FC236}">
+                <a16:creationId xmlns:a16="http://schemas.microsoft.com/office/drawing/2014/main" id="{A48842C8-EFC7-F1D7-CA9F-9D69E7C11F18}"/>
+              </a:ext>
+            </a:extLst>
+          </p:cNvPr>
+          <p:cNvSpPr txBox="1"/>
+          <p:nvPr/>
+        </p:nvSpPr>
+        <p:spPr>
+          <a:xfrm>
+            <a:off x="343441" y="1163750"/>
+            <a:ext cx="11611136" cy="1549911"/>
+          </a:xfrm>
+          <a:prstGeom prst="rect">
+            <a:avLst/>
+          </a:prstGeom>
+          <a:noFill/>
+        </p:spPr>
+        <p:txBody>
+          <a:bodyPr wrap="square" rtlCol="0">
+            <a:spAutoFit/>
+          </a:bodyPr>
+          <a:lstStyle/>
+          <a:p>
+            <a:pPr>
+              <a:lnSpc>
+                <a:spcPct val="120000"/>
+              </a:lnSpc>
+            </a:pPr>
+            <a:r>
+              <a:rPr lang="en-GB" sz="1600" b="1" dirty="0"/>
+              <a:t>1. Create the Blueprint</a:t>
+            </a:r>
+          </a:p>
+          <a:p>
+            <a:pPr>
+              <a:lnSpc>
+                <a:spcPct val="120000"/>
+              </a:lnSpc>
+            </a:pPr>
+            <a:endParaRPr lang="en-GB" sz="1600" b="1" dirty="0"/>
+          </a:p>
+          <a:p>
+            <a:pPr marL="285750" indent="-285750">
+              <a:lnSpc>
+                <a:spcPct val="120000"/>
+              </a:lnSpc>
+              <a:buFontTx/>
+              <a:buChar char="-"/>
+            </a:pPr>
+            <a:r>
+              <a:rPr lang="en-GB" sz="1600" dirty="0"/>
+              <a:t>Here we have created a blueprint from scratch.</a:t>
+            </a:r>
+          </a:p>
+          <a:p>
+            <a:pPr marL="285750" indent="-285750">
+              <a:lnSpc>
+                <a:spcPct val="120000"/>
+              </a:lnSpc>
+              <a:buFontTx/>
+              <a:buChar char="-"/>
+            </a:pPr>
+            <a:r>
+              <a:rPr lang="en-GB" sz="1600" dirty="0"/>
+              <a:t>We’ve added a set of fields that need to be filled in and specified that a storage account is to be created.</a:t>
+            </a:r>
+          </a:p>
+          <a:p>
+            <a:pPr>
+              <a:lnSpc>
+                <a:spcPct val="120000"/>
+              </a:lnSpc>
+            </a:pPr>
+            <a:endParaRPr lang="en-GB" sz="1600" dirty="0"/>
+          </a:p>
+        </p:txBody>
+      </p:sp>
+      <p:pic>
+        <p:nvPicPr>
+          <p:cNvPr id="4" name="Picture 3">
+            <a:extLst>
+              <a:ext uri="{FF2B5EF4-FFF2-40B4-BE49-F238E27FC236}">
+                <a16:creationId xmlns:a16="http://schemas.microsoft.com/office/drawing/2014/main" id="{3DD8CDDC-7B61-724E-8DB6-5ECCF0FE3BB2}"/>
+              </a:ext>
+            </a:extLst>
+          </p:cNvPr>
+          <p:cNvPicPr>
+            <a:picLocks noChangeAspect="1"/>
+          </p:cNvPicPr>
+          <p:nvPr/>
+        </p:nvPicPr>
+        <p:blipFill>
+          <a:blip r:embed="rId3"/>
+          <a:stretch>
+            <a:fillRect/>
+          </a:stretch>
+        </p:blipFill>
+        <p:spPr>
+          <a:xfrm>
+            <a:off x="424357" y="3429000"/>
+            <a:ext cx="11343286" cy="3141218"/>
+          </a:xfrm>
+          <a:prstGeom prst="rect">
+            <a:avLst/>
+          </a:prstGeom>
+        </p:spPr>
+      </p:pic>
+    </p:spTree>
+    <p:extLst>
+      <p:ext uri="{BB962C8B-B14F-4D97-AF65-F5344CB8AC3E}">
+        <p14:creationId xmlns:p14="http://schemas.microsoft.com/office/powerpoint/2010/main" val="4000759058"/>
+      </p:ext>
+    </p:extLst>
+  </p:cSld>
+  <p:clrMapOvr>
+    <a:masterClrMapping/>
+  </p:clrMapOvr>
+</p:sld>
+</file>
+
+<file path=ppt/slides/slide46.xml><?xml version="1.0" encoding="utf-8"?>
+<p:sld xmlns:a="http://schemas.openxmlformats.org/drawingml/2006/main" xmlns:r="http://schemas.openxmlformats.org/officeDocument/2006/relationships" xmlns:p="http://schemas.openxmlformats.org/presentationml/2006/main">
+  <p:cSld>
+    <p:spTree>
+      <p:nvGrpSpPr>
+        <p:cNvPr id="1" name=""/>
+        <p:cNvGrpSpPr/>
+        <p:nvPr/>
+      </p:nvGrpSpPr>
+      <p:grpSpPr>
+        <a:xfrm>
+          <a:off x="0" y="0"/>
+          <a:ext cx="0" cy="0"/>
+          <a:chOff x="0" y="0"/>
+          <a:chExt cx="0" cy="0"/>
+        </a:xfrm>
+      </p:grpSpPr>
+      <p:grpSp>
+        <p:nvGrpSpPr>
+          <p:cNvPr id="18" name="Group 17">
+            <a:extLst>
+              <a:ext uri="{FF2B5EF4-FFF2-40B4-BE49-F238E27FC236}">
+                <a16:creationId xmlns:a16="http://schemas.microsoft.com/office/drawing/2014/main" id="{6185BE9B-87C8-4B46-9293-0E71CF17E76A}"/>
+              </a:ext>
+            </a:extLst>
+          </p:cNvPr>
+          <p:cNvGrpSpPr/>
+          <p:nvPr/>
+        </p:nvGrpSpPr>
+        <p:grpSpPr>
+          <a:xfrm>
+            <a:off x="99755" y="83129"/>
+            <a:ext cx="11953701" cy="872834"/>
+            <a:chOff x="99755" y="83129"/>
+            <a:chExt cx="11953701" cy="872834"/>
+          </a:xfrm>
+        </p:grpSpPr>
+        <p:cxnSp>
+          <p:nvCxnSpPr>
+            <p:cNvPr id="5" name="Straight Connector 4">
+              <a:extLst>
+                <a:ext uri="{FF2B5EF4-FFF2-40B4-BE49-F238E27FC236}">
+                  <a16:creationId xmlns:a16="http://schemas.microsoft.com/office/drawing/2014/main" id="{A8BE4EF8-406C-4035-940C-AB752B29BA18}"/>
+                </a:ext>
+              </a:extLst>
+            </p:cNvPr>
+            <p:cNvCxnSpPr/>
+            <p:nvPr/>
+          </p:nvCxnSpPr>
+          <p:spPr>
+            <a:xfrm>
+              <a:off x="99755" y="955963"/>
+              <a:ext cx="11953701" cy="0"/>
+            </a:xfrm>
+            <a:prstGeom prst="line">
+              <a:avLst/>
+            </a:prstGeom>
+            <a:ln w="19050">
+              <a:solidFill>
+                <a:srgbClr val="0072C6"/>
+              </a:solidFill>
+            </a:ln>
+          </p:spPr>
+          <p:style>
+            <a:lnRef idx="1">
+              <a:schemeClr val="accent1"/>
+            </a:lnRef>
+            <a:fillRef idx="0">
+              <a:schemeClr val="accent1"/>
+            </a:fillRef>
+            <a:effectRef idx="0">
+              <a:schemeClr val="accent1"/>
+            </a:effectRef>
+            <a:fontRef idx="minor">
+              <a:schemeClr val="tx1"/>
+            </a:fontRef>
+          </p:style>
+        </p:cxnSp>
+        <p:sp>
+          <p:nvSpPr>
+            <p:cNvPr id="8" name="TextBox 7">
+              <a:extLst>
+                <a:ext uri="{FF2B5EF4-FFF2-40B4-BE49-F238E27FC236}">
+                  <a16:creationId xmlns:a16="http://schemas.microsoft.com/office/drawing/2014/main" id="{C61B684E-FDA7-4625-9CC3-79C17CC59ED7}"/>
+                </a:ext>
+              </a:extLst>
+            </p:cNvPr>
+            <p:cNvSpPr txBox="1"/>
+            <p:nvPr/>
+          </p:nvSpPr>
+          <p:spPr>
+            <a:xfrm>
+              <a:off x="4372494" y="180818"/>
+              <a:ext cx="2686392" cy="369332"/>
+            </a:xfrm>
+            <a:prstGeom prst="rect">
+              <a:avLst/>
+            </a:prstGeom>
+            <a:noFill/>
+          </p:spPr>
+          <p:txBody>
+            <a:bodyPr wrap="square" rtlCol="0">
+              <a:spAutoFit/>
+            </a:bodyPr>
+            <a:lstStyle/>
+            <a:p>
+              <a:pPr marL="0" marR="0" lvl="0" indent="0" algn="l" defTabSz="914400" rtl="0" eaLnBrk="1" fontAlgn="auto" latinLnBrk="0" hangingPunct="1">
+                <a:lnSpc>
+                  <a:spcPct val="100000"/>
+                </a:lnSpc>
+                <a:spcBef>
+                  <a:spcPts val="0"/>
+                </a:spcBef>
+                <a:spcAft>
+                  <a:spcPts val="0"/>
+                </a:spcAft>
+                <a:buClrTx/>
+                <a:buSzTx/>
+                <a:buFontTx/>
+                <a:buNone/>
+                <a:tabLst/>
+                <a:defRPr/>
+              </a:pPr>
+              <a:r>
+                <a:rPr kumimoji="0" lang="en-GB" sz="1800" b="0" i="0" u="none" strike="noStrike" kern="1200" cap="none" spc="0" normalizeH="0" baseline="0" noProof="0" dirty="0">
+                  <a:ln>
+                    <a:noFill/>
+                  </a:ln>
+                  <a:solidFill>
+                    <a:prstClr val="black"/>
+                  </a:solidFill>
+                  <a:effectLst/>
+                  <a:uLnTx/>
+                  <a:uFillTx/>
+                  <a:latin typeface="Calibri" panose="020F0502020204030204"/>
+                  <a:ea typeface="+mn-ea"/>
+                  <a:cs typeface="+mn-cs"/>
+                </a:rPr>
+                <a:t>Azure Identity Services</a:t>
+              </a:r>
+            </a:p>
+          </p:txBody>
+        </p:sp>
+        <p:sp>
+          <p:nvSpPr>
+            <p:cNvPr id="9" name="TextBox 8">
+              <a:extLst>
+                <a:ext uri="{FF2B5EF4-FFF2-40B4-BE49-F238E27FC236}">
+                  <a16:creationId xmlns:a16="http://schemas.microsoft.com/office/drawing/2014/main" id="{F6943DFB-F258-4603-B2D8-7E2958123510}"/>
+                </a:ext>
+              </a:extLst>
+            </p:cNvPr>
+            <p:cNvSpPr txBox="1"/>
+            <p:nvPr/>
+          </p:nvSpPr>
+          <p:spPr>
+            <a:xfrm>
+              <a:off x="7197436" y="190641"/>
+              <a:ext cx="2155764" cy="369332"/>
+            </a:xfrm>
+            <a:prstGeom prst="rect">
+              <a:avLst/>
+            </a:prstGeom>
+            <a:noFill/>
+          </p:spPr>
+          <p:txBody>
+            <a:bodyPr wrap="square" rtlCol="0">
+              <a:spAutoFit/>
+            </a:bodyPr>
+            <a:lstStyle/>
+            <a:p>
+              <a:pPr marL="0" marR="0" lvl="0" indent="0" algn="l" defTabSz="914400" rtl="0" eaLnBrk="1" fontAlgn="auto" latinLnBrk="0" hangingPunct="1">
+                <a:lnSpc>
+                  <a:spcPct val="100000"/>
+                </a:lnSpc>
+                <a:spcBef>
+                  <a:spcPts val="0"/>
+                </a:spcBef>
+                <a:spcAft>
+                  <a:spcPts val="0"/>
+                </a:spcAft>
+                <a:buClrTx/>
+                <a:buSzTx/>
+                <a:buFontTx/>
+                <a:buNone/>
+                <a:tabLst/>
+                <a:defRPr/>
+              </a:pPr>
+              <a:r>
+                <a:rPr kumimoji="0" lang="en-GB" sz="1800" b="0" i="0" u="none" strike="noStrike" kern="1200" cap="none" spc="0" normalizeH="0" baseline="0" noProof="0" dirty="0">
+                  <a:ln>
+                    <a:noFill/>
+                  </a:ln>
+                  <a:solidFill>
+                    <a:prstClr val="black"/>
+                  </a:solidFill>
+                  <a:effectLst/>
+                  <a:uLnTx/>
+                  <a:uFillTx/>
+                  <a:latin typeface="Calibri" panose="020F0502020204030204"/>
+                  <a:ea typeface="+mn-ea"/>
+                  <a:cs typeface="+mn-cs"/>
+                </a:rPr>
+                <a:t>Section: 11.44</a:t>
+              </a:r>
+            </a:p>
+          </p:txBody>
+        </p:sp>
+        <p:sp>
+          <p:nvSpPr>
+            <p:cNvPr id="10" name="TextBox 9">
+              <a:extLst>
+                <a:ext uri="{FF2B5EF4-FFF2-40B4-BE49-F238E27FC236}">
+                  <a16:creationId xmlns:a16="http://schemas.microsoft.com/office/drawing/2014/main" id="{4E568F0D-7E90-4A0C-8070-6C806D992954}"/>
+                </a:ext>
+              </a:extLst>
+            </p:cNvPr>
+            <p:cNvSpPr txBox="1"/>
+            <p:nvPr/>
+          </p:nvSpPr>
+          <p:spPr>
+            <a:xfrm>
+              <a:off x="9534699" y="180818"/>
+              <a:ext cx="2155764" cy="369332"/>
+            </a:xfrm>
+            <a:prstGeom prst="rect">
+              <a:avLst/>
+            </a:prstGeom>
+            <a:noFill/>
+          </p:spPr>
+          <p:txBody>
+            <a:bodyPr wrap="square" rtlCol="0">
+              <a:spAutoFit/>
+            </a:bodyPr>
+            <a:lstStyle/>
+            <a:p>
+              <a:pPr marL="0" marR="0" lvl="0" indent="0" algn="l" defTabSz="914400" rtl="0" eaLnBrk="1" fontAlgn="auto" latinLnBrk="0" hangingPunct="1">
+                <a:lnSpc>
+                  <a:spcPct val="100000"/>
+                </a:lnSpc>
+                <a:spcBef>
+                  <a:spcPts val="0"/>
+                </a:spcBef>
+                <a:spcAft>
+                  <a:spcPts val="0"/>
+                </a:spcAft>
+                <a:buClrTx/>
+                <a:buSzTx/>
+                <a:buFontTx/>
+                <a:buNone/>
+                <a:tabLst/>
+                <a:defRPr/>
+              </a:pPr>
+              <a:r>
+                <a:rPr kumimoji="0" lang="en-GB" sz="1800" b="0" i="0" u="none" strike="noStrike" kern="1200" cap="none" spc="0" normalizeH="0" baseline="0" noProof="0" dirty="0">
+                  <a:ln>
+                    <a:noFill/>
+                  </a:ln>
+                  <a:solidFill>
+                    <a:prstClr val="black"/>
+                  </a:solidFill>
+                  <a:effectLst/>
+                  <a:uLnTx/>
+                  <a:uFillTx/>
+                  <a:latin typeface="Calibri" panose="020F0502020204030204"/>
+                  <a:ea typeface="+mn-ea"/>
+                  <a:cs typeface="+mn-cs"/>
+                </a:rPr>
+                <a:t>Date: 21/06/22 </a:t>
+              </a:r>
+            </a:p>
+          </p:txBody>
+        </p:sp>
+        <p:cxnSp>
+          <p:nvCxnSpPr>
+            <p:cNvPr id="11" name="Straight Connector 10">
+              <a:extLst>
+                <a:ext uri="{FF2B5EF4-FFF2-40B4-BE49-F238E27FC236}">
+                  <a16:creationId xmlns:a16="http://schemas.microsoft.com/office/drawing/2014/main" id="{F70ABCF3-BE60-426F-8C8C-059C854869C6}"/>
+                </a:ext>
+              </a:extLst>
+            </p:cNvPr>
+            <p:cNvCxnSpPr>
+              <a:cxnSpLocks/>
+            </p:cNvCxnSpPr>
+            <p:nvPr/>
+          </p:nvCxnSpPr>
+          <p:spPr>
+            <a:xfrm flipV="1">
+              <a:off x="4267202" y="93505"/>
+              <a:ext cx="1" cy="754394"/>
+            </a:xfrm>
+            <a:prstGeom prst="line">
+              <a:avLst/>
+            </a:prstGeom>
+            <a:ln w="19050">
+              <a:solidFill>
+                <a:srgbClr val="0072C6"/>
+              </a:solidFill>
+            </a:ln>
+          </p:spPr>
+          <p:style>
+            <a:lnRef idx="1">
+              <a:schemeClr val="accent1"/>
+            </a:lnRef>
+            <a:fillRef idx="0">
+              <a:schemeClr val="accent1"/>
+            </a:fillRef>
+            <a:effectRef idx="0">
+              <a:schemeClr val="accent1"/>
+            </a:effectRef>
+            <a:fontRef idx="minor">
+              <a:schemeClr val="tx1"/>
+            </a:fontRef>
+          </p:style>
+        </p:cxnSp>
+        <p:cxnSp>
+          <p:nvCxnSpPr>
+            <p:cNvPr id="15" name="Straight Connector 14">
+              <a:extLst>
+                <a:ext uri="{FF2B5EF4-FFF2-40B4-BE49-F238E27FC236}">
+                  <a16:creationId xmlns:a16="http://schemas.microsoft.com/office/drawing/2014/main" id="{D7F750D7-69E5-4FC3-AFB5-134C7587DE8B}"/>
+                </a:ext>
+              </a:extLst>
+            </p:cNvPr>
+            <p:cNvCxnSpPr>
+              <a:cxnSpLocks/>
+            </p:cNvCxnSpPr>
+            <p:nvPr/>
+          </p:nvCxnSpPr>
+          <p:spPr>
+            <a:xfrm flipV="1">
+              <a:off x="7154489" y="88317"/>
+              <a:ext cx="1" cy="754394"/>
+            </a:xfrm>
+            <a:prstGeom prst="line">
+              <a:avLst/>
+            </a:prstGeom>
+            <a:ln w="19050">
+              <a:solidFill>
+                <a:srgbClr val="0072C6"/>
+              </a:solidFill>
+            </a:ln>
+          </p:spPr>
+          <p:style>
+            <a:lnRef idx="1">
+              <a:schemeClr val="accent1"/>
+            </a:lnRef>
+            <a:fillRef idx="0">
+              <a:schemeClr val="accent1"/>
+            </a:fillRef>
+            <a:effectRef idx="0">
+              <a:schemeClr val="accent1"/>
+            </a:effectRef>
+            <a:fontRef idx="minor">
+              <a:schemeClr val="tx1"/>
+            </a:fontRef>
+          </p:style>
+        </p:cxnSp>
+        <p:cxnSp>
+          <p:nvCxnSpPr>
+            <p:cNvPr id="16" name="Straight Connector 15">
+              <a:extLst>
+                <a:ext uri="{FF2B5EF4-FFF2-40B4-BE49-F238E27FC236}">
+                  <a16:creationId xmlns:a16="http://schemas.microsoft.com/office/drawing/2014/main" id="{90F03633-4CAB-4B57-BF94-CF91E87AB7AE}"/>
+                </a:ext>
+              </a:extLst>
+            </p:cNvPr>
+            <p:cNvCxnSpPr>
+              <a:cxnSpLocks/>
+            </p:cNvCxnSpPr>
+            <p:nvPr/>
+          </p:nvCxnSpPr>
+          <p:spPr>
+            <a:xfrm flipV="1">
+              <a:off x="9491750" y="83129"/>
+              <a:ext cx="1" cy="754394"/>
+            </a:xfrm>
+            <a:prstGeom prst="line">
+              <a:avLst/>
+            </a:prstGeom>
+            <a:ln w="19050">
+              <a:solidFill>
+                <a:srgbClr val="0072C6"/>
+              </a:solidFill>
+            </a:ln>
+          </p:spPr>
+          <p:style>
+            <a:lnRef idx="1">
+              <a:schemeClr val="accent1"/>
+            </a:lnRef>
+            <a:fillRef idx="0">
+              <a:schemeClr val="accent1"/>
+            </a:fillRef>
+            <a:effectRef idx="0">
+              <a:schemeClr val="accent1"/>
+            </a:effectRef>
+            <a:fontRef idx="minor">
+              <a:schemeClr val="tx1"/>
+            </a:fontRef>
+          </p:style>
+        </p:cxnSp>
+      </p:grpSp>
+      <p:pic>
+        <p:nvPicPr>
+          <p:cNvPr id="20" name="Picture 2">
+            <a:extLst>
+              <a:ext uri="{FF2B5EF4-FFF2-40B4-BE49-F238E27FC236}">
+                <a16:creationId xmlns:a16="http://schemas.microsoft.com/office/drawing/2014/main" id="{775211BE-DA3A-41DA-8578-4E52F07B6AB9}"/>
+              </a:ext>
+            </a:extLst>
+          </p:cNvPr>
+          <p:cNvPicPr>
+            <a:picLocks noChangeAspect="1" noChangeArrowheads="1"/>
+          </p:cNvPicPr>
+          <p:nvPr/>
+        </p:nvPicPr>
+        <p:blipFill>
+          <a:blip r:embed="rId2">
+            <a:extLst>
+              <a:ext uri="{28A0092B-C50C-407E-A947-70E740481C1C}">
+                <a14:useLocalDpi xmlns:a14="http://schemas.microsoft.com/office/drawing/2010/main" val="0"/>
+              </a:ext>
+            </a:extLst>
+          </a:blip>
+          <a:srcRect/>
+          <a:stretch>
+            <a:fillRect/>
+          </a:stretch>
+        </p:blipFill>
+        <p:spPr bwMode="auto">
+          <a:xfrm>
+            <a:off x="144770" y="111976"/>
+            <a:ext cx="725548" cy="725548"/>
+          </a:xfrm>
+          <a:prstGeom prst="rect">
+            <a:avLst/>
+          </a:prstGeom>
+          <a:noFill/>
+          <a:extLst>
+            <a:ext uri="{909E8E84-426E-40DD-AFC4-6F175D3DCCD1}">
+              <a14:hiddenFill xmlns:a14="http://schemas.microsoft.com/office/drawing/2010/main">
+                <a:solidFill>
+                  <a:srgbClr val="FFFFFF"/>
+                </a:solidFill>
+              </a14:hiddenFill>
+            </a:ext>
+          </a:extLst>
+        </p:spPr>
+      </p:pic>
+      <p:sp>
+        <p:nvSpPr>
+          <p:cNvPr id="21" name="TextBox 20">
+            <a:extLst>
+              <a:ext uri="{FF2B5EF4-FFF2-40B4-BE49-F238E27FC236}">
+                <a16:creationId xmlns:a16="http://schemas.microsoft.com/office/drawing/2014/main" id="{30404CBF-C3F9-43E0-81FA-E9D4D01BC004}"/>
+              </a:ext>
+            </a:extLst>
+          </p:cNvPr>
+          <p:cNvSpPr txBox="1"/>
+          <p:nvPr/>
+        </p:nvSpPr>
+        <p:spPr>
+          <a:xfrm>
+            <a:off x="914402" y="191193"/>
+            <a:ext cx="3483032" cy="646331"/>
+          </a:xfrm>
+          <a:prstGeom prst="rect">
+            <a:avLst/>
+          </a:prstGeom>
+          <a:noFill/>
+        </p:spPr>
+        <p:txBody>
+          <a:bodyPr wrap="square" rtlCol="0">
+            <a:spAutoFit/>
+          </a:bodyPr>
+          <a:lstStyle/>
+          <a:p>
+            <a:pPr marL="0" marR="0" lvl="0" indent="0" algn="l" defTabSz="914400" rtl="0" eaLnBrk="1" fontAlgn="auto" latinLnBrk="0" hangingPunct="1">
+              <a:lnSpc>
+                <a:spcPct val="100000"/>
+              </a:lnSpc>
+              <a:spcBef>
+                <a:spcPts val="0"/>
+              </a:spcBef>
+              <a:spcAft>
+                <a:spcPts val="0"/>
+              </a:spcAft>
+              <a:buClrTx/>
+              <a:buSzTx/>
+              <a:buFontTx/>
+              <a:buNone/>
+              <a:tabLst/>
+              <a:defRPr/>
+            </a:pPr>
+            <a:r>
+              <a:rPr kumimoji="0" lang="en-GB" sz="1800" b="0" i="0" u="none" strike="noStrike" kern="1200" cap="none" spc="0" normalizeH="0" baseline="0" noProof="0" dirty="0">
+                <a:ln>
+                  <a:noFill/>
+                </a:ln>
+                <a:solidFill>
+                  <a:prstClr val="black"/>
+                </a:solidFill>
+                <a:effectLst/>
+                <a:uLnTx/>
+                <a:uFillTx/>
+                <a:latin typeface="Calibri" panose="020F0502020204030204"/>
+                <a:ea typeface="+mn-ea"/>
+                <a:cs typeface="+mn-cs"/>
+              </a:rPr>
+              <a:t>AZ-900 Microsoft Azure Fundamentals</a:t>
+            </a:r>
+          </a:p>
+        </p:txBody>
+      </p:sp>
+      <p:pic>
+        <p:nvPicPr>
+          <p:cNvPr id="14" name="Picture 13">
+            <a:extLst>
+              <a:ext uri="{FF2B5EF4-FFF2-40B4-BE49-F238E27FC236}">
+                <a16:creationId xmlns:a16="http://schemas.microsoft.com/office/drawing/2014/main" id="{FE601650-9F3C-38A5-7925-3CFCC56B4700}"/>
+              </a:ext>
+            </a:extLst>
+          </p:cNvPr>
+          <p:cNvPicPr>
+            <a:picLocks noChangeAspect="1"/>
+          </p:cNvPicPr>
+          <p:nvPr/>
+        </p:nvPicPr>
+        <p:blipFill>
+          <a:blip r:embed="rId3"/>
+          <a:stretch>
+            <a:fillRect/>
+          </a:stretch>
+        </p:blipFill>
+        <p:spPr>
+          <a:xfrm>
+            <a:off x="2655918" y="2633159"/>
+            <a:ext cx="7372812" cy="3947770"/>
+          </a:xfrm>
+          <a:prstGeom prst="rect">
+            <a:avLst/>
+          </a:prstGeom>
+        </p:spPr>
+      </p:pic>
+      <p:sp>
+        <p:nvSpPr>
+          <p:cNvPr id="19" name="TextBox 18">
+            <a:extLst>
+              <a:ext uri="{FF2B5EF4-FFF2-40B4-BE49-F238E27FC236}">
+                <a16:creationId xmlns:a16="http://schemas.microsoft.com/office/drawing/2014/main" id="{A9283DCA-DC78-13B6-2A2B-9D887E14FE70}"/>
+              </a:ext>
+            </a:extLst>
+          </p:cNvPr>
+          <p:cNvSpPr txBox="1"/>
+          <p:nvPr/>
+        </p:nvSpPr>
+        <p:spPr>
+          <a:xfrm>
+            <a:off x="343441" y="1163750"/>
+            <a:ext cx="11611136" cy="1549911"/>
+          </a:xfrm>
+          <a:prstGeom prst="rect">
+            <a:avLst/>
+          </a:prstGeom>
+          <a:noFill/>
+        </p:spPr>
+        <p:txBody>
+          <a:bodyPr wrap="square" rtlCol="0">
+            <a:spAutoFit/>
+          </a:bodyPr>
+          <a:lstStyle/>
+          <a:p>
+            <a:pPr>
+              <a:lnSpc>
+                <a:spcPct val="120000"/>
+              </a:lnSpc>
+            </a:pPr>
+            <a:r>
+              <a:rPr lang="en-GB" sz="1600" b="1" dirty="0"/>
+              <a:t>2. Applying the Blueprint</a:t>
+            </a:r>
+          </a:p>
+          <a:p>
+            <a:pPr>
+              <a:lnSpc>
+                <a:spcPct val="120000"/>
+              </a:lnSpc>
+            </a:pPr>
+            <a:endParaRPr lang="en-GB" sz="1600" b="1" dirty="0"/>
+          </a:p>
+          <a:p>
+            <a:pPr marL="285750" indent="-285750">
+              <a:lnSpc>
+                <a:spcPct val="120000"/>
+              </a:lnSpc>
+              <a:buFontTx/>
+              <a:buChar char="-"/>
+            </a:pPr>
+            <a:r>
+              <a:rPr lang="en-GB" sz="1600" dirty="0"/>
+              <a:t>The blueprint can be used now to create a storage account, but note that we have to fill in a set of parameters before this is done.</a:t>
+            </a:r>
+          </a:p>
+          <a:p>
+            <a:pPr marL="285750" indent="-285750">
+              <a:lnSpc>
+                <a:spcPct val="120000"/>
+              </a:lnSpc>
+              <a:buFontTx/>
+              <a:buChar char="-"/>
+            </a:pPr>
+            <a:r>
+              <a:rPr lang="en-GB" sz="1600" dirty="0"/>
+              <a:t>This ensures that certain fields are always filled in when creating a resource.</a:t>
+            </a:r>
+          </a:p>
+          <a:p>
+            <a:pPr>
+              <a:lnSpc>
+                <a:spcPct val="120000"/>
+              </a:lnSpc>
+            </a:pPr>
+            <a:endParaRPr lang="en-GB" sz="1600" dirty="0"/>
+          </a:p>
+        </p:txBody>
+      </p:sp>
+    </p:spTree>
+    <p:extLst>
+      <p:ext uri="{BB962C8B-B14F-4D97-AF65-F5344CB8AC3E}">
+        <p14:creationId xmlns:p14="http://schemas.microsoft.com/office/powerpoint/2010/main" val="1285319096"/>
+      </p:ext>
+    </p:extLst>
+  </p:cSld>
+  <p:clrMapOvr>
+    <a:masterClrMapping/>
+  </p:clrMapOvr>
+</p:sld>
+</file>
+
+<file path=ppt/slides/slide47.xml><?xml version="1.0" encoding="utf-8"?>
+<p:sld xmlns:a="http://schemas.openxmlformats.org/drawingml/2006/main" xmlns:r="http://schemas.openxmlformats.org/officeDocument/2006/relationships" xmlns:p="http://schemas.openxmlformats.org/presentationml/2006/main">
+  <p:cSld>
+    <p:spTree>
+      <p:nvGrpSpPr>
+        <p:cNvPr id="1" name=""/>
+        <p:cNvGrpSpPr/>
+        <p:nvPr/>
+      </p:nvGrpSpPr>
+      <p:grpSpPr>
+        <a:xfrm>
+          <a:off x="0" y="0"/>
+          <a:ext cx="0" cy="0"/>
+          <a:chOff x="0" y="0"/>
+          <a:chExt cx="0" cy="0"/>
+        </a:xfrm>
+      </p:grpSpPr>
+      <p:grpSp>
+        <p:nvGrpSpPr>
+          <p:cNvPr id="18" name="Group 17">
+            <a:extLst>
+              <a:ext uri="{FF2B5EF4-FFF2-40B4-BE49-F238E27FC236}">
+                <a16:creationId xmlns:a16="http://schemas.microsoft.com/office/drawing/2014/main" id="{6185BE9B-87C8-4B46-9293-0E71CF17E76A}"/>
+              </a:ext>
+            </a:extLst>
+          </p:cNvPr>
+          <p:cNvGrpSpPr/>
+          <p:nvPr/>
+        </p:nvGrpSpPr>
+        <p:grpSpPr>
+          <a:xfrm>
+            <a:off x="99755" y="83129"/>
+            <a:ext cx="11953701" cy="872834"/>
+            <a:chOff x="99755" y="83129"/>
+            <a:chExt cx="11953701" cy="872834"/>
+          </a:xfrm>
+        </p:grpSpPr>
+        <p:cxnSp>
+          <p:nvCxnSpPr>
+            <p:cNvPr id="5" name="Straight Connector 4">
+              <a:extLst>
+                <a:ext uri="{FF2B5EF4-FFF2-40B4-BE49-F238E27FC236}">
+                  <a16:creationId xmlns:a16="http://schemas.microsoft.com/office/drawing/2014/main" id="{A8BE4EF8-406C-4035-940C-AB752B29BA18}"/>
+                </a:ext>
+              </a:extLst>
+            </p:cNvPr>
+            <p:cNvCxnSpPr/>
+            <p:nvPr/>
+          </p:nvCxnSpPr>
+          <p:spPr>
+            <a:xfrm>
+              <a:off x="99755" y="955963"/>
+              <a:ext cx="11953701" cy="0"/>
+            </a:xfrm>
+            <a:prstGeom prst="line">
+              <a:avLst/>
+            </a:prstGeom>
+            <a:ln w="19050">
+              <a:solidFill>
+                <a:srgbClr val="0072C6"/>
+              </a:solidFill>
+            </a:ln>
+          </p:spPr>
+          <p:style>
+            <a:lnRef idx="1">
+              <a:schemeClr val="accent1"/>
+            </a:lnRef>
+            <a:fillRef idx="0">
+              <a:schemeClr val="accent1"/>
+            </a:fillRef>
+            <a:effectRef idx="0">
+              <a:schemeClr val="accent1"/>
+            </a:effectRef>
+            <a:fontRef idx="minor">
+              <a:schemeClr val="tx1"/>
+            </a:fontRef>
+          </p:style>
+        </p:cxnSp>
+        <p:sp>
+          <p:nvSpPr>
+            <p:cNvPr id="8" name="TextBox 7">
+              <a:extLst>
+                <a:ext uri="{FF2B5EF4-FFF2-40B4-BE49-F238E27FC236}">
+                  <a16:creationId xmlns:a16="http://schemas.microsoft.com/office/drawing/2014/main" id="{C61B684E-FDA7-4625-9CC3-79C17CC59ED7}"/>
+                </a:ext>
+              </a:extLst>
+            </p:cNvPr>
+            <p:cNvSpPr txBox="1"/>
+            <p:nvPr/>
+          </p:nvSpPr>
+          <p:spPr>
+            <a:xfrm>
+              <a:off x="4372494" y="180818"/>
+              <a:ext cx="2686392" cy="369332"/>
+            </a:xfrm>
+            <a:prstGeom prst="rect">
+              <a:avLst/>
+            </a:prstGeom>
+            <a:noFill/>
+          </p:spPr>
+          <p:txBody>
+            <a:bodyPr wrap="square" rtlCol="0">
+              <a:spAutoFit/>
+            </a:bodyPr>
+            <a:lstStyle/>
+            <a:p>
+              <a:pPr marL="0" marR="0" lvl="0" indent="0" algn="l" defTabSz="914400" rtl="0" eaLnBrk="1" fontAlgn="auto" latinLnBrk="0" hangingPunct="1">
+                <a:lnSpc>
+                  <a:spcPct val="100000"/>
+                </a:lnSpc>
+                <a:spcBef>
+                  <a:spcPts val="0"/>
+                </a:spcBef>
+                <a:spcAft>
+                  <a:spcPts val="0"/>
+                </a:spcAft>
+                <a:buClrTx/>
+                <a:buSzTx/>
+                <a:buFontTx/>
+                <a:buNone/>
+                <a:tabLst/>
+                <a:defRPr/>
+              </a:pPr>
+              <a:r>
+                <a:rPr kumimoji="0" lang="en-GB" sz="1800" b="0" i="0" u="none" strike="noStrike" kern="1200" cap="none" spc="0" normalizeH="0" baseline="0" noProof="0" dirty="0">
+                  <a:ln>
+                    <a:noFill/>
+                  </a:ln>
+                  <a:solidFill>
+                    <a:prstClr val="black"/>
+                  </a:solidFill>
+                  <a:effectLst/>
+                  <a:uLnTx/>
+                  <a:uFillTx/>
+                  <a:latin typeface="Calibri" panose="020F0502020204030204"/>
+                  <a:ea typeface="+mn-ea"/>
+                  <a:cs typeface="+mn-cs"/>
+                </a:rPr>
+                <a:t>Azure Identity Services</a:t>
+              </a:r>
+            </a:p>
+          </p:txBody>
+        </p:sp>
+        <p:sp>
+          <p:nvSpPr>
+            <p:cNvPr id="9" name="TextBox 8">
+              <a:extLst>
+                <a:ext uri="{FF2B5EF4-FFF2-40B4-BE49-F238E27FC236}">
+                  <a16:creationId xmlns:a16="http://schemas.microsoft.com/office/drawing/2014/main" id="{F6943DFB-F258-4603-B2D8-7E2958123510}"/>
+                </a:ext>
+              </a:extLst>
+            </p:cNvPr>
+            <p:cNvSpPr txBox="1"/>
+            <p:nvPr/>
+          </p:nvSpPr>
+          <p:spPr>
+            <a:xfrm>
+              <a:off x="7197436" y="190641"/>
+              <a:ext cx="2155764" cy="369332"/>
+            </a:xfrm>
+            <a:prstGeom prst="rect">
+              <a:avLst/>
+            </a:prstGeom>
+            <a:noFill/>
+          </p:spPr>
+          <p:txBody>
+            <a:bodyPr wrap="square" rtlCol="0">
+              <a:spAutoFit/>
+            </a:bodyPr>
+            <a:lstStyle/>
+            <a:p>
+              <a:pPr marL="0" marR="0" lvl="0" indent="0" algn="l" defTabSz="914400" rtl="0" eaLnBrk="1" fontAlgn="auto" latinLnBrk="0" hangingPunct="1">
+                <a:lnSpc>
+                  <a:spcPct val="100000"/>
+                </a:lnSpc>
+                <a:spcBef>
+                  <a:spcPts val="0"/>
+                </a:spcBef>
+                <a:spcAft>
+                  <a:spcPts val="0"/>
+                </a:spcAft>
+                <a:buClrTx/>
+                <a:buSzTx/>
+                <a:buFontTx/>
+                <a:buNone/>
+                <a:tabLst/>
+                <a:defRPr/>
+              </a:pPr>
+              <a:r>
+                <a:rPr kumimoji="0" lang="en-GB" sz="1800" b="0" i="0" u="none" strike="noStrike" kern="1200" cap="none" spc="0" normalizeH="0" baseline="0" noProof="0" dirty="0">
+                  <a:ln>
+                    <a:noFill/>
+                  </a:ln>
+                  <a:solidFill>
+                    <a:prstClr val="black"/>
+                  </a:solidFill>
+                  <a:effectLst/>
+                  <a:uLnTx/>
+                  <a:uFillTx/>
+                  <a:latin typeface="Calibri" panose="020F0502020204030204"/>
+                  <a:ea typeface="+mn-ea"/>
+                  <a:cs typeface="+mn-cs"/>
+                </a:rPr>
+                <a:t>Section: 11.44</a:t>
+              </a:r>
+            </a:p>
+          </p:txBody>
+        </p:sp>
+        <p:sp>
+          <p:nvSpPr>
+            <p:cNvPr id="10" name="TextBox 9">
+              <a:extLst>
+                <a:ext uri="{FF2B5EF4-FFF2-40B4-BE49-F238E27FC236}">
+                  <a16:creationId xmlns:a16="http://schemas.microsoft.com/office/drawing/2014/main" id="{4E568F0D-7E90-4A0C-8070-6C806D992954}"/>
+                </a:ext>
+              </a:extLst>
+            </p:cNvPr>
+            <p:cNvSpPr txBox="1"/>
+            <p:nvPr/>
+          </p:nvSpPr>
+          <p:spPr>
+            <a:xfrm>
+              <a:off x="9534699" y="180818"/>
+              <a:ext cx="2155764" cy="369332"/>
+            </a:xfrm>
+            <a:prstGeom prst="rect">
+              <a:avLst/>
+            </a:prstGeom>
+            <a:noFill/>
+          </p:spPr>
+          <p:txBody>
+            <a:bodyPr wrap="square" rtlCol="0">
+              <a:spAutoFit/>
+            </a:bodyPr>
+            <a:lstStyle/>
+            <a:p>
+              <a:pPr marL="0" marR="0" lvl="0" indent="0" algn="l" defTabSz="914400" rtl="0" eaLnBrk="1" fontAlgn="auto" latinLnBrk="0" hangingPunct="1">
+                <a:lnSpc>
+                  <a:spcPct val="100000"/>
+                </a:lnSpc>
+                <a:spcBef>
+                  <a:spcPts val="0"/>
+                </a:spcBef>
+                <a:spcAft>
+                  <a:spcPts val="0"/>
+                </a:spcAft>
+                <a:buClrTx/>
+                <a:buSzTx/>
+                <a:buFontTx/>
+                <a:buNone/>
+                <a:tabLst/>
+                <a:defRPr/>
+              </a:pPr>
+              <a:r>
+                <a:rPr kumimoji="0" lang="en-GB" sz="1800" b="0" i="0" u="none" strike="noStrike" kern="1200" cap="none" spc="0" normalizeH="0" baseline="0" noProof="0" dirty="0">
+                  <a:ln>
+                    <a:noFill/>
+                  </a:ln>
+                  <a:solidFill>
+                    <a:prstClr val="black"/>
+                  </a:solidFill>
+                  <a:effectLst/>
+                  <a:uLnTx/>
+                  <a:uFillTx/>
+                  <a:latin typeface="Calibri" panose="020F0502020204030204"/>
+                  <a:ea typeface="+mn-ea"/>
+                  <a:cs typeface="+mn-cs"/>
+                </a:rPr>
+                <a:t>Date: 21/06/22 </a:t>
+              </a:r>
+            </a:p>
+          </p:txBody>
+        </p:sp>
+        <p:cxnSp>
+          <p:nvCxnSpPr>
+            <p:cNvPr id="11" name="Straight Connector 10">
+              <a:extLst>
+                <a:ext uri="{FF2B5EF4-FFF2-40B4-BE49-F238E27FC236}">
+                  <a16:creationId xmlns:a16="http://schemas.microsoft.com/office/drawing/2014/main" id="{F70ABCF3-BE60-426F-8C8C-059C854869C6}"/>
+                </a:ext>
+              </a:extLst>
+            </p:cNvPr>
+            <p:cNvCxnSpPr>
+              <a:cxnSpLocks/>
+            </p:cNvCxnSpPr>
+            <p:nvPr/>
+          </p:nvCxnSpPr>
+          <p:spPr>
+            <a:xfrm flipV="1">
+              <a:off x="4267202" y="93505"/>
+              <a:ext cx="1" cy="754394"/>
+            </a:xfrm>
+            <a:prstGeom prst="line">
+              <a:avLst/>
+            </a:prstGeom>
+            <a:ln w="19050">
+              <a:solidFill>
+                <a:srgbClr val="0072C6"/>
+              </a:solidFill>
+            </a:ln>
+          </p:spPr>
+          <p:style>
+            <a:lnRef idx="1">
+              <a:schemeClr val="accent1"/>
+            </a:lnRef>
+            <a:fillRef idx="0">
+              <a:schemeClr val="accent1"/>
+            </a:fillRef>
+            <a:effectRef idx="0">
+              <a:schemeClr val="accent1"/>
+            </a:effectRef>
+            <a:fontRef idx="minor">
+              <a:schemeClr val="tx1"/>
+            </a:fontRef>
+          </p:style>
+        </p:cxnSp>
+        <p:cxnSp>
+          <p:nvCxnSpPr>
+            <p:cNvPr id="15" name="Straight Connector 14">
+              <a:extLst>
+                <a:ext uri="{FF2B5EF4-FFF2-40B4-BE49-F238E27FC236}">
+                  <a16:creationId xmlns:a16="http://schemas.microsoft.com/office/drawing/2014/main" id="{D7F750D7-69E5-4FC3-AFB5-134C7587DE8B}"/>
+                </a:ext>
+              </a:extLst>
+            </p:cNvPr>
+            <p:cNvCxnSpPr>
+              <a:cxnSpLocks/>
+            </p:cNvCxnSpPr>
+            <p:nvPr/>
+          </p:nvCxnSpPr>
+          <p:spPr>
+            <a:xfrm flipV="1">
+              <a:off x="7154489" y="88317"/>
+              <a:ext cx="1" cy="754394"/>
+            </a:xfrm>
+            <a:prstGeom prst="line">
+              <a:avLst/>
+            </a:prstGeom>
+            <a:ln w="19050">
+              <a:solidFill>
+                <a:srgbClr val="0072C6"/>
+              </a:solidFill>
+            </a:ln>
+          </p:spPr>
+          <p:style>
+            <a:lnRef idx="1">
+              <a:schemeClr val="accent1"/>
+            </a:lnRef>
+            <a:fillRef idx="0">
+              <a:schemeClr val="accent1"/>
+            </a:fillRef>
+            <a:effectRef idx="0">
+              <a:schemeClr val="accent1"/>
+            </a:effectRef>
+            <a:fontRef idx="minor">
+              <a:schemeClr val="tx1"/>
+            </a:fontRef>
+          </p:style>
+        </p:cxnSp>
+        <p:cxnSp>
+          <p:nvCxnSpPr>
+            <p:cNvPr id="16" name="Straight Connector 15">
+              <a:extLst>
+                <a:ext uri="{FF2B5EF4-FFF2-40B4-BE49-F238E27FC236}">
+                  <a16:creationId xmlns:a16="http://schemas.microsoft.com/office/drawing/2014/main" id="{90F03633-4CAB-4B57-BF94-CF91E87AB7AE}"/>
+                </a:ext>
+              </a:extLst>
+            </p:cNvPr>
+            <p:cNvCxnSpPr>
+              <a:cxnSpLocks/>
+            </p:cNvCxnSpPr>
+            <p:nvPr/>
+          </p:nvCxnSpPr>
+          <p:spPr>
+            <a:xfrm flipV="1">
+              <a:off x="9491750" y="83129"/>
+              <a:ext cx="1" cy="754394"/>
+            </a:xfrm>
+            <a:prstGeom prst="line">
+              <a:avLst/>
+            </a:prstGeom>
+            <a:ln w="19050">
+              <a:solidFill>
+                <a:srgbClr val="0072C6"/>
+              </a:solidFill>
+            </a:ln>
+          </p:spPr>
+          <p:style>
+            <a:lnRef idx="1">
+              <a:schemeClr val="accent1"/>
+            </a:lnRef>
+            <a:fillRef idx="0">
+              <a:schemeClr val="accent1"/>
+            </a:fillRef>
+            <a:effectRef idx="0">
+              <a:schemeClr val="accent1"/>
+            </a:effectRef>
+            <a:fontRef idx="minor">
+              <a:schemeClr val="tx1"/>
+            </a:fontRef>
+          </p:style>
+        </p:cxnSp>
+      </p:grpSp>
+      <p:pic>
+        <p:nvPicPr>
+          <p:cNvPr id="20" name="Picture 2">
+            <a:extLst>
+              <a:ext uri="{FF2B5EF4-FFF2-40B4-BE49-F238E27FC236}">
+                <a16:creationId xmlns:a16="http://schemas.microsoft.com/office/drawing/2014/main" id="{775211BE-DA3A-41DA-8578-4E52F07B6AB9}"/>
+              </a:ext>
+            </a:extLst>
+          </p:cNvPr>
+          <p:cNvPicPr>
+            <a:picLocks noChangeAspect="1" noChangeArrowheads="1"/>
+          </p:cNvPicPr>
+          <p:nvPr/>
+        </p:nvPicPr>
+        <p:blipFill>
+          <a:blip r:embed="rId2">
+            <a:extLst>
+              <a:ext uri="{28A0092B-C50C-407E-A947-70E740481C1C}">
+                <a14:useLocalDpi xmlns:a14="http://schemas.microsoft.com/office/drawing/2010/main" val="0"/>
+              </a:ext>
+            </a:extLst>
+          </a:blip>
+          <a:srcRect/>
+          <a:stretch>
+            <a:fillRect/>
+          </a:stretch>
+        </p:blipFill>
+        <p:spPr bwMode="auto">
+          <a:xfrm>
+            <a:off x="144770" y="111976"/>
+            <a:ext cx="725548" cy="725548"/>
+          </a:xfrm>
+          <a:prstGeom prst="rect">
+            <a:avLst/>
+          </a:prstGeom>
+          <a:noFill/>
+          <a:extLst>
+            <a:ext uri="{909E8E84-426E-40DD-AFC4-6F175D3DCCD1}">
+              <a14:hiddenFill xmlns:a14="http://schemas.microsoft.com/office/drawing/2010/main">
+                <a:solidFill>
+                  <a:srgbClr val="FFFFFF"/>
+                </a:solidFill>
+              </a14:hiddenFill>
+            </a:ext>
+          </a:extLst>
+        </p:spPr>
+      </p:pic>
+      <p:sp>
+        <p:nvSpPr>
+          <p:cNvPr id="21" name="TextBox 20">
+            <a:extLst>
+              <a:ext uri="{FF2B5EF4-FFF2-40B4-BE49-F238E27FC236}">
+                <a16:creationId xmlns:a16="http://schemas.microsoft.com/office/drawing/2014/main" id="{30404CBF-C3F9-43E0-81FA-E9D4D01BC004}"/>
+              </a:ext>
+            </a:extLst>
+          </p:cNvPr>
+          <p:cNvSpPr txBox="1"/>
+          <p:nvPr/>
+        </p:nvSpPr>
+        <p:spPr>
+          <a:xfrm>
+            <a:off x="914402" y="191193"/>
+            <a:ext cx="3483032" cy="646331"/>
+          </a:xfrm>
+          <a:prstGeom prst="rect">
+            <a:avLst/>
+          </a:prstGeom>
+          <a:noFill/>
+        </p:spPr>
+        <p:txBody>
+          <a:bodyPr wrap="square" rtlCol="0">
+            <a:spAutoFit/>
+          </a:bodyPr>
+          <a:lstStyle/>
+          <a:p>
+            <a:pPr marL="0" marR="0" lvl="0" indent="0" algn="l" defTabSz="914400" rtl="0" eaLnBrk="1" fontAlgn="auto" latinLnBrk="0" hangingPunct="1">
+              <a:lnSpc>
+                <a:spcPct val="100000"/>
+              </a:lnSpc>
+              <a:spcBef>
+                <a:spcPts val="0"/>
+              </a:spcBef>
+              <a:spcAft>
+                <a:spcPts val="0"/>
+              </a:spcAft>
+              <a:buClrTx/>
+              <a:buSzTx/>
+              <a:buFontTx/>
+              <a:buNone/>
+              <a:tabLst/>
+              <a:defRPr/>
+            </a:pPr>
+            <a:r>
+              <a:rPr kumimoji="0" lang="en-GB" sz="1800" b="0" i="0" u="none" strike="noStrike" kern="1200" cap="none" spc="0" normalizeH="0" baseline="0" noProof="0" dirty="0">
+                <a:ln>
+                  <a:noFill/>
+                </a:ln>
+                <a:solidFill>
+                  <a:prstClr val="black"/>
+                </a:solidFill>
+                <a:effectLst/>
+                <a:uLnTx/>
+                <a:uFillTx/>
+                <a:latin typeface="Calibri" panose="020F0502020204030204"/>
+                <a:ea typeface="+mn-ea"/>
+                <a:cs typeface="+mn-cs"/>
+              </a:rPr>
+              <a:t>AZ-900 Microsoft Azure Fundamentals</a:t>
+            </a:r>
+          </a:p>
+        </p:txBody>
+      </p:sp>
+      <p:sp>
+        <p:nvSpPr>
+          <p:cNvPr id="12" name="TextBox 11">
+            <a:extLst>
+              <a:ext uri="{FF2B5EF4-FFF2-40B4-BE49-F238E27FC236}">
+                <a16:creationId xmlns:a16="http://schemas.microsoft.com/office/drawing/2014/main" id="{A48842C8-EFC7-F1D7-CA9F-9D69E7C11F18}"/>
+              </a:ext>
+            </a:extLst>
+          </p:cNvPr>
+          <p:cNvSpPr txBox="1"/>
+          <p:nvPr/>
+        </p:nvSpPr>
+        <p:spPr>
+          <a:xfrm>
+            <a:off x="343441" y="1163750"/>
+            <a:ext cx="11563010" cy="3027239"/>
+          </a:xfrm>
+          <a:prstGeom prst="rect">
+            <a:avLst/>
+          </a:prstGeom>
+          <a:noFill/>
+        </p:spPr>
+        <p:txBody>
+          <a:bodyPr wrap="square" rtlCol="0">
+            <a:spAutoFit/>
+          </a:bodyPr>
+          <a:lstStyle/>
+          <a:p>
+            <a:pPr>
+              <a:lnSpc>
+                <a:spcPct val="120000"/>
+              </a:lnSpc>
+            </a:pPr>
+            <a:r>
+              <a:rPr lang="en-GB" sz="1600" b="1" dirty="0"/>
+              <a:t>Azure Policy </a:t>
+            </a:r>
+          </a:p>
+          <a:p>
+            <a:pPr marL="285750" indent="-285750">
+              <a:lnSpc>
+                <a:spcPct val="120000"/>
+              </a:lnSpc>
+              <a:buFontTx/>
+              <a:buChar char="-"/>
+            </a:pPr>
+            <a:r>
+              <a:rPr lang="en-GB" sz="1600" dirty="0"/>
+              <a:t>Define rules across all of your Azure resources.</a:t>
+            </a:r>
+          </a:p>
+          <a:p>
+            <a:pPr marL="285750" indent="-285750">
+              <a:lnSpc>
+                <a:spcPct val="120000"/>
+              </a:lnSpc>
+              <a:buFontTx/>
+              <a:buChar char="-"/>
+            </a:pPr>
+            <a:r>
+              <a:rPr lang="en-GB" sz="1600" dirty="0"/>
+              <a:t>You can define your own policy (using JSON definition) or more commonly you can chose from a set of built in policies, for example:</a:t>
+            </a:r>
+          </a:p>
+          <a:p>
+            <a:pPr marL="742950" lvl="1" indent="-285750">
+              <a:lnSpc>
+                <a:spcPct val="120000"/>
+              </a:lnSpc>
+              <a:buFont typeface="Arial" panose="020B0604020202020204" pitchFamily="34" charset="0"/>
+              <a:buChar char="•"/>
+            </a:pPr>
+            <a:r>
+              <a:rPr lang="en-GB" sz="1600" dirty="0"/>
+              <a:t>Require SQL Server 12.0 or over.</a:t>
+            </a:r>
+          </a:p>
+          <a:p>
+            <a:pPr marL="742950" lvl="1" indent="-285750">
+              <a:lnSpc>
+                <a:spcPct val="120000"/>
+              </a:lnSpc>
+              <a:buFont typeface="Arial" panose="020B0604020202020204" pitchFamily="34" charset="0"/>
+              <a:buChar char="•"/>
+            </a:pPr>
+            <a:r>
+              <a:rPr lang="en-GB" sz="1600" dirty="0"/>
+              <a:t>Define allowed locations.</a:t>
+            </a:r>
+          </a:p>
+          <a:p>
+            <a:pPr marL="742950" lvl="1" indent="-285750">
+              <a:lnSpc>
+                <a:spcPct val="120000"/>
+              </a:lnSpc>
+              <a:buFont typeface="Arial" panose="020B0604020202020204" pitchFamily="34" charset="0"/>
+              <a:buChar char="•"/>
+            </a:pPr>
+            <a:r>
+              <a:rPr lang="en-GB" sz="1600" dirty="0"/>
+              <a:t>Define allowed storage accounts.</a:t>
+            </a:r>
+          </a:p>
+          <a:p>
+            <a:pPr marL="742950" lvl="1" indent="-285750">
+              <a:lnSpc>
+                <a:spcPct val="120000"/>
+              </a:lnSpc>
+              <a:buFont typeface="Arial" panose="020B0604020202020204" pitchFamily="34" charset="0"/>
+              <a:buChar char="•"/>
+            </a:pPr>
+            <a:r>
+              <a:rPr lang="en-GB" sz="1600" dirty="0"/>
+              <a:t>Virtual machine resources types (avoid people deploying expensive VMs).</a:t>
+            </a:r>
+          </a:p>
+          <a:p>
+            <a:pPr marL="742950" lvl="1" indent="-285750">
+              <a:lnSpc>
+                <a:spcPct val="120000"/>
+              </a:lnSpc>
+              <a:buFont typeface="Arial" panose="020B0604020202020204" pitchFamily="34" charset="0"/>
+              <a:buChar char="•"/>
+            </a:pPr>
+            <a:r>
+              <a:rPr lang="en-GB" sz="1600" dirty="0"/>
+              <a:t>Block certain resource types.</a:t>
+            </a:r>
+          </a:p>
+          <a:p>
+            <a:pPr marL="285750" indent="-285750">
+              <a:lnSpc>
+                <a:spcPct val="120000"/>
+              </a:lnSpc>
+              <a:buFontTx/>
+              <a:buChar char="-"/>
+            </a:pPr>
+            <a:r>
+              <a:rPr lang="en-GB" sz="1600" dirty="0"/>
+              <a:t>Can apply policy to entire subscription or down to specific resource groups. So you don’t have to block off the entire company from using certain resources.</a:t>
+            </a:r>
+          </a:p>
+        </p:txBody>
+      </p:sp>
+      <p:pic>
+        <p:nvPicPr>
+          <p:cNvPr id="3" name="Picture 2">
+            <a:extLst>
+              <a:ext uri="{FF2B5EF4-FFF2-40B4-BE49-F238E27FC236}">
+                <a16:creationId xmlns:a16="http://schemas.microsoft.com/office/drawing/2014/main" id="{E65F2DC1-A5D4-9667-2786-EB08153B0873}"/>
+              </a:ext>
+            </a:extLst>
+          </p:cNvPr>
+          <p:cNvPicPr>
+            <a:picLocks noChangeAspect="1"/>
+          </p:cNvPicPr>
+          <p:nvPr/>
+        </p:nvPicPr>
+        <p:blipFill>
+          <a:blip r:embed="rId3"/>
+          <a:stretch>
+            <a:fillRect/>
+          </a:stretch>
+        </p:blipFill>
+        <p:spPr>
+          <a:xfrm>
+            <a:off x="7058062" y="4358294"/>
+            <a:ext cx="4867375" cy="2201000"/>
+          </a:xfrm>
+          <a:prstGeom prst="rect">
+            <a:avLst/>
+          </a:prstGeom>
+        </p:spPr>
+      </p:pic>
+      <p:sp>
+        <p:nvSpPr>
+          <p:cNvPr id="17" name="TextBox 16">
+            <a:extLst>
+              <a:ext uri="{FF2B5EF4-FFF2-40B4-BE49-F238E27FC236}">
+                <a16:creationId xmlns:a16="http://schemas.microsoft.com/office/drawing/2014/main" id="{C4DA090F-1DC9-E55F-423C-5B39CFE610A5}"/>
+              </a:ext>
+            </a:extLst>
+          </p:cNvPr>
+          <p:cNvSpPr txBox="1"/>
+          <p:nvPr/>
+        </p:nvSpPr>
+        <p:spPr>
+          <a:xfrm>
+            <a:off x="343441" y="4358294"/>
+            <a:ext cx="6384618" cy="1845377"/>
+          </a:xfrm>
+          <a:prstGeom prst="rect">
+            <a:avLst/>
+          </a:prstGeom>
+          <a:noFill/>
+        </p:spPr>
+        <p:txBody>
+          <a:bodyPr wrap="square" rtlCol="0">
+            <a:spAutoFit/>
+          </a:bodyPr>
+          <a:lstStyle/>
+          <a:p>
+            <a:pPr>
+              <a:lnSpc>
+                <a:spcPct val="120000"/>
+              </a:lnSpc>
+            </a:pPr>
+            <a:r>
+              <a:rPr lang="en-GB" sz="1600" b="1" dirty="0"/>
+              <a:t>Resource Locks</a:t>
+            </a:r>
+          </a:p>
+          <a:p>
+            <a:pPr marL="285750" indent="-285750">
+              <a:lnSpc>
+                <a:spcPct val="120000"/>
+              </a:lnSpc>
+              <a:buFontTx/>
+              <a:buChar char="-"/>
+            </a:pPr>
+            <a:r>
+              <a:rPr lang="en-GB" sz="1600" dirty="0"/>
+              <a:t>Read Only Lock - Lock a resource as being read only, so cant be modified. So you can lock a VM, and it will still function just fine but the properties of that VM can not be changed.</a:t>
+            </a:r>
+          </a:p>
+          <a:p>
+            <a:pPr marL="285750" indent="-285750">
+              <a:lnSpc>
+                <a:spcPct val="120000"/>
+              </a:lnSpc>
+              <a:buFontTx/>
+              <a:buChar char="-"/>
+            </a:pPr>
+            <a:r>
+              <a:rPr lang="en-GB" sz="1600" dirty="0"/>
+              <a:t>Can not Delete Lock - The resource can be altered and changed it just can be deleted.</a:t>
+            </a:r>
+          </a:p>
+        </p:txBody>
+      </p:sp>
+    </p:spTree>
+    <p:extLst>
+      <p:ext uri="{BB962C8B-B14F-4D97-AF65-F5344CB8AC3E}">
+        <p14:creationId xmlns:p14="http://schemas.microsoft.com/office/powerpoint/2010/main" val="473725708"/>
+      </p:ext>
+    </p:extLst>
+  </p:cSld>
+  <p:clrMapOvr>
+    <a:masterClrMapping/>
+  </p:clrMapOvr>
+</p:sld>
+</file>
+
+<file path=ppt/slides/slide48.xml><?xml version="1.0" encoding="utf-8"?>
 <p:sld xmlns:a="http://schemas.openxmlformats.org/drawingml/2006/main" xmlns:r="http://schemas.openxmlformats.org/officeDocument/2006/relationships" xmlns:p="http://schemas.openxmlformats.org/presentationml/2006/main">
   <p:cSld>
     <p:spTree>
@@ -28467,7 +31427,7 @@
 </p:sld>
 </file>
 
-<file path=ppt/slides/slide45.xml><?xml version="1.0" encoding="utf-8"?>
+<file path=ppt/slides/slide49.xml><?xml version="1.0" encoding="utf-8"?>
 <p:sld xmlns:a="http://schemas.openxmlformats.org/drawingml/2006/main" xmlns:r="http://schemas.openxmlformats.org/officeDocument/2006/relationships" xmlns:p="http://schemas.openxmlformats.org/presentationml/2006/main">
   <p:cSld>
     <p:spTree>

</xml_diff>

<commit_message>
Azure AZ-900 Section 12
</commit_message>
<xml_diff>
--- a/Azure_AZ-900_Fundamentals/MJH_AZ-900_Azure_Fundamentals_Notes.pptx
+++ b/Azure_AZ-900_Fundamentals/MJH_AZ-900_Azure_Fundamentals_Notes.pptx
@@ -53,7 +53,9 @@
     <p:sldId id="340" r:id="rId47"/>
     <p:sldId id="337" r:id="rId48"/>
     <p:sldId id="300" r:id="rId49"/>
-    <p:sldId id="302" r:id="rId50"/>
+    <p:sldId id="341" r:id="rId50"/>
+    <p:sldId id="343" r:id="rId51"/>
+    <p:sldId id="302" r:id="rId52"/>
   </p:sldIdLst>
   <p:sldSz cx="12192000" cy="6858000"/>
   <p:notesSz cx="6858000" cy="9144000"/>
@@ -31444,12 +31446,398 @@
           <a:chExt cx="0" cy="0"/>
         </a:xfrm>
       </p:grpSpPr>
+      <p:grpSp>
+        <p:nvGrpSpPr>
+          <p:cNvPr id="18" name="Group 17">
+            <a:extLst>
+              <a:ext uri="{FF2B5EF4-FFF2-40B4-BE49-F238E27FC236}">
+                <a16:creationId xmlns:a16="http://schemas.microsoft.com/office/drawing/2014/main" id="{6185BE9B-87C8-4B46-9293-0E71CF17E76A}"/>
+              </a:ext>
+            </a:extLst>
+          </p:cNvPr>
+          <p:cNvGrpSpPr/>
+          <p:nvPr/>
+        </p:nvGrpSpPr>
+        <p:grpSpPr>
+          <a:xfrm>
+            <a:off x="99755" y="83129"/>
+            <a:ext cx="11953701" cy="872834"/>
+            <a:chOff x="99755" y="83129"/>
+            <a:chExt cx="11953701" cy="872834"/>
+          </a:xfrm>
+        </p:grpSpPr>
+        <p:cxnSp>
+          <p:nvCxnSpPr>
+            <p:cNvPr id="5" name="Straight Connector 4">
+              <a:extLst>
+                <a:ext uri="{FF2B5EF4-FFF2-40B4-BE49-F238E27FC236}">
+                  <a16:creationId xmlns:a16="http://schemas.microsoft.com/office/drawing/2014/main" id="{A8BE4EF8-406C-4035-940C-AB752B29BA18}"/>
+                </a:ext>
+              </a:extLst>
+            </p:cNvPr>
+            <p:cNvCxnSpPr/>
+            <p:nvPr/>
+          </p:nvCxnSpPr>
+          <p:spPr>
+            <a:xfrm>
+              <a:off x="99755" y="955963"/>
+              <a:ext cx="11953701" cy="0"/>
+            </a:xfrm>
+            <a:prstGeom prst="line">
+              <a:avLst/>
+            </a:prstGeom>
+            <a:ln w="19050">
+              <a:solidFill>
+                <a:srgbClr val="0072C6"/>
+              </a:solidFill>
+            </a:ln>
+          </p:spPr>
+          <p:style>
+            <a:lnRef idx="1">
+              <a:schemeClr val="accent1"/>
+            </a:lnRef>
+            <a:fillRef idx="0">
+              <a:schemeClr val="accent1"/>
+            </a:fillRef>
+            <a:effectRef idx="0">
+              <a:schemeClr val="accent1"/>
+            </a:effectRef>
+            <a:fontRef idx="minor">
+              <a:schemeClr val="tx1"/>
+            </a:fontRef>
+          </p:style>
+        </p:cxnSp>
+        <p:sp>
+          <p:nvSpPr>
+            <p:cNvPr id="8" name="TextBox 7">
+              <a:extLst>
+                <a:ext uri="{FF2B5EF4-FFF2-40B4-BE49-F238E27FC236}">
+                  <a16:creationId xmlns:a16="http://schemas.microsoft.com/office/drawing/2014/main" id="{C61B684E-FDA7-4625-9CC3-79C17CC59ED7}"/>
+                </a:ext>
+              </a:extLst>
+            </p:cNvPr>
+            <p:cNvSpPr txBox="1"/>
+            <p:nvPr/>
+          </p:nvSpPr>
+          <p:spPr>
+            <a:xfrm>
+              <a:off x="4372494" y="142318"/>
+              <a:ext cx="2686392" cy="584775"/>
+            </a:xfrm>
+            <a:prstGeom prst="rect">
+              <a:avLst/>
+            </a:prstGeom>
+            <a:noFill/>
+          </p:spPr>
+          <p:txBody>
+            <a:bodyPr wrap="square" rtlCol="0">
+              <a:spAutoFit/>
+            </a:bodyPr>
+            <a:lstStyle/>
+            <a:p>
+              <a:pPr marL="0" marR="0" lvl="0" indent="0" algn="l" defTabSz="914400" rtl="0" eaLnBrk="1" fontAlgn="auto" latinLnBrk="0" hangingPunct="1">
+                <a:lnSpc>
+                  <a:spcPct val="100000"/>
+                </a:lnSpc>
+                <a:spcBef>
+                  <a:spcPts val="0"/>
+                </a:spcBef>
+                <a:spcAft>
+                  <a:spcPts val="0"/>
+                </a:spcAft>
+                <a:buClrTx/>
+                <a:buSzTx/>
+                <a:buFontTx/>
+                <a:buNone/>
+                <a:tabLst/>
+                <a:defRPr/>
+              </a:pPr>
+              <a:r>
+                <a:rPr kumimoji="0" lang="en-US" sz="1600" b="0" i="0" u="none" strike="noStrike" kern="1200" cap="none" spc="0" normalizeH="0" baseline="0" noProof="0" dirty="0">
+                  <a:ln>
+                    <a:noFill/>
+                  </a:ln>
+                  <a:solidFill>
+                    <a:prstClr val="black"/>
+                  </a:solidFill>
+                  <a:effectLst/>
+                  <a:uLnTx/>
+                  <a:uFillTx/>
+                  <a:latin typeface="Calibri" panose="020F0502020204030204"/>
+                  <a:ea typeface="+mn-ea"/>
+                  <a:cs typeface="+mn-cs"/>
+                </a:rPr>
+                <a:t>Tools for Managing and Deploying Azure Resources</a:t>
+              </a:r>
+            </a:p>
+          </p:txBody>
+        </p:sp>
+        <p:sp>
+          <p:nvSpPr>
+            <p:cNvPr id="9" name="TextBox 8">
+              <a:extLst>
+                <a:ext uri="{FF2B5EF4-FFF2-40B4-BE49-F238E27FC236}">
+                  <a16:creationId xmlns:a16="http://schemas.microsoft.com/office/drawing/2014/main" id="{F6943DFB-F258-4603-B2D8-7E2958123510}"/>
+                </a:ext>
+              </a:extLst>
+            </p:cNvPr>
+            <p:cNvSpPr txBox="1"/>
+            <p:nvPr/>
+          </p:nvSpPr>
+          <p:spPr>
+            <a:xfrm>
+              <a:off x="7197436" y="190641"/>
+              <a:ext cx="2155764" cy="369332"/>
+            </a:xfrm>
+            <a:prstGeom prst="rect">
+              <a:avLst/>
+            </a:prstGeom>
+            <a:noFill/>
+          </p:spPr>
+          <p:txBody>
+            <a:bodyPr wrap="square" rtlCol="0">
+              <a:spAutoFit/>
+            </a:bodyPr>
+            <a:lstStyle/>
+            <a:p>
+              <a:pPr marL="0" marR="0" lvl="0" indent="0" algn="l" defTabSz="914400" rtl="0" eaLnBrk="1" fontAlgn="auto" latinLnBrk="0" hangingPunct="1">
+                <a:lnSpc>
+                  <a:spcPct val="100000"/>
+                </a:lnSpc>
+                <a:spcBef>
+                  <a:spcPts val="0"/>
+                </a:spcBef>
+                <a:spcAft>
+                  <a:spcPts val="0"/>
+                </a:spcAft>
+                <a:buClrTx/>
+                <a:buSzTx/>
+                <a:buFontTx/>
+                <a:buNone/>
+                <a:tabLst/>
+                <a:defRPr/>
+              </a:pPr>
+              <a:r>
+                <a:rPr kumimoji="0" lang="en-GB" sz="1800" b="0" i="0" u="none" strike="noStrike" kern="1200" cap="none" spc="0" normalizeH="0" baseline="0" noProof="0" dirty="0">
+                  <a:ln>
+                    <a:noFill/>
+                  </a:ln>
+                  <a:solidFill>
+                    <a:prstClr val="black"/>
+                  </a:solidFill>
+                  <a:effectLst/>
+                  <a:uLnTx/>
+                  <a:uFillTx/>
+                  <a:latin typeface="Calibri" panose="020F0502020204030204"/>
+                  <a:ea typeface="+mn-ea"/>
+                  <a:cs typeface="+mn-cs"/>
+                </a:rPr>
+                <a:t>Section: 12.45, 12.46</a:t>
+              </a:r>
+            </a:p>
+          </p:txBody>
+        </p:sp>
+        <p:sp>
+          <p:nvSpPr>
+            <p:cNvPr id="10" name="TextBox 9">
+              <a:extLst>
+                <a:ext uri="{FF2B5EF4-FFF2-40B4-BE49-F238E27FC236}">
+                  <a16:creationId xmlns:a16="http://schemas.microsoft.com/office/drawing/2014/main" id="{4E568F0D-7E90-4A0C-8070-6C806D992954}"/>
+                </a:ext>
+              </a:extLst>
+            </p:cNvPr>
+            <p:cNvSpPr txBox="1"/>
+            <p:nvPr/>
+          </p:nvSpPr>
+          <p:spPr>
+            <a:xfrm>
+              <a:off x="9534699" y="180818"/>
+              <a:ext cx="2155764" cy="369332"/>
+            </a:xfrm>
+            <a:prstGeom prst="rect">
+              <a:avLst/>
+            </a:prstGeom>
+            <a:noFill/>
+          </p:spPr>
+          <p:txBody>
+            <a:bodyPr wrap="square" rtlCol="0">
+              <a:spAutoFit/>
+            </a:bodyPr>
+            <a:lstStyle/>
+            <a:p>
+              <a:pPr marL="0" marR="0" lvl="0" indent="0" algn="l" defTabSz="914400" rtl="0" eaLnBrk="1" fontAlgn="auto" latinLnBrk="0" hangingPunct="1">
+                <a:lnSpc>
+                  <a:spcPct val="100000"/>
+                </a:lnSpc>
+                <a:spcBef>
+                  <a:spcPts val="0"/>
+                </a:spcBef>
+                <a:spcAft>
+                  <a:spcPts val="0"/>
+                </a:spcAft>
+                <a:buClrTx/>
+                <a:buSzTx/>
+                <a:buFontTx/>
+                <a:buNone/>
+                <a:tabLst/>
+                <a:defRPr/>
+              </a:pPr>
+              <a:r>
+                <a:rPr kumimoji="0" lang="en-GB" sz="1800" b="0" i="0" u="none" strike="noStrike" kern="1200" cap="none" spc="0" normalizeH="0" baseline="0" noProof="0" dirty="0">
+                  <a:ln>
+                    <a:noFill/>
+                  </a:ln>
+                  <a:solidFill>
+                    <a:prstClr val="black"/>
+                  </a:solidFill>
+                  <a:effectLst/>
+                  <a:uLnTx/>
+                  <a:uFillTx/>
+                  <a:latin typeface="Calibri" panose="020F0502020204030204"/>
+                  <a:ea typeface="+mn-ea"/>
+                  <a:cs typeface="+mn-cs"/>
+                </a:rPr>
+                <a:t>Date: 21/06/22 </a:t>
+              </a:r>
+            </a:p>
+          </p:txBody>
+        </p:sp>
+        <p:cxnSp>
+          <p:nvCxnSpPr>
+            <p:cNvPr id="11" name="Straight Connector 10">
+              <a:extLst>
+                <a:ext uri="{FF2B5EF4-FFF2-40B4-BE49-F238E27FC236}">
+                  <a16:creationId xmlns:a16="http://schemas.microsoft.com/office/drawing/2014/main" id="{F70ABCF3-BE60-426F-8C8C-059C854869C6}"/>
+                </a:ext>
+              </a:extLst>
+            </p:cNvPr>
+            <p:cNvCxnSpPr>
+              <a:cxnSpLocks/>
+            </p:cNvCxnSpPr>
+            <p:nvPr/>
+          </p:nvCxnSpPr>
+          <p:spPr>
+            <a:xfrm flipV="1">
+              <a:off x="4267202" y="93505"/>
+              <a:ext cx="1" cy="754394"/>
+            </a:xfrm>
+            <a:prstGeom prst="line">
+              <a:avLst/>
+            </a:prstGeom>
+            <a:ln w="19050">
+              <a:solidFill>
+                <a:srgbClr val="0072C6"/>
+              </a:solidFill>
+            </a:ln>
+          </p:spPr>
+          <p:style>
+            <a:lnRef idx="1">
+              <a:schemeClr val="accent1"/>
+            </a:lnRef>
+            <a:fillRef idx="0">
+              <a:schemeClr val="accent1"/>
+            </a:fillRef>
+            <a:effectRef idx="0">
+              <a:schemeClr val="accent1"/>
+            </a:effectRef>
+            <a:fontRef idx="minor">
+              <a:schemeClr val="tx1"/>
+            </a:fontRef>
+          </p:style>
+        </p:cxnSp>
+        <p:cxnSp>
+          <p:nvCxnSpPr>
+            <p:cNvPr id="15" name="Straight Connector 14">
+              <a:extLst>
+                <a:ext uri="{FF2B5EF4-FFF2-40B4-BE49-F238E27FC236}">
+                  <a16:creationId xmlns:a16="http://schemas.microsoft.com/office/drawing/2014/main" id="{D7F750D7-69E5-4FC3-AFB5-134C7587DE8B}"/>
+                </a:ext>
+              </a:extLst>
+            </p:cNvPr>
+            <p:cNvCxnSpPr>
+              <a:cxnSpLocks/>
+            </p:cNvCxnSpPr>
+            <p:nvPr/>
+          </p:nvCxnSpPr>
+          <p:spPr>
+            <a:xfrm flipV="1">
+              <a:off x="7154489" y="88317"/>
+              <a:ext cx="1" cy="754394"/>
+            </a:xfrm>
+            <a:prstGeom prst="line">
+              <a:avLst/>
+            </a:prstGeom>
+            <a:ln w="19050">
+              <a:solidFill>
+                <a:srgbClr val="0072C6"/>
+              </a:solidFill>
+            </a:ln>
+          </p:spPr>
+          <p:style>
+            <a:lnRef idx="1">
+              <a:schemeClr val="accent1"/>
+            </a:lnRef>
+            <a:fillRef idx="0">
+              <a:schemeClr val="accent1"/>
+            </a:fillRef>
+            <a:effectRef idx="0">
+              <a:schemeClr val="accent1"/>
+            </a:effectRef>
+            <a:fontRef idx="minor">
+              <a:schemeClr val="tx1"/>
+            </a:fontRef>
+          </p:style>
+        </p:cxnSp>
+        <p:cxnSp>
+          <p:nvCxnSpPr>
+            <p:cNvPr id="16" name="Straight Connector 15">
+              <a:extLst>
+                <a:ext uri="{FF2B5EF4-FFF2-40B4-BE49-F238E27FC236}">
+                  <a16:creationId xmlns:a16="http://schemas.microsoft.com/office/drawing/2014/main" id="{90F03633-4CAB-4B57-BF94-CF91E87AB7AE}"/>
+                </a:ext>
+              </a:extLst>
+            </p:cNvPr>
+            <p:cNvCxnSpPr>
+              <a:cxnSpLocks/>
+            </p:cNvCxnSpPr>
+            <p:nvPr/>
+          </p:nvCxnSpPr>
+          <p:spPr>
+            <a:xfrm flipV="1">
+              <a:off x="9491750" y="83129"/>
+              <a:ext cx="1" cy="754394"/>
+            </a:xfrm>
+            <a:prstGeom prst="line">
+              <a:avLst/>
+            </a:prstGeom>
+            <a:ln w="19050">
+              <a:solidFill>
+                <a:srgbClr val="0072C6"/>
+              </a:solidFill>
+            </a:ln>
+          </p:spPr>
+          <p:style>
+            <a:lnRef idx="1">
+              <a:schemeClr val="accent1"/>
+            </a:lnRef>
+            <a:fillRef idx="0">
+              <a:schemeClr val="accent1"/>
+            </a:fillRef>
+            <a:effectRef idx="0">
+              <a:schemeClr val="accent1"/>
+            </a:effectRef>
+            <a:fontRef idx="minor">
+              <a:schemeClr val="tx1"/>
+            </a:fontRef>
+          </p:style>
+        </p:cxnSp>
+      </p:grpSp>
       <p:pic>
         <p:nvPicPr>
-          <p:cNvPr id="7" name="Picture 2">
+          <p:cNvPr id="20" name="Picture 2">
             <a:extLst>
               <a:ext uri="{FF2B5EF4-FFF2-40B4-BE49-F238E27FC236}">
-                <a16:creationId xmlns:a16="http://schemas.microsoft.com/office/drawing/2014/main" id="{656D77DE-6845-4DF0-A4E8-FCEE79C806B5}"/>
+                <a16:creationId xmlns:a16="http://schemas.microsoft.com/office/drawing/2014/main" id="{775211BE-DA3A-41DA-8578-4E52F07B6AB9}"/>
               </a:ext>
             </a:extLst>
           </p:cNvPr>
@@ -31491,53 +31879,12 @@
           </a:extLst>
         </p:spPr>
       </p:pic>
-      <p:cxnSp>
-        <p:nvCxnSpPr>
-          <p:cNvPr id="5" name="Straight Connector 4">
-            <a:extLst>
-              <a:ext uri="{FF2B5EF4-FFF2-40B4-BE49-F238E27FC236}">
-                <a16:creationId xmlns:a16="http://schemas.microsoft.com/office/drawing/2014/main" id="{A8BE4EF8-406C-4035-940C-AB752B29BA18}"/>
-              </a:ext>
-            </a:extLst>
-          </p:cNvPr>
-          <p:cNvCxnSpPr/>
-          <p:nvPr/>
-        </p:nvCxnSpPr>
-        <p:spPr>
-          <a:xfrm>
-            <a:off x="99755" y="955963"/>
-            <a:ext cx="11953701" cy="0"/>
-          </a:xfrm>
-          <a:prstGeom prst="line">
-            <a:avLst/>
-          </a:prstGeom>
-          <a:ln w="19050">
-            <a:solidFill>
-              <a:srgbClr val="0072C6"/>
-            </a:solidFill>
-          </a:ln>
-        </p:spPr>
-        <p:style>
-          <a:lnRef idx="1">
-            <a:schemeClr val="accent1"/>
-          </a:lnRef>
-          <a:fillRef idx="0">
-            <a:schemeClr val="accent1"/>
-          </a:fillRef>
-          <a:effectRef idx="0">
-            <a:schemeClr val="accent1"/>
-          </a:effectRef>
-          <a:fontRef idx="minor">
-            <a:schemeClr val="tx1"/>
-          </a:fontRef>
-        </p:style>
-      </p:cxnSp>
       <p:sp>
         <p:nvSpPr>
-          <p:cNvPr id="6" name="TextBox 5">
+          <p:cNvPr id="21" name="TextBox 20">
             <a:extLst>
               <a:ext uri="{FF2B5EF4-FFF2-40B4-BE49-F238E27FC236}">
-                <a16:creationId xmlns:a16="http://schemas.microsoft.com/office/drawing/2014/main" id="{4A5E75BC-B6AC-4138-AB81-9DEC0096C5A8}"/>
+                <a16:creationId xmlns:a16="http://schemas.microsoft.com/office/drawing/2014/main" id="{30404CBF-C3F9-43E0-81FA-E9D4D01BC004}"/>
               </a:ext>
             </a:extLst>
           </p:cNvPr>
@@ -31599,10 +31946,10 @@
       </p:sp>
       <p:sp>
         <p:nvSpPr>
-          <p:cNvPr id="8" name="TextBox 7">
+          <p:cNvPr id="12" name="TextBox 11">
             <a:extLst>
               <a:ext uri="{FF2B5EF4-FFF2-40B4-BE49-F238E27FC236}">
-                <a16:creationId xmlns:a16="http://schemas.microsoft.com/office/drawing/2014/main" id="{C61B684E-FDA7-4625-9CC3-79C17CC59ED7}"/>
+                <a16:creationId xmlns:a16="http://schemas.microsoft.com/office/drawing/2014/main" id="{A48842C8-EFC7-F1D7-CA9F-9D69E7C11F18}"/>
               </a:ext>
             </a:extLst>
           </p:cNvPr>
@@ -31611,8 +31958,8 @@
         </p:nvSpPr>
         <p:spPr>
           <a:xfrm>
-            <a:off x="320040" y="2479578"/>
-            <a:ext cx="11484864" cy="1569660"/>
+            <a:off x="343441" y="1163750"/>
+            <a:ext cx="11563010" cy="2436308"/>
           </a:xfrm>
           <a:prstGeom prst="rect">
             <a:avLst/>
@@ -31625,108 +31972,1214 @@
           </a:bodyPr>
           <a:lstStyle/>
           <a:p>
-            <a:pPr marL="0" marR="0" lvl="0" indent="0" algn="ctr" defTabSz="914400" rtl="0" eaLnBrk="1" fontAlgn="auto" latinLnBrk="0" hangingPunct="1">
-              <a:lnSpc>
-                <a:spcPct val="100000"/>
-              </a:lnSpc>
-              <a:spcBef>
-                <a:spcPts val="0"/>
-              </a:spcBef>
-              <a:spcAft>
-                <a:spcPts val="0"/>
-              </a:spcAft>
-              <a:buClrTx/>
-              <a:buSzTx/>
+            <a:pPr>
+              <a:lnSpc>
+                <a:spcPct val="120000"/>
+              </a:lnSpc>
+            </a:pPr>
+            <a:r>
+              <a:rPr lang="en-GB" sz="1600" b="1" dirty="0"/>
+              <a:t>Azure Portal </a:t>
+            </a:r>
+          </a:p>
+          <a:p>
+            <a:pPr marL="285750" indent="-285750">
+              <a:lnSpc>
+                <a:spcPct val="120000"/>
+              </a:lnSpc>
               <a:buFontTx/>
-              <a:buNone/>
-              <a:tabLst/>
-              <a:defRPr/>
-            </a:pPr>
-            <a:r>
-              <a:rPr kumimoji="0" lang="en-GB" sz="3200" i="0" u="none" strike="noStrike" kern="1200" cap="none" spc="0" normalizeH="0" baseline="0" noProof="0" dirty="0">
-                <a:ln>
-                  <a:noFill/>
-                </a:ln>
+              <a:buChar char="-"/>
+            </a:pPr>
+            <a:r>
+              <a:rPr lang="en-GB" sz="1600" dirty="0"/>
+              <a:t>Web based app that allows you to manage and see resources that are running.</a:t>
+            </a:r>
+          </a:p>
+          <a:p>
+            <a:pPr marL="285750" indent="-285750">
+              <a:lnSpc>
+                <a:spcPct val="120000"/>
+              </a:lnSpc>
+              <a:buFontTx/>
+              <a:buChar char="-"/>
+            </a:pPr>
+            <a:r>
+              <a:rPr lang="en-GB" sz="1600" dirty="0"/>
+              <a:t>User friendly, you can see things in graphs.</a:t>
+            </a:r>
+          </a:p>
+          <a:p>
+            <a:pPr marL="285750" indent="-285750">
+              <a:lnSpc>
+                <a:spcPct val="120000"/>
+              </a:lnSpc>
+              <a:buFontTx/>
+              <a:buChar char="-"/>
+            </a:pPr>
+            <a:endParaRPr lang="en-GB" sz="1600" dirty="0"/>
+          </a:p>
+          <a:p>
+            <a:pPr>
+              <a:lnSpc>
+                <a:spcPct val="120000"/>
+              </a:lnSpc>
+            </a:pPr>
+            <a:r>
+              <a:rPr lang="en-GB" sz="1600" b="1" dirty="0"/>
+              <a:t>Scripting Languages</a:t>
+            </a:r>
+          </a:p>
+          <a:p>
+            <a:pPr marL="285750" indent="-285750">
+              <a:lnSpc>
+                <a:spcPct val="120000"/>
+              </a:lnSpc>
+              <a:buFontTx/>
+              <a:buChar char="-"/>
+            </a:pPr>
+            <a:r>
+              <a:rPr lang="en-GB" sz="1600" dirty="0"/>
+              <a:t>Sometimes when we have thousands of deployed resources the portal may not be enough, or it may simply be too large and messy and instead we may wish to interact with azure using scripting languages.</a:t>
+            </a:r>
+          </a:p>
+          <a:p>
+            <a:pPr marL="285750" indent="-285750">
+              <a:lnSpc>
+                <a:spcPct val="120000"/>
+              </a:lnSpc>
+              <a:buFontTx/>
+              <a:buChar char="-"/>
+            </a:pPr>
+            <a:r>
+              <a:rPr lang="en-GB" sz="1600" dirty="0"/>
+              <a:t>PowerShell and bash (both CLI’s or command line interface) are supported and you can use these locally when connected to azure. </a:t>
+            </a:r>
+          </a:p>
+        </p:txBody>
+      </p:sp>
+      <p:grpSp>
+        <p:nvGrpSpPr>
+          <p:cNvPr id="93" name="Group 92">
+            <a:extLst>
+              <a:ext uri="{FF2B5EF4-FFF2-40B4-BE49-F238E27FC236}">
+                <a16:creationId xmlns:a16="http://schemas.microsoft.com/office/drawing/2014/main" id="{55C3772C-3AE7-79EE-FD1E-DBB14765598D}"/>
+              </a:ext>
+            </a:extLst>
+          </p:cNvPr>
+          <p:cNvGrpSpPr/>
+          <p:nvPr/>
+        </p:nvGrpSpPr>
+        <p:grpSpPr>
+          <a:xfrm>
+            <a:off x="6559672" y="3972844"/>
+            <a:ext cx="5351550" cy="2624653"/>
+            <a:chOff x="4217359" y="1676400"/>
+            <a:chExt cx="5351550" cy="2624653"/>
+          </a:xfrm>
+        </p:grpSpPr>
+        <p:sp>
+          <p:nvSpPr>
+            <p:cNvPr id="94" name="Rectangle: Rounded Corners 93">
+              <a:extLst>
+                <a:ext uri="{FF2B5EF4-FFF2-40B4-BE49-F238E27FC236}">
+                  <a16:creationId xmlns:a16="http://schemas.microsoft.com/office/drawing/2014/main" id="{5506E0B2-79F8-8AE4-874D-B4B89B77327E}"/>
+                </a:ext>
+              </a:extLst>
+            </p:cNvPr>
+            <p:cNvSpPr/>
+            <p:nvPr/>
+          </p:nvSpPr>
+          <p:spPr>
+            <a:xfrm>
+              <a:off x="4217359" y="1676400"/>
+              <a:ext cx="5351550" cy="2624653"/>
+            </a:xfrm>
+            <a:prstGeom prst="roundRect">
+              <a:avLst>
+                <a:gd name="adj" fmla="val 2473"/>
+              </a:avLst>
+            </a:prstGeom>
+            <a:solidFill>
+              <a:srgbClr val="FFFCF5"/>
+            </a:solidFill>
+            <a:ln>
+              <a:solidFill>
+                <a:schemeClr val="tx1">
+                  <a:lumMod val="85000"/>
+                  <a:lumOff val="15000"/>
+                </a:schemeClr>
+              </a:solidFill>
+            </a:ln>
+          </p:spPr>
+          <p:style>
+            <a:lnRef idx="2">
+              <a:schemeClr val="accent1">
+                <a:shade val="50000"/>
+              </a:schemeClr>
+            </a:lnRef>
+            <a:fillRef idx="1">
+              <a:schemeClr val="accent1"/>
+            </a:fillRef>
+            <a:effectRef idx="0">
+              <a:schemeClr val="accent1"/>
+            </a:effectRef>
+            <a:fontRef idx="minor">
+              <a:schemeClr val="lt1"/>
+            </a:fontRef>
+          </p:style>
+          <p:txBody>
+            <a:bodyPr rtlCol="0" anchor="ctr"/>
+            <a:lstStyle/>
+            <a:p>
+              <a:pPr algn="ctr"/>
+              <a:endParaRPr lang="en-GB"/>
+            </a:p>
+          </p:txBody>
+        </p:sp>
+        <p:grpSp>
+          <p:nvGrpSpPr>
+            <p:cNvPr id="95" name="Group 94">
+              <a:extLst>
+                <a:ext uri="{FF2B5EF4-FFF2-40B4-BE49-F238E27FC236}">
+                  <a16:creationId xmlns:a16="http://schemas.microsoft.com/office/drawing/2014/main" id="{0C3E82EF-00E0-8541-0DB2-CFED4708273E}"/>
+                </a:ext>
+              </a:extLst>
+            </p:cNvPr>
+            <p:cNvGrpSpPr/>
+            <p:nvPr/>
+          </p:nvGrpSpPr>
+          <p:grpSpPr>
+            <a:xfrm>
+              <a:off x="4217359" y="1797786"/>
+              <a:ext cx="5324206" cy="2175744"/>
+              <a:chOff x="4217359" y="1797786"/>
+              <a:chExt cx="5324206" cy="2175744"/>
+            </a:xfrm>
+          </p:grpSpPr>
+          <p:sp>
+            <p:nvSpPr>
+              <p:cNvPr id="96" name="TextBox 95">
+                <a:extLst>
+                  <a:ext uri="{FF2B5EF4-FFF2-40B4-BE49-F238E27FC236}">
+                    <a16:creationId xmlns:a16="http://schemas.microsoft.com/office/drawing/2014/main" id="{5FE34936-4955-EB83-F3F1-34120CE28205}"/>
+                  </a:ext>
+                </a:extLst>
+              </p:cNvPr>
+              <p:cNvSpPr txBox="1"/>
+              <p:nvPr/>
+            </p:nvSpPr>
+            <p:spPr>
+              <a:xfrm>
+                <a:off x="4217359" y="1986235"/>
+                <a:ext cx="1636737" cy="368049"/>
+              </a:xfrm>
+              <a:prstGeom prst="rect">
+                <a:avLst/>
+              </a:prstGeom>
+              <a:noFill/>
+            </p:spPr>
+            <p:txBody>
+              <a:bodyPr wrap="square" rtlCol="0">
+                <a:spAutoFit/>
+              </a:bodyPr>
+              <a:lstStyle/>
+              <a:p>
+                <a:pPr algn="ctr">
+                  <a:lnSpc>
+                    <a:spcPct val="120000"/>
+                  </a:lnSpc>
+                </a:pPr>
+                <a:r>
+                  <a:rPr lang="en-GB" sz="1600" b="1" dirty="0"/>
+                  <a:t>Windows</a:t>
+                </a:r>
+                <a:endParaRPr lang="en-GB" sz="1600" dirty="0"/>
+              </a:p>
+            </p:txBody>
+          </p:sp>
+          <p:sp>
+            <p:nvSpPr>
+              <p:cNvPr id="97" name="TextBox 96">
+                <a:extLst>
+                  <a:ext uri="{FF2B5EF4-FFF2-40B4-BE49-F238E27FC236}">
+                    <a16:creationId xmlns:a16="http://schemas.microsoft.com/office/drawing/2014/main" id="{E1FC87D0-FAC8-C0D6-6644-270CFA9D8550}"/>
+                  </a:ext>
+                </a:extLst>
+              </p:cNvPr>
+              <p:cNvSpPr txBox="1"/>
+              <p:nvPr/>
+            </p:nvSpPr>
+            <p:spPr>
+              <a:xfrm>
+                <a:off x="5854096" y="1995860"/>
+                <a:ext cx="1636737" cy="368049"/>
+              </a:xfrm>
+              <a:prstGeom prst="rect">
+                <a:avLst/>
+              </a:prstGeom>
+              <a:noFill/>
+            </p:spPr>
+            <p:txBody>
+              <a:bodyPr wrap="square" rtlCol="0">
+                <a:spAutoFit/>
+              </a:bodyPr>
+              <a:lstStyle/>
+              <a:p>
+                <a:pPr algn="ctr">
+                  <a:lnSpc>
+                    <a:spcPct val="120000"/>
+                  </a:lnSpc>
+                </a:pPr>
+                <a:r>
+                  <a:rPr lang="en-GB" sz="1600" b="1" dirty="0"/>
+                  <a:t>Unix</a:t>
+                </a:r>
+                <a:endParaRPr lang="en-GB" sz="1600" dirty="0"/>
+              </a:p>
+            </p:txBody>
+          </p:sp>
+          <p:sp>
+            <p:nvSpPr>
+              <p:cNvPr id="98" name="TextBox 97">
+                <a:extLst>
+                  <a:ext uri="{FF2B5EF4-FFF2-40B4-BE49-F238E27FC236}">
+                    <a16:creationId xmlns:a16="http://schemas.microsoft.com/office/drawing/2014/main" id="{4715D478-3F6B-D576-DDB8-5E454D29D2AD}"/>
+                  </a:ext>
+                </a:extLst>
+              </p:cNvPr>
+              <p:cNvSpPr txBox="1"/>
+              <p:nvPr/>
+            </p:nvSpPr>
+            <p:spPr>
+              <a:xfrm>
+                <a:off x="6336120" y="2853310"/>
+                <a:ext cx="1636737" cy="368049"/>
+              </a:xfrm>
+              <a:prstGeom prst="rect">
+                <a:avLst/>
+              </a:prstGeom>
+              <a:noFill/>
+            </p:spPr>
+            <p:txBody>
+              <a:bodyPr wrap="square" rtlCol="0">
+                <a:spAutoFit/>
+              </a:bodyPr>
+              <a:lstStyle/>
+              <a:p>
+                <a:pPr algn="ctr">
+                  <a:lnSpc>
+                    <a:spcPct val="120000"/>
+                  </a:lnSpc>
+                </a:pPr>
+                <a:r>
+                  <a:rPr lang="en-GB" sz="1600" b="1" dirty="0"/>
+                  <a:t>Linux</a:t>
+                </a:r>
+                <a:endParaRPr lang="en-GB" sz="1600" dirty="0"/>
+              </a:p>
+            </p:txBody>
+          </p:sp>
+          <p:sp>
+            <p:nvSpPr>
+              <p:cNvPr id="99" name="TextBox 98">
+                <a:extLst>
+                  <a:ext uri="{FF2B5EF4-FFF2-40B4-BE49-F238E27FC236}">
+                    <a16:creationId xmlns:a16="http://schemas.microsoft.com/office/drawing/2014/main" id="{00B96A36-63C7-F273-FED7-65F7889C5A0E}"/>
+                  </a:ext>
+                </a:extLst>
+              </p:cNvPr>
+              <p:cNvSpPr txBox="1"/>
+              <p:nvPr/>
+            </p:nvSpPr>
+            <p:spPr>
+              <a:xfrm>
+                <a:off x="5258236" y="2853311"/>
+                <a:ext cx="1636737" cy="368049"/>
+              </a:xfrm>
+              <a:prstGeom prst="rect">
+                <a:avLst/>
+              </a:prstGeom>
+              <a:noFill/>
+            </p:spPr>
+            <p:txBody>
+              <a:bodyPr wrap="square" rtlCol="0">
+                <a:spAutoFit/>
+              </a:bodyPr>
+              <a:lstStyle/>
+              <a:p>
+                <a:pPr algn="ctr">
+                  <a:lnSpc>
+                    <a:spcPct val="120000"/>
+                  </a:lnSpc>
+                </a:pPr>
+                <a:r>
+                  <a:rPr lang="en-GB" sz="1600" b="1" dirty="0"/>
+                  <a:t>MacOS</a:t>
+                </a:r>
+                <a:endParaRPr lang="en-GB" sz="1600" dirty="0"/>
+              </a:p>
+            </p:txBody>
+          </p:sp>
+          <p:sp>
+            <p:nvSpPr>
+              <p:cNvPr id="100" name="TextBox 99">
+                <a:extLst>
+                  <a:ext uri="{FF2B5EF4-FFF2-40B4-BE49-F238E27FC236}">
+                    <a16:creationId xmlns:a16="http://schemas.microsoft.com/office/drawing/2014/main" id="{459D4C32-B6A9-5C6A-332A-44F8E4EDF2E0}"/>
+                  </a:ext>
+                </a:extLst>
+              </p:cNvPr>
+              <p:cNvSpPr txBox="1"/>
+              <p:nvPr/>
+            </p:nvSpPr>
+            <p:spPr>
+              <a:xfrm>
+                <a:off x="5780064" y="3605481"/>
+                <a:ext cx="1636737" cy="368049"/>
+              </a:xfrm>
+              <a:prstGeom prst="rect">
+                <a:avLst/>
+              </a:prstGeom>
+              <a:noFill/>
+            </p:spPr>
+            <p:txBody>
+              <a:bodyPr wrap="square" rtlCol="0">
+                <a:spAutoFit/>
+              </a:bodyPr>
+              <a:lstStyle/>
+              <a:p>
+                <a:pPr algn="ctr">
+                  <a:lnSpc>
+                    <a:spcPct val="120000"/>
+                  </a:lnSpc>
+                </a:pPr>
+                <a:r>
+                  <a:rPr lang="en-GB" sz="1600" b="1" dirty="0"/>
+                  <a:t>Ubuntu</a:t>
+                </a:r>
+                <a:endParaRPr lang="en-GB" sz="1600" dirty="0"/>
+              </a:p>
+            </p:txBody>
+          </p:sp>
+          <p:sp>
+            <p:nvSpPr>
+              <p:cNvPr id="101" name="TextBox 100">
+                <a:extLst>
+                  <a:ext uri="{FF2B5EF4-FFF2-40B4-BE49-F238E27FC236}">
+                    <a16:creationId xmlns:a16="http://schemas.microsoft.com/office/drawing/2014/main" id="{B6422989-A2F1-1948-DB1B-22B30F045EE3}"/>
+                  </a:ext>
+                </a:extLst>
+              </p:cNvPr>
+              <p:cNvSpPr txBox="1"/>
+              <p:nvPr/>
+            </p:nvSpPr>
+            <p:spPr>
+              <a:xfrm>
+                <a:off x="7197436" y="3605481"/>
+                <a:ext cx="1636737" cy="368049"/>
+              </a:xfrm>
+              <a:prstGeom prst="rect">
+                <a:avLst/>
+              </a:prstGeom>
+              <a:noFill/>
+            </p:spPr>
+            <p:txBody>
+              <a:bodyPr wrap="square" rtlCol="0">
+                <a:spAutoFit/>
+              </a:bodyPr>
+              <a:lstStyle/>
+              <a:p>
+                <a:pPr algn="ctr">
+                  <a:lnSpc>
+                    <a:spcPct val="120000"/>
+                  </a:lnSpc>
+                </a:pPr>
+                <a:r>
+                  <a:rPr lang="en-GB" sz="1600" b="1" dirty="0"/>
+                  <a:t>Red Hat Linux</a:t>
+                </a:r>
+                <a:endParaRPr lang="en-GB" sz="1600" dirty="0"/>
+              </a:p>
+            </p:txBody>
+          </p:sp>
+          <p:cxnSp>
+            <p:nvCxnSpPr>
+              <p:cNvPr id="102" name="Straight Arrow Connector 101">
+                <a:extLst>
+                  <a:ext uri="{FF2B5EF4-FFF2-40B4-BE49-F238E27FC236}">
+                    <a16:creationId xmlns:a16="http://schemas.microsoft.com/office/drawing/2014/main" id="{88C09E48-721C-2346-0DB9-3C35938D45BB}"/>
+                  </a:ext>
+                </a:extLst>
+              </p:cNvPr>
+              <p:cNvCxnSpPr>
+                <a:cxnSpLocks/>
+              </p:cNvCxnSpPr>
+              <p:nvPr/>
+            </p:nvCxnSpPr>
+            <p:spPr>
+              <a:xfrm flipH="1">
+                <a:off x="6385520" y="2434759"/>
+                <a:ext cx="214963" cy="499027"/>
+              </a:xfrm>
+              <a:prstGeom prst="straightConnector1">
+                <a:avLst/>
+              </a:prstGeom>
+              <a:ln w="19050">
                 <a:solidFill>
-                  <a:prstClr val="black"/>
+                  <a:schemeClr val="tx1">
+                    <a:lumMod val="85000"/>
+                    <a:lumOff val="15000"/>
+                  </a:schemeClr>
                 </a:solidFill>
-                <a:effectLst/>
-                <a:uLnTx/>
-                <a:uFillTx/>
-                <a:latin typeface="Calibri" panose="020F0502020204030204"/>
-                <a:ea typeface="+mn-ea"/>
-                <a:cs typeface="+mn-cs"/>
+                <a:tailEnd type="triangle" w="sm" len="sm"/>
+              </a:ln>
+            </p:spPr>
+            <p:style>
+              <a:lnRef idx="1">
+                <a:schemeClr val="accent1"/>
+              </a:lnRef>
+              <a:fillRef idx="0">
+                <a:schemeClr val="accent1"/>
+              </a:fillRef>
+              <a:effectRef idx="0">
+                <a:schemeClr val="accent1"/>
+              </a:effectRef>
+              <a:fontRef idx="minor">
+                <a:schemeClr val="tx1"/>
+              </a:fontRef>
+            </p:style>
+          </p:cxnSp>
+          <p:cxnSp>
+            <p:nvCxnSpPr>
+              <p:cNvPr id="103" name="Straight Arrow Connector 102">
+                <a:extLst>
+                  <a:ext uri="{FF2B5EF4-FFF2-40B4-BE49-F238E27FC236}">
+                    <a16:creationId xmlns:a16="http://schemas.microsoft.com/office/drawing/2014/main" id="{D7D120EE-F6C6-E980-5348-03282C0F90AE}"/>
+                  </a:ext>
+                </a:extLst>
+              </p:cNvPr>
+              <p:cNvCxnSpPr>
+                <a:cxnSpLocks/>
+              </p:cNvCxnSpPr>
+              <p:nvPr/>
+            </p:nvCxnSpPr>
+            <p:spPr>
+              <a:xfrm>
+                <a:off x="6719881" y="2434759"/>
+                <a:ext cx="181347" cy="499027"/>
+              </a:xfrm>
+              <a:prstGeom prst="straightConnector1">
+                <a:avLst/>
+              </a:prstGeom>
+              <a:ln w="19050">
+                <a:solidFill>
+                  <a:schemeClr val="tx1">
+                    <a:lumMod val="85000"/>
+                    <a:lumOff val="15000"/>
+                  </a:schemeClr>
+                </a:solidFill>
+                <a:tailEnd type="triangle" w="sm" len="sm"/>
+              </a:ln>
+            </p:spPr>
+            <p:style>
+              <a:lnRef idx="1">
+                <a:schemeClr val="accent1"/>
+              </a:lnRef>
+              <a:fillRef idx="0">
+                <a:schemeClr val="accent1"/>
+              </a:fillRef>
+              <a:effectRef idx="0">
+                <a:schemeClr val="accent1"/>
+              </a:effectRef>
+              <a:fontRef idx="minor">
+                <a:schemeClr val="tx1"/>
+              </a:fontRef>
+            </p:style>
+          </p:cxnSp>
+          <p:cxnSp>
+            <p:nvCxnSpPr>
+              <p:cNvPr id="104" name="Straight Arrow Connector 103">
+                <a:extLst>
+                  <a:ext uri="{FF2B5EF4-FFF2-40B4-BE49-F238E27FC236}">
+                    <a16:creationId xmlns:a16="http://schemas.microsoft.com/office/drawing/2014/main" id="{5DE78F97-871D-D860-2214-2484AF4C8C9B}"/>
+                  </a:ext>
+                </a:extLst>
+              </p:cNvPr>
+              <p:cNvCxnSpPr>
+                <a:cxnSpLocks/>
+              </p:cNvCxnSpPr>
+              <p:nvPr/>
+            </p:nvCxnSpPr>
+            <p:spPr>
+              <a:xfrm flipH="1">
+                <a:off x="6918722" y="3185334"/>
+                <a:ext cx="42948" cy="467274"/>
+              </a:xfrm>
+              <a:prstGeom prst="straightConnector1">
+                <a:avLst/>
+              </a:prstGeom>
+              <a:ln w="19050">
+                <a:solidFill>
+                  <a:schemeClr val="tx1">
+                    <a:lumMod val="85000"/>
+                    <a:lumOff val="15000"/>
+                  </a:schemeClr>
+                </a:solidFill>
+                <a:tailEnd type="triangle" w="sm" len="sm"/>
+              </a:ln>
+            </p:spPr>
+            <p:style>
+              <a:lnRef idx="1">
+                <a:schemeClr val="accent1"/>
+              </a:lnRef>
+              <a:fillRef idx="0">
+                <a:schemeClr val="accent1"/>
+              </a:fillRef>
+              <a:effectRef idx="0">
+                <a:schemeClr val="accent1"/>
+              </a:effectRef>
+              <a:fontRef idx="minor">
+                <a:schemeClr val="tx1"/>
+              </a:fontRef>
+            </p:style>
+          </p:cxnSp>
+          <p:cxnSp>
+            <p:nvCxnSpPr>
+              <p:cNvPr id="105" name="Straight Arrow Connector 104">
+                <a:extLst>
+                  <a:ext uri="{FF2B5EF4-FFF2-40B4-BE49-F238E27FC236}">
+                    <a16:creationId xmlns:a16="http://schemas.microsoft.com/office/drawing/2014/main" id="{5519A311-A4DF-D1BA-EA72-6FA335651A49}"/>
+                  </a:ext>
+                </a:extLst>
+              </p:cNvPr>
+              <p:cNvCxnSpPr>
+                <a:cxnSpLocks/>
+              </p:cNvCxnSpPr>
+              <p:nvPr/>
+            </p:nvCxnSpPr>
+            <p:spPr>
+              <a:xfrm>
+                <a:off x="7383000" y="3175793"/>
+                <a:ext cx="107833" cy="460041"/>
+              </a:xfrm>
+              <a:prstGeom prst="straightConnector1">
+                <a:avLst/>
+              </a:prstGeom>
+              <a:ln w="19050">
+                <a:solidFill>
+                  <a:schemeClr val="tx1">
+                    <a:lumMod val="85000"/>
+                    <a:lumOff val="15000"/>
+                  </a:schemeClr>
+                </a:solidFill>
+                <a:tailEnd type="triangle" w="sm" len="sm"/>
+              </a:ln>
+            </p:spPr>
+            <p:style>
+              <a:lnRef idx="1">
+                <a:schemeClr val="accent1"/>
+              </a:lnRef>
+              <a:fillRef idx="0">
+                <a:schemeClr val="accent1"/>
+              </a:fillRef>
+              <a:effectRef idx="0">
+                <a:schemeClr val="accent1"/>
+              </a:effectRef>
+              <a:fontRef idx="minor">
+                <a:schemeClr val="tx1"/>
+              </a:fontRef>
+            </p:style>
+          </p:cxnSp>
+          <p:sp>
+            <p:nvSpPr>
+              <p:cNvPr id="106" name="TextBox 105">
+                <a:extLst>
+                  <a:ext uri="{FF2B5EF4-FFF2-40B4-BE49-F238E27FC236}">
+                    <a16:creationId xmlns:a16="http://schemas.microsoft.com/office/drawing/2014/main" id="{93D747E3-60A3-4F82-D14C-431207ABC732}"/>
+                  </a:ext>
+                </a:extLst>
+              </p:cNvPr>
+              <p:cNvSpPr txBox="1"/>
+              <p:nvPr/>
+            </p:nvSpPr>
+            <p:spPr>
+              <a:xfrm>
+                <a:off x="4234370" y="2185704"/>
+                <a:ext cx="1636737" cy="281937"/>
+              </a:xfrm>
+              <a:prstGeom prst="rect">
+                <a:avLst/>
+              </a:prstGeom>
+              <a:noFill/>
+            </p:spPr>
+            <p:txBody>
+              <a:bodyPr wrap="square" rtlCol="0">
+                <a:spAutoFit/>
+              </a:bodyPr>
+              <a:lstStyle/>
+              <a:p>
+                <a:pPr algn="ctr">
+                  <a:lnSpc>
+                    <a:spcPct val="120000"/>
+                  </a:lnSpc>
+                </a:pPr>
+                <a:r>
+                  <a:rPr lang="en-GB" sz="1050" i="1" dirty="0"/>
+                  <a:t>PowerShell</a:t>
+                </a:r>
+              </a:p>
+            </p:txBody>
+          </p:sp>
+          <p:sp>
+            <p:nvSpPr>
+              <p:cNvPr id="107" name="TextBox 106">
+                <a:extLst>
+                  <a:ext uri="{FF2B5EF4-FFF2-40B4-BE49-F238E27FC236}">
+                    <a16:creationId xmlns:a16="http://schemas.microsoft.com/office/drawing/2014/main" id="{0CE4725D-C53D-7F87-74B0-501D4418FEC2}"/>
+                  </a:ext>
+                </a:extLst>
+              </p:cNvPr>
+              <p:cNvSpPr txBox="1"/>
+              <p:nvPr/>
+            </p:nvSpPr>
+            <p:spPr>
+              <a:xfrm>
+                <a:off x="5841585" y="2195501"/>
+                <a:ext cx="1636737" cy="281937"/>
+              </a:xfrm>
+              <a:prstGeom prst="rect">
+                <a:avLst/>
+              </a:prstGeom>
+              <a:noFill/>
+            </p:spPr>
+            <p:txBody>
+              <a:bodyPr wrap="square" rtlCol="0">
+                <a:spAutoFit/>
+              </a:bodyPr>
+              <a:lstStyle/>
+              <a:p>
+                <a:pPr algn="ctr">
+                  <a:lnSpc>
+                    <a:spcPct val="120000"/>
+                  </a:lnSpc>
+                </a:pPr>
+                <a:r>
+                  <a:rPr lang="en-GB" sz="1050" i="1" dirty="0"/>
+                  <a:t>Bash</a:t>
+                </a:r>
+              </a:p>
+            </p:txBody>
+          </p:sp>
+          <p:cxnSp>
+            <p:nvCxnSpPr>
+              <p:cNvPr id="108" name="Straight Arrow Connector 107">
+                <a:extLst>
+                  <a:ext uri="{FF2B5EF4-FFF2-40B4-BE49-F238E27FC236}">
+                    <a16:creationId xmlns:a16="http://schemas.microsoft.com/office/drawing/2014/main" id="{93A3F3E4-A5ED-933B-BD65-5F43AE0E5027}"/>
+                  </a:ext>
+                </a:extLst>
+              </p:cNvPr>
+              <p:cNvCxnSpPr>
+                <a:cxnSpLocks/>
+              </p:cNvCxnSpPr>
+              <p:nvPr/>
+            </p:nvCxnSpPr>
+            <p:spPr>
+              <a:xfrm>
+                <a:off x="7544272" y="3137190"/>
+                <a:ext cx="556056" cy="323269"/>
+              </a:xfrm>
+              <a:prstGeom prst="straightConnector1">
+                <a:avLst/>
+              </a:prstGeom>
+              <a:ln w="19050">
+                <a:solidFill>
+                  <a:schemeClr val="tx1">
+                    <a:lumMod val="85000"/>
+                    <a:lumOff val="15000"/>
+                  </a:schemeClr>
+                </a:solidFill>
+                <a:tailEnd type="triangle" w="sm" len="sm"/>
+              </a:ln>
+            </p:spPr>
+            <p:style>
+              <a:lnRef idx="1">
+                <a:schemeClr val="accent1"/>
+              </a:lnRef>
+              <a:fillRef idx="0">
+                <a:schemeClr val="accent1"/>
+              </a:fillRef>
+              <a:effectRef idx="0">
+                <a:schemeClr val="accent1"/>
+              </a:effectRef>
+              <a:fontRef idx="minor">
+                <a:schemeClr val="tx1"/>
+              </a:fontRef>
+            </p:style>
+          </p:cxnSp>
+          <p:sp>
+            <p:nvSpPr>
+              <p:cNvPr id="109" name="TextBox 108">
+                <a:extLst>
+                  <a:ext uri="{FF2B5EF4-FFF2-40B4-BE49-F238E27FC236}">
+                    <a16:creationId xmlns:a16="http://schemas.microsoft.com/office/drawing/2014/main" id="{DB7E9538-01DC-CD4E-1B20-76DA75E9642C}"/>
+                  </a:ext>
+                </a:extLst>
+              </p:cNvPr>
+              <p:cNvSpPr txBox="1"/>
+              <p:nvPr/>
+            </p:nvSpPr>
+            <p:spPr>
+              <a:xfrm>
+                <a:off x="7904828" y="3311265"/>
+                <a:ext cx="1636737" cy="368049"/>
+              </a:xfrm>
+              <a:prstGeom prst="rect">
+                <a:avLst/>
+              </a:prstGeom>
+              <a:noFill/>
+            </p:spPr>
+            <p:txBody>
+              <a:bodyPr wrap="square" rtlCol="0">
+                <a:spAutoFit/>
+              </a:bodyPr>
+              <a:lstStyle/>
+              <a:p>
+                <a:pPr algn="ctr">
+                  <a:lnSpc>
+                    <a:spcPct val="120000"/>
+                  </a:lnSpc>
+                </a:pPr>
+                <a:r>
+                  <a:rPr lang="en-GB" sz="1600" b="1" dirty="0"/>
+                  <a:t>+many more</a:t>
+                </a:r>
+                <a:endParaRPr lang="en-GB" sz="1600" dirty="0"/>
+              </a:p>
+            </p:txBody>
+          </p:sp>
+          <p:sp>
+            <p:nvSpPr>
+              <p:cNvPr id="110" name="TextBox 109">
+                <a:extLst>
+                  <a:ext uri="{FF2B5EF4-FFF2-40B4-BE49-F238E27FC236}">
+                    <a16:creationId xmlns:a16="http://schemas.microsoft.com/office/drawing/2014/main" id="{B8580C07-0DC4-6C06-3880-D9FF3C8634C7}"/>
+                  </a:ext>
+                </a:extLst>
+              </p:cNvPr>
+              <p:cNvSpPr txBox="1"/>
+              <p:nvPr/>
+            </p:nvSpPr>
+            <p:spPr>
+              <a:xfrm>
+                <a:off x="7208279" y="1797786"/>
+                <a:ext cx="1636737" cy="673454"/>
+              </a:xfrm>
+              <a:prstGeom prst="rect">
+                <a:avLst/>
+              </a:prstGeom>
+              <a:noFill/>
+            </p:spPr>
+            <p:txBody>
+              <a:bodyPr wrap="square" rtlCol="0">
+                <a:spAutoFit/>
+              </a:bodyPr>
+              <a:lstStyle/>
+              <a:p>
+                <a:pPr algn="ctr">
+                  <a:lnSpc>
+                    <a:spcPct val="120000"/>
+                  </a:lnSpc>
+                </a:pPr>
+                <a:r>
+                  <a:rPr lang="en-GB" sz="800" i="1" dirty="0"/>
+                  <a:t>Unix based OS are popular with servers due to </a:t>
+                </a:r>
+                <a:r>
+                  <a:rPr lang="en-US" sz="800" i="1" dirty="0"/>
+                  <a:t>their stability, security, flexibility and the fact the majority are open source (free)</a:t>
+                </a:r>
+                <a:endParaRPr lang="en-GB" sz="800" i="1" dirty="0"/>
+              </a:p>
+            </p:txBody>
+          </p:sp>
+          <p:sp>
+            <p:nvSpPr>
+              <p:cNvPr id="111" name="TextBox 110">
+                <a:extLst>
+                  <a:ext uri="{FF2B5EF4-FFF2-40B4-BE49-F238E27FC236}">
+                    <a16:creationId xmlns:a16="http://schemas.microsoft.com/office/drawing/2014/main" id="{5872CFAD-BAFC-F4BC-5CD2-3C4091AE73D5}"/>
+                  </a:ext>
+                </a:extLst>
+              </p:cNvPr>
+              <p:cNvSpPr txBox="1"/>
+              <p:nvPr/>
+            </p:nvSpPr>
+            <p:spPr>
+              <a:xfrm>
+                <a:off x="7363211" y="2429562"/>
+                <a:ext cx="1452664" cy="415498"/>
+              </a:xfrm>
+              <a:prstGeom prst="rect">
+                <a:avLst/>
+              </a:prstGeom>
+              <a:noFill/>
+            </p:spPr>
+            <p:txBody>
+              <a:bodyPr wrap="square">
+                <a:spAutoFit/>
+              </a:bodyPr>
+              <a:lstStyle/>
+              <a:p>
+                <a:r>
+                  <a:rPr lang="en-GB" sz="700" dirty="0">
+                    <a:hlinkClick r:id="rId3"/>
+                  </a:rPr>
+                  <a:t>https://www.quora.com/Why-is-Linux-commonly-used-on-servers</a:t>
+                </a:r>
+                <a:endParaRPr lang="en-GB" sz="700" dirty="0"/>
+              </a:p>
+              <a:p>
+                <a:endParaRPr lang="en-GB" sz="700" dirty="0"/>
+              </a:p>
+            </p:txBody>
+          </p:sp>
+          <p:sp>
+            <p:nvSpPr>
+              <p:cNvPr id="112" name="TextBox 111">
+                <a:extLst>
+                  <a:ext uri="{FF2B5EF4-FFF2-40B4-BE49-F238E27FC236}">
+                    <a16:creationId xmlns:a16="http://schemas.microsoft.com/office/drawing/2014/main" id="{28C3D6A7-DA1C-F921-7C87-EF5FB78242C9}"/>
+                  </a:ext>
+                </a:extLst>
+              </p:cNvPr>
+              <p:cNvSpPr txBox="1"/>
+              <p:nvPr/>
+            </p:nvSpPr>
+            <p:spPr>
+              <a:xfrm>
+                <a:off x="4227060" y="2062253"/>
+                <a:ext cx="495662" cy="235877"/>
+              </a:xfrm>
+              <a:prstGeom prst="rect">
+                <a:avLst/>
+              </a:prstGeom>
+              <a:noFill/>
+            </p:spPr>
+            <p:txBody>
+              <a:bodyPr wrap="square" rtlCol="0">
+                <a:spAutoFit/>
+              </a:bodyPr>
+              <a:lstStyle/>
+              <a:p>
+                <a:pPr algn="ctr">
+                  <a:lnSpc>
+                    <a:spcPct val="120000"/>
+                  </a:lnSpc>
+                </a:pPr>
+                <a:r>
+                  <a:rPr lang="en-GB" sz="800" i="1" dirty="0"/>
+                  <a:t>1985</a:t>
+                </a:r>
+              </a:p>
+            </p:txBody>
+          </p:sp>
+          <p:sp>
+            <p:nvSpPr>
+              <p:cNvPr id="113" name="TextBox 112">
+                <a:extLst>
+                  <a:ext uri="{FF2B5EF4-FFF2-40B4-BE49-F238E27FC236}">
+                    <a16:creationId xmlns:a16="http://schemas.microsoft.com/office/drawing/2014/main" id="{682956A7-3267-D802-4E8C-4BC42CD7307D}"/>
+                  </a:ext>
+                </a:extLst>
+              </p:cNvPr>
+              <p:cNvSpPr txBox="1"/>
+              <p:nvPr/>
+            </p:nvSpPr>
+            <p:spPr>
+              <a:xfrm>
+                <a:off x="5360219" y="2927118"/>
+                <a:ext cx="495662" cy="235877"/>
+              </a:xfrm>
+              <a:prstGeom prst="rect">
+                <a:avLst/>
+              </a:prstGeom>
+              <a:noFill/>
+            </p:spPr>
+            <p:txBody>
+              <a:bodyPr wrap="square" rtlCol="0">
+                <a:spAutoFit/>
+              </a:bodyPr>
+              <a:lstStyle/>
+              <a:p>
+                <a:pPr algn="ctr">
+                  <a:lnSpc>
+                    <a:spcPct val="120000"/>
+                  </a:lnSpc>
+                </a:pPr>
+                <a:r>
+                  <a:rPr lang="en-GB" sz="800" i="1" dirty="0"/>
+                  <a:t>1984</a:t>
+                </a:r>
+              </a:p>
+            </p:txBody>
+          </p:sp>
+          <p:sp>
+            <p:nvSpPr>
+              <p:cNvPr id="114" name="TextBox 113">
+                <a:extLst>
+                  <a:ext uri="{FF2B5EF4-FFF2-40B4-BE49-F238E27FC236}">
+                    <a16:creationId xmlns:a16="http://schemas.microsoft.com/office/drawing/2014/main" id="{2AB88148-26A7-15F5-2F11-2FD834A255A9}"/>
+                  </a:ext>
+                </a:extLst>
+              </p:cNvPr>
+              <p:cNvSpPr txBox="1"/>
+              <p:nvPr/>
+            </p:nvSpPr>
+            <p:spPr>
+              <a:xfrm>
+                <a:off x="6062392" y="2083263"/>
+                <a:ext cx="495662" cy="235877"/>
+              </a:xfrm>
+              <a:prstGeom prst="rect">
+                <a:avLst/>
+              </a:prstGeom>
+              <a:noFill/>
+            </p:spPr>
+            <p:txBody>
+              <a:bodyPr wrap="square" rtlCol="0">
+                <a:spAutoFit/>
+              </a:bodyPr>
+              <a:lstStyle/>
+              <a:p>
+                <a:pPr algn="ctr">
+                  <a:lnSpc>
+                    <a:spcPct val="120000"/>
+                  </a:lnSpc>
+                </a:pPr>
+                <a:r>
+                  <a:rPr lang="en-GB" sz="800" i="1" dirty="0"/>
+                  <a:t>1969</a:t>
+                </a:r>
+              </a:p>
+            </p:txBody>
+          </p:sp>
+          <p:sp>
+            <p:nvSpPr>
+              <p:cNvPr id="115" name="TextBox 114">
+                <a:extLst>
+                  <a:ext uri="{FF2B5EF4-FFF2-40B4-BE49-F238E27FC236}">
+                    <a16:creationId xmlns:a16="http://schemas.microsoft.com/office/drawing/2014/main" id="{5D397875-EEA8-28D2-08B3-150AE32F0190}"/>
+                  </a:ext>
+                </a:extLst>
+              </p:cNvPr>
+              <p:cNvSpPr txBox="1"/>
+              <p:nvPr/>
+            </p:nvSpPr>
+            <p:spPr>
+              <a:xfrm>
+                <a:off x="6542093" y="2936903"/>
+                <a:ext cx="495662" cy="235877"/>
+              </a:xfrm>
+              <a:prstGeom prst="rect">
+                <a:avLst/>
+              </a:prstGeom>
+              <a:noFill/>
+            </p:spPr>
+            <p:txBody>
+              <a:bodyPr wrap="square" rtlCol="0">
+                <a:spAutoFit/>
+              </a:bodyPr>
+              <a:lstStyle/>
+              <a:p>
+                <a:pPr algn="ctr">
+                  <a:lnSpc>
+                    <a:spcPct val="120000"/>
+                  </a:lnSpc>
+                </a:pPr>
+                <a:r>
+                  <a:rPr lang="en-GB" sz="800" i="1" dirty="0"/>
+                  <a:t>1991</a:t>
+                </a:r>
+              </a:p>
+            </p:txBody>
+          </p:sp>
+          <p:sp>
+            <p:nvSpPr>
+              <p:cNvPr id="116" name="TextBox 115">
+                <a:extLst>
+                  <a:ext uri="{FF2B5EF4-FFF2-40B4-BE49-F238E27FC236}">
+                    <a16:creationId xmlns:a16="http://schemas.microsoft.com/office/drawing/2014/main" id="{126CDB35-0CA8-F306-E11A-827F1CFB350E}"/>
+                  </a:ext>
+                </a:extLst>
+              </p:cNvPr>
+              <p:cNvSpPr txBox="1"/>
+              <p:nvPr/>
+            </p:nvSpPr>
+            <p:spPr>
+              <a:xfrm>
+                <a:off x="5903899" y="3682615"/>
+                <a:ext cx="495662" cy="235877"/>
+              </a:xfrm>
+              <a:prstGeom prst="rect">
+                <a:avLst/>
+              </a:prstGeom>
+              <a:noFill/>
+            </p:spPr>
+            <p:txBody>
+              <a:bodyPr wrap="square" rtlCol="0">
+                <a:spAutoFit/>
+              </a:bodyPr>
+              <a:lstStyle/>
+              <a:p>
+                <a:pPr algn="ctr">
+                  <a:lnSpc>
+                    <a:spcPct val="120000"/>
+                  </a:lnSpc>
+                </a:pPr>
+                <a:r>
+                  <a:rPr lang="en-GB" sz="800" i="1" dirty="0"/>
+                  <a:t>2004</a:t>
+                </a:r>
+              </a:p>
+            </p:txBody>
+          </p:sp>
+          <p:sp>
+            <p:nvSpPr>
+              <p:cNvPr id="117" name="TextBox 116">
+                <a:extLst>
+                  <a:ext uri="{FF2B5EF4-FFF2-40B4-BE49-F238E27FC236}">
+                    <a16:creationId xmlns:a16="http://schemas.microsoft.com/office/drawing/2014/main" id="{0C0D670D-1283-7D71-7691-BD9BFC8C968E}"/>
+                  </a:ext>
+                </a:extLst>
+              </p:cNvPr>
+              <p:cNvSpPr txBox="1"/>
+              <p:nvPr/>
+            </p:nvSpPr>
+            <p:spPr>
+              <a:xfrm>
+                <a:off x="7052790" y="3686743"/>
+                <a:ext cx="495662" cy="235877"/>
+              </a:xfrm>
+              <a:prstGeom prst="rect">
+                <a:avLst/>
+              </a:prstGeom>
+              <a:noFill/>
+            </p:spPr>
+            <p:txBody>
+              <a:bodyPr wrap="square" rtlCol="0">
+                <a:spAutoFit/>
+              </a:bodyPr>
+              <a:lstStyle/>
+              <a:p>
+                <a:pPr algn="ctr">
+                  <a:lnSpc>
+                    <a:spcPct val="120000"/>
+                  </a:lnSpc>
+                </a:pPr>
+                <a:r>
+                  <a:rPr lang="en-GB" sz="800" i="1" dirty="0"/>
+                  <a:t>1994</a:t>
+                </a:r>
+              </a:p>
+            </p:txBody>
+          </p:sp>
+        </p:grpSp>
+      </p:grpSp>
+      <p:sp>
+        <p:nvSpPr>
+          <p:cNvPr id="118" name="TextBox 117">
+            <a:extLst>
+              <a:ext uri="{FF2B5EF4-FFF2-40B4-BE49-F238E27FC236}">
+                <a16:creationId xmlns:a16="http://schemas.microsoft.com/office/drawing/2014/main" id="{FE93F503-74B7-C01A-DB4D-9EF5FCE32106}"/>
+              </a:ext>
+            </a:extLst>
+          </p:cNvPr>
+          <p:cNvSpPr txBox="1"/>
+          <p:nvPr/>
+        </p:nvSpPr>
+        <p:spPr>
+          <a:xfrm>
+            <a:off x="322469" y="3544014"/>
+            <a:ext cx="5763949" cy="3027239"/>
+          </a:xfrm>
+          <a:prstGeom prst="rect">
+            <a:avLst/>
+          </a:prstGeom>
+          <a:noFill/>
+        </p:spPr>
+        <p:txBody>
+          <a:bodyPr wrap="square" rtlCol="0">
+            <a:spAutoFit/>
+          </a:bodyPr>
+          <a:lstStyle/>
+          <a:p>
+            <a:pPr marL="285750" indent="-285750">
+              <a:lnSpc>
+                <a:spcPct val="120000"/>
+              </a:lnSpc>
+              <a:buFontTx/>
+              <a:buChar char="-"/>
+            </a:pPr>
+            <a:r>
+              <a:rPr lang="en-GB" sz="1600" dirty="0"/>
+              <a:t>When going into cloud shell you do need to create or link a storage account.</a:t>
+            </a:r>
+          </a:p>
+          <a:p>
+            <a:pPr marL="285750" indent="-285750">
+              <a:lnSpc>
+                <a:spcPct val="120000"/>
+              </a:lnSpc>
+              <a:buFontTx/>
+              <a:buChar char="-"/>
+            </a:pPr>
+            <a:r>
+              <a:rPr lang="en-GB" sz="1600" dirty="0"/>
+              <a:t>Say you need to create a VM, you could write a script for that and run it in the CLI or PowerShell so you don’t need to interact with the portal; it can speed processes up.</a:t>
+            </a:r>
+          </a:p>
+          <a:p>
+            <a:pPr marL="285750" indent="-285750">
+              <a:lnSpc>
+                <a:spcPct val="120000"/>
+              </a:lnSpc>
+              <a:buFontTx/>
+              <a:buChar char="-"/>
+            </a:pPr>
+            <a:r>
+              <a:rPr lang="en-GB" sz="1600" dirty="0"/>
+              <a:t>All Azure specific commands start with the ‘az’ such as the following:</a:t>
+            </a:r>
+          </a:p>
+          <a:p>
+            <a:pPr marL="285750" indent="-285750">
+              <a:lnSpc>
+                <a:spcPct val="120000"/>
+              </a:lnSpc>
+              <a:buFontTx/>
+              <a:buChar char="-"/>
+            </a:pPr>
+            <a:r>
+              <a:rPr lang="en-GB" sz="1600" dirty="0">
+                <a:highlight>
+                  <a:srgbClr val="FFF7E0"/>
+                </a:highlight>
               </a:rPr>
-              <a:t>Section 13</a:t>
-            </a:r>
-          </a:p>
-          <a:p>
-            <a:pPr marL="0" marR="0" lvl="0" indent="0" algn="ctr" defTabSz="914400" rtl="0" eaLnBrk="1" fontAlgn="auto" latinLnBrk="0" hangingPunct="1">
-              <a:lnSpc>
-                <a:spcPct val="100000"/>
-              </a:lnSpc>
-              <a:spcBef>
-                <a:spcPts val="0"/>
-              </a:spcBef>
-              <a:spcAft>
-                <a:spcPts val="0"/>
-              </a:spcAft>
-              <a:buClrTx/>
-              <a:buSzTx/>
+              <a:t>$ az group create –name newrg –location eastus</a:t>
+            </a:r>
+          </a:p>
+          <a:p>
+            <a:pPr marL="285750" indent="-285750">
+              <a:lnSpc>
+                <a:spcPct val="120000"/>
+              </a:lnSpc>
               <a:buFontTx/>
-              <a:buNone/>
-              <a:tabLst/>
-              <a:defRPr/>
-            </a:pPr>
-            <a:endParaRPr kumimoji="0" lang="en-GB" sz="3200" b="1" i="0" u="none" strike="noStrike" kern="1200" cap="none" spc="0" normalizeH="0" baseline="0" noProof="0" dirty="0">
-              <a:ln>
-                <a:noFill/>
-              </a:ln>
-              <a:solidFill>
-                <a:prstClr val="black"/>
-              </a:solidFill>
-              <a:effectLst/>
-              <a:uLnTx/>
-              <a:uFillTx/>
-              <a:latin typeface="Calibri" panose="020F0502020204030204"/>
-              <a:ea typeface="+mn-ea"/>
-              <a:cs typeface="+mn-cs"/>
-            </a:endParaRPr>
-          </a:p>
-          <a:p>
-            <a:pPr marL="0" marR="0" lvl="0" indent="0" algn="ctr" defTabSz="914400" rtl="0" eaLnBrk="1" fontAlgn="auto" latinLnBrk="0" hangingPunct="1">
-              <a:lnSpc>
-                <a:spcPct val="100000"/>
-              </a:lnSpc>
-              <a:spcBef>
-                <a:spcPts val="0"/>
-              </a:spcBef>
-              <a:spcAft>
-                <a:spcPts val="0"/>
-              </a:spcAft>
-              <a:buClrTx/>
-              <a:buSzTx/>
-              <a:buFontTx/>
-              <a:buNone/>
-              <a:tabLst/>
-              <a:defRPr/>
-            </a:pPr>
-            <a:r>
-              <a:rPr kumimoji="0" lang="en-GB" sz="3200" b="1" i="0" u="none" strike="noStrike" kern="1200" cap="none" spc="0" normalizeH="0" baseline="0" noProof="0" dirty="0">
-                <a:ln>
-                  <a:noFill/>
-                </a:ln>
-                <a:solidFill>
-                  <a:prstClr val="black"/>
-                </a:solidFill>
-                <a:effectLst/>
-                <a:uLnTx/>
-                <a:uFillTx/>
-                <a:latin typeface="Calibri" panose="020F0502020204030204"/>
-                <a:ea typeface="+mn-ea"/>
-                <a:cs typeface="+mn-cs"/>
-              </a:rPr>
-              <a:t>Monitoring Tools</a:t>
+              <a:buChar char="-"/>
+            </a:pPr>
+            <a:r>
+              <a:rPr lang="en-GB" sz="1600" dirty="0"/>
+              <a:t>Typically though this would be inside a script which is then run in the CLI as often we need to specify many more variables.</a:t>
             </a:r>
           </a:p>
         </p:txBody>
@@ -31734,7 +33187,7 @@
     </p:spTree>
     <p:extLst>
       <p:ext uri="{BB962C8B-B14F-4D97-AF65-F5344CB8AC3E}">
-        <p14:creationId xmlns:p14="http://schemas.microsoft.com/office/powerpoint/2010/main" val="1136276068"/>
+        <p14:creationId xmlns:p14="http://schemas.microsoft.com/office/powerpoint/2010/main" val="3296152370"/>
       </p:ext>
     </p:extLst>
   </p:cSld>
@@ -32530,6 +33983,1111 @@
     <p:extLst>
       <p:ext uri="{BB962C8B-B14F-4D97-AF65-F5344CB8AC3E}">
         <p14:creationId xmlns:p14="http://schemas.microsoft.com/office/powerpoint/2010/main" val="2487380005"/>
+      </p:ext>
+    </p:extLst>
+  </p:cSld>
+  <p:clrMapOvr>
+    <a:masterClrMapping/>
+  </p:clrMapOvr>
+</p:sld>
+</file>
+
+<file path=ppt/slides/slide50.xml><?xml version="1.0" encoding="utf-8"?>
+<p:sld xmlns:a="http://schemas.openxmlformats.org/drawingml/2006/main" xmlns:r="http://schemas.openxmlformats.org/officeDocument/2006/relationships" xmlns:p="http://schemas.openxmlformats.org/presentationml/2006/main">
+  <p:cSld>
+    <p:spTree>
+      <p:nvGrpSpPr>
+        <p:cNvPr id="1" name=""/>
+        <p:cNvGrpSpPr/>
+        <p:nvPr/>
+      </p:nvGrpSpPr>
+      <p:grpSpPr>
+        <a:xfrm>
+          <a:off x="0" y="0"/>
+          <a:ext cx="0" cy="0"/>
+          <a:chOff x="0" y="0"/>
+          <a:chExt cx="0" cy="0"/>
+        </a:xfrm>
+      </p:grpSpPr>
+      <p:grpSp>
+        <p:nvGrpSpPr>
+          <p:cNvPr id="18" name="Group 17">
+            <a:extLst>
+              <a:ext uri="{FF2B5EF4-FFF2-40B4-BE49-F238E27FC236}">
+                <a16:creationId xmlns:a16="http://schemas.microsoft.com/office/drawing/2014/main" id="{6185BE9B-87C8-4B46-9293-0E71CF17E76A}"/>
+              </a:ext>
+            </a:extLst>
+          </p:cNvPr>
+          <p:cNvGrpSpPr/>
+          <p:nvPr/>
+        </p:nvGrpSpPr>
+        <p:grpSpPr>
+          <a:xfrm>
+            <a:off x="99755" y="83129"/>
+            <a:ext cx="11953701" cy="872834"/>
+            <a:chOff x="99755" y="83129"/>
+            <a:chExt cx="11953701" cy="872834"/>
+          </a:xfrm>
+        </p:grpSpPr>
+        <p:cxnSp>
+          <p:nvCxnSpPr>
+            <p:cNvPr id="5" name="Straight Connector 4">
+              <a:extLst>
+                <a:ext uri="{FF2B5EF4-FFF2-40B4-BE49-F238E27FC236}">
+                  <a16:creationId xmlns:a16="http://schemas.microsoft.com/office/drawing/2014/main" id="{A8BE4EF8-406C-4035-940C-AB752B29BA18}"/>
+                </a:ext>
+              </a:extLst>
+            </p:cNvPr>
+            <p:cNvCxnSpPr/>
+            <p:nvPr/>
+          </p:nvCxnSpPr>
+          <p:spPr>
+            <a:xfrm>
+              <a:off x="99755" y="955963"/>
+              <a:ext cx="11953701" cy="0"/>
+            </a:xfrm>
+            <a:prstGeom prst="line">
+              <a:avLst/>
+            </a:prstGeom>
+            <a:ln w="19050">
+              <a:solidFill>
+                <a:srgbClr val="0072C6"/>
+              </a:solidFill>
+            </a:ln>
+          </p:spPr>
+          <p:style>
+            <a:lnRef idx="1">
+              <a:schemeClr val="accent1"/>
+            </a:lnRef>
+            <a:fillRef idx="0">
+              <a:schemeClr val="accent1"/>
+            </a:fillRef>
+            <a:effectRef idx="0">
+              <a:schemeClr val="accent1"/>
+            </a:effectRef>
+            <a:fontRef idx="minor">
+              <a:schemeClr val="tx1"/>
+            </a:fontRef>
+          </p:style>
+        </p:cxnSp>
+        <p:sp>
+          <p:nvSpPr>
+            <p:cNvPr id="8" name="TextBox 7">
+              <a:extLst>
+                <a:ext uri="{FF2B5EF4-FFF2-40B4-BE49-F238E27FC236}">
+                  <a16:creationId xmlns:a16="http://schemas.microsoft.com/office/drawing/2014/main" id="{C61B684E-FDA7-4625-9CC3-79C17CC59ED7}"/>
+                </a:ext>
+              </a:extLst>
+            </p:cNvPr>
+            <p:cNvSpPr txBox="1"/>
+            <p:nvPr/>
+          </p:nvSpPr>
+          <p:spPr>
+            <a:xfrm>
+              <a:off x="4372494" y="142318"/>
+              <a:ext cx="2686392" cy="584775"/>
+            </a:xfrm>
+            <a:prstGeom prst="rect">
+              <a:avLst/>
+            </a:prstGeom>
+            <a:noFill/>
+          </p:spPr>
+          <p:txBody>
+            <a:bodyPr wrap="square" rtlCol="0">
+              <a:spAutoFit/>
+            </a:bodyPr>
+            <a:lstStyle/>
+            <a:p>
+              <a:pPr marL="0" marR="0" lvl="0" indent="0" algn="l" defTabSz="914400" rtl="0" eaLnBrk="1" fontAlgn="auto" latinLnBrk="0" hangingPunct="1">
+                <a:lnSpc>
+                  <a:spcPct val="100000"/>
+                </a:lnSpc>
+                <a:spcBef>
+                  <a:spcPts val="0"/>
+                </a:spcBef>
+                <a:spcAft>
+                  <a:spcPts val="0"/>
+                </a:spcAft>
+                <a:buClrTx/>
+                <a:buSzTx/>
+                <a:buFontTx/>
+                <a:buNone/>
+                <a:tabLst/>
+                <a:defRPr/>
+              </a:pPr>
+              <a:r>
+                <a:rPr kumimoji="0" lang="en-US" sz="1600" b="0" i="0" u="none" strike="noStrike" kern="1200" cap="none" spc="0" normalizeH="0" baseline="0" noProof="0" dirty="0">
+                  <a:ln>
+                    <a:noFill/>
+                  </a:ln>
+                  <a:solidFill>
+                    <a:prstClr val="black"/>
+                  </a:solidFill>
+                  <a:effectLst/>
+                  <a:uLnTx/>
+                  <a:uFillTx/>
+                  <a:latin typeface="Calibri" panose="020F0502020204030204"/>
+                  <a:ea typeface="+mn-ea"/>
+                  <a:cs typeface="+mn-cs"/>
+                </a:rPr>
+                <a:t>Tools for Managing and Deploying Azure Resources</a:t>
+              </a:r>
+            </a:p>
+          </p:txBody>
+        </p:sp>
+        <p:sp>
+          <p:nvSpPr>
+            <p:cNvPr id="9" name="TextBox 8">
+              <a:extLst>
+                <a:ext uri="{FF2B5EF4-FFF2-40B4-BE49-F238E27FC236}">
+                  <a16:creationId xmlns:a16="http://schemas.microsoft.com/office/drawing/2014/main" id="{F6943DFB-F258-4603-B2D8-7E2958123510}"/>
+                </a:ext>
+              </a:extLst>
+            </p:cNvPr>
+            <p:cNvSpPr txBox="1"/>
+            <p:nvPr/>
+          </p:nvSpPr>
+          <p:spPr>
+            <a:xfrm>
+              <a:off x="7197436" y="190641"/>
+              <a:ext cx="2155764" cy="646331"/>
+            </a:xfrm>
+            <a:prstGeom prst="rect">
+              <a:avLst/>
+            </a:prstGeom>
+            <a:noFill/>
+          </p:spPr>
+          <p:txBody>
+            <a:bodyPr wrap="square" rtlCol="0">
+              <a:spAutoFit/>
+            </a:bodyPr>
+            <a:lstStyle/>
+            <a:p>
+              <a:pPr marL="0" marR="0" lvl="0" indent="0" algn="l" defTabSz="914400" rtl="0" eaLnBrk="1" fontAlgn="auto" latinLnBrk="0" hangingPunct="1">
+                <a:lnSpc>
+                  <a:spcPct val="100000"/>
+                </a:lnSpc>
+                <a:spcBef>
+                  <a:spcPts val="0"/>
+                </a:spcBef>
+                <a:spcAft>
+                  <a:spcPts val="0"/>
+                </a:spcAft>
+                <a:buClrTx/>
+                <a:buSzTx/>
+                <a:buFontTx/>
+                <a:buNone/>
+                <a:tabLst/>
+                <a:defRPr/>
+              </a:pPr>
+              <a:r>
+                <a:rPr kumimoji="0" lang="en-GB" sz="1800" b="0" i="0" u="none" strike="noStrike" kern="1200" cap="none" spc="0" normalizeH="0" baseline="0" noProof="0" dirty="0">
+                  <a:ln>
+                    <a:noFill/>
+                  </a:ln>
+                  <a:solidFill>
+                    <a:prstClr val="black"/>
+                  </a:solidFill>
+                  <a:effectLst/>
+                  <a:uLnTx/>
+                  <a:uFillTx/>
+                  <a:latin typeface="Calibri" panose="020F0502020204030204"/>
+                  <a:ea typeface="+mn-ea"/>
+                  <a:cs typeface="+mn-cs"/>
+                </a:rPr>
+                <a:t>Section: 12.47, 12.48, 12.49</a:t>
+              </a:r>
+            </a:p>
+          </p:txBody>
+        </p:sp>
+        <p:sp>
+          <p:nvSpPr>
+            <p:cNvPr id="10" name="TextBox 9">
+              <a:extLst>
+                <a:ext uri="{FF2B5EF4-FFF2-40B4-BE49-F238E27FC236}">
+                  <a16:creationId xmlns:a16="http://schemas.microsoft.com/office/drawing/2014/main" id="{4E568F0D-7E90-4A0C-8070-6C806D992954}"/>
+                </a:ext>
+              </a:extLst>
+            </p:cNvPr>
+            <p:cNvSpPr txBox="1"/>
+            <p:nvPr/>
+          </p:nvSpPr>
+          <p:spPr>
+            <a:xfrm>
+              <a:off x="9534699" y="180818"/>
+              <a:ext cx="2155764" cy="369332"/>
+            </a:xfrm>
+            <a:prstGeom prst="rect">
+              <a:avLst/>
+            </a:prstGeom>
+            <a:noFill/>
+          </p:spPr>
+          <p:txBody>
+            <a:bodyPr wrap="square" rtlCol="0">
+              <a:spAutoFit/>
+            </a:bodyPr>
+            <a:lstStyle/>
+            <a:p>
+              <a:pPr marL="0" marR="0" lvl="0" indent="0" algn="l" defTabSz="914400" rtl="0" eaLnBrk="1" fontAlgn="auto" latinLnBrk="0" hangingPunct="1">
+                <a:lnSpc>
+                  <a:spcPct val="100000"/>
+                </a:lnSpc>
+                <a:spcBef>
+                  <a:spcPts val="0"/>
+                </a:spcBef>
+                <a:spcAft>
+                  <a:spcPts val="0"/>
+                </a:spcAft>
+                <a:buClrTx/>
+                <a:buSzTx/>
+                <a:buFontTx/>
+                <a:buNone/>
+                <a:tabLst/>
+                <a:defRPr/>
+              </a:pPr>
+              <a:r>
+                <a:rPr kumimoji="0" lang="en-GB" sz="1800" b="0" i="0" u="none" strike="noStrike" kern="1200" cap="none" spc="0" normalizeH="0" baseline="0" noProof="0" dirty="0">
+                  <a:ln>
+                    <a:noFill/>
+                  </a:ln>
+                  <a:solidFill>
+                    <a:prstClr val="black"/>
+                  </a:solidFill>
+                  <a:effectLst/>
+                  <a:uLnTx/>
+                  <a:uFillTx/>
+                  <a:latin typeface="Calibri" panose="020F0502020204030204"/>
+                  <a:ea typeface="+mn-ea"/>
+                  <a:cs typeface="+mn-cs"/>
+                </a:rPr>
+                <a:t>Date: 21/06/22 </a:t>
+              </a:r>
+            </a:p>
+          </p:txBody>
+        </p:sp>
+        <p:cxnSp>
+          <p:nvCxnSpPr>
+            <p:cNvPr id="11" name="Straight Connector 10">
+              <a:extLst>
+                <a:ext uri="{FF2B5EF4-FFF2-40B4-BE49-F238E27FC236}">
+                  <a16:creationId xmlns:a16="http://schemas.microsoft.com/office/drawing/2014/main" id="{F70ABCF3-BE60-426F-8C8C-059C854869C6}"/>
+                </a:ext>
+              </a:extLst>
+            </p:cNvPr>
+            <p:cNvCxnSpPr>
+              <a:cxnSpLocks/>
+            </p:cNvCxnSpPr>
+            <p:nvPr/>
+          </p:nvCxnSpPr>
+          <p:spPr>
+            <a:xfrm flipV="1">
+              <a:off x="4267202" y="93505"/>
+              <a:ext cx="1" cy="754394"/>
+            </a:xfrm>
+            <a:prstGeom prst="line">
+              <a:avLst/>
+            </a:prstGeom>
+            <a:ln w="19050">
+              <a:solidFill>
+                <a:srgbClr val="0072C6"/>
+              </a:solidFill>
+            </a:ln>
+          </p:spPr>
+          <p:style>
+            <a:lnRef idx="1">
+              <a:schemeClr val="accent1"/>
+            </a:lnRef>
+            <a:fillRef idx="0">
+              <a:schemeClr val="accent1"/>
+            </a:fillRef>
+            <a:effectRef idx="0">
+              <a:schemeClr val="accent1"/>
+            </a:effectRef>
+            <a:fontRef idx="minor">
+              <a:schemeClr val="tx1"/>
+            </a:fontRef>
+          </p:style>
+        </p:cxnSp>
+        <p:cxnSp>
+          <p:nvCxnSpPr>
+            <p:cNvPr id="15" name="Straight Connector 14">
+              <a:extLst>
+                <a:ext uri="{FF2B5EF4-FFF2-40B4-BE49-F238E27FC236}">
+                  <a16:creationId xmlns:a16="http://schemas.microsoft.com/office/drawing/2014/main" id="{D7F750D7-69E5-4FC3-AFB5-134C7587DE8B}"/>
+                </a:ext>
+              </a:extLst>
+            </p:cNvPr>
+            <p:cNvCxnSpPr>
+              <a:cxnSpLocks/>
+            </p:cNvCxnSpPr>
+            <p:nvPr/>
+          </p:nvCxnSpPr>
+          <p:spPr>
+            <a:xfrm flipV="1">
+              <a:off x="7154489" y="88317"/>
+              <a:ext cx="1" cy="754394"/>
+            </a:xfrm>
+            <a:prstGeom prst="line">
+              <a:avLst/>
+            </a:prstGeom>
+            <a:ln w="19050">
+              <a:solidFill>
+                <a:srgbClr val="0072C6"/>
+              </a:solidFill>
+            </a:ln>
+          </p:spPr>
+          <p:style>
+            <a:lnRef idx="1">
+              <a:schemeClr val="accent1"/>
+            </a:lnRef>
+            <a:fillRef idx="0">
+              <a:schemeClr val="accent1"/>
+            </a:fillRef>
+            <a:effectRef idx="0">
+              <a:schemeClr val="accent1"/>
+            </a:effectRef>
+            <a:fontRef idx="minor">
+              <a:schemeClr val="tx1"/>
+            </a:fontRef>
+          </p:style>
+        </p:cxnSp>
+        <p:cxnSp>
+          <p:nvCxnSpPr>
+            <p:cNvPr id="16" name="Straight Connector 15">
+              <a:extLst>
+                <a:ext uri="{FF2B5EF4-FFF2-40B4-BE49-F238E27FC236}">
+                  <a16:creationId xmlns:a16="http://schemas.microsoft.com/office/drawing/2014/main" id="{90F03633-4CAB-4B57-BF94-CF91E87AB7AE}"/>
+                </a:ext>
+              </a:extLst>
+            </p:cNvPr>
+            <p:cNvCxnSpPr>
+              <a:cxnSpLocks/>
+            </p:cNvCxnSpPr>
+            <p:nvPr/>
+          </p:nvCxnSpPr>
+          <p:spPr>
+            <a:xfrm flipV="1">
+              <a:off x="9491750" y="83129"/>
+              <a:ext cx="1" cy="754394"/>
+            </a:xfrm>
+            <a:prstGeom prst="line">
+              <a:avLst/>
+            </a:prstGeom>
+            <a:ln w="19050">
+              <a:solidFill>
+                <a:srgbClr val="0072C6"/>
+              </a:solidFill>
+            </a:ln>
+          </p:spPr>
+          <p:style>
+            <a:lnRef idx="1">
+              <a:schemeClr val="accent1"/>
+            </a:lnRef>
+            <a:fillRef idx="0">
+              <a:schemeClr val="accent1"/>
+            </a:fillRef>
+            <a:effectRef idx="0">
+              <a:schemeClr val="accent1"/>
+            </a:effectRef>
+            <a:fontRef idx="minor">
+              <a:schemeClr val="tx1"/>
+            </a:fontRef>
+          </p:style>
+        </p:cxnSp>
+      </p:grpSp>
+      <p:pic>
+        <p:nvPicPr>
+          <p:cNvPr id="20" name="Picture 2">
+            <a:extLst>
+              <a:ext uri="{FF2B5EF4-FFF2-40B4-BE49-F238E27FC236}">
+                <a16:creationId xmlns:a16="http://schemas.microsoft.com/office/drawing/2014/main" id="{775211BE-DA3A-41DA-8578-4E52F07B6AB9}"/>
+              </a:ext>
+            </a:extLst>
+          </p:cNvPr>
+          <p:cNvPicPr>
+            <a:picLocks noChangeAspect="1" noChangeArrowheads="1"/>
+          </p:cNvPicPr>
+          <p:nvPr/>
+        </p:nvPicPr>
+        <p:blipFill>
+          <a:blip r:embed="rId2">
+            <a:extLst>
+              <a:ext uri="{28A0092B-C50C-407E-A947-70E740481C1C}">
+                <a14:useLocalDpi xmlns:a14="http://schemas.microsoft.com/office/drawing/2010/main" val="0"/>
+              </a:ext>
+            </a:extLst>
+          </a:blip>
+          <a:srcRect/>
+          <a:stretch>
+            <a:fillRect/>
+          </a:stretch>
+        </p:blipFill>
+        <p:spPr bwMode="auto">
+          <a:xfrm>
+            <a:off x="144770" y="111976"/>
+            <a:ext cx="725548" cy="725548"/>
+          </a:xfrm>
+          <a:prstGeom prst="rect">
+            <a:avLst/>
+          </a:prstGeom>
+          <a:noFill/>
+          <a:extLst>
+            <a:ext uri="{909E8E84-426E-40DD-AFC4-6F175D3DCCD1}">
+              <a14:hiddenFill xmlns:a14="http://schemas.microsoft.com/office/drawing/2010/main">
+                <a:solidFill>
+                  <a:srgbClr val="FFFFFF"/>
+                </a:solidFill>
+              </a14:hiddenFill>
+            </a:ext>
+          </a:extLst>
+        </p:spPr>
+      </p:pic>
+      <p:sp>
+        <p:nvSpPr>
+          <p:cNvPr id="21" name="TextBox 20">
+            <a:extLst>
+              <a:ext uri="{FF2B5EF4-FFF2-40B4-BE49-F238E27FC236}">
+                <a16:creationId xmlns:a16="http://schemas.microsoft.com/office/drawing/2014/main" id="{30404CBF-C3F9-43E0-81FA-E9D4D01BC004}"/>
+              </a:ext>
+            </a:extLst>
+          </p:cNvPr>
+          <p:cNvSpPr txBox="1"/>
+          <p:nvPr/>
+        </p:nvSpPr>
+        <p:spPr>
+          <a:xfrm>
+            <a:off x="914402" y="191193"/>
+            <a:ext cx="3483032" cy="646331"/>
+          </a:xfrm>
+          <a:prstGeom prst="rect">
+            <a:avLst/>
+          </a:prstGeom>
+          <a:noFill/>
+        </p:spPr>
+        <p:txBody>
+          <a:bodyPr wrap="square" rtlCol="0">
+            <a:spAutoFit/>
+          </a:bodyPr>
+          <a:lstStyle/>
+          <a:p>
+            <a:pPr marL="0" marR="0" lvl="0" indent="0" algn="l" defTabSz="914400" rtl="0" eaLnBrk="1" fontAlgn="auto" latinLnBrk="0" hangingPunct="1">
+              <a:lnSpc>
+                <a:spcPct val="100000"/>
+              </a:lnSpc>
+              <a:spcBef>
+                <a:spcPts val="0"/>
+              </a:spcBef>
+              <a:spcAft>
+                <a:spcPts val="0"/>
+              </a:spcAft>
+              <a:buClrTx/>
+              <a:buSzTx/>
+              <a:buFontTx/>
+              <a:buNone/>
+              <a:tabLst/>
+              <a:defRPr/>
+            </a:pPr>
+            <a:r>
+              <a:rPr kumimoji="0" lang="en-GB" sz="1800" b="0" i="0" u="none" strike="noStrike" kern="1200" cap="none" spc="0" normalizeH="0" baseline="0" noProof="0" dirty="0">
+                <a:ln>
+                  <a:noFill/>
+                </a:ln>
+                <a:solidFill>
+                  <a:prstClr val="black"/>
+                </a:solidFill>
+                <a:effectLst/>
+                <a:uLnTx/>
+                <a:uFillTx/>
+                <a:latin typeface="Calibri" panose="020F0502020204030204"/>
+                <a:ea typeface="+mn-ea"/>
+                <a:cs typeface="+mn-cs"/>
+              </a:rPr>
+              <a:t>AZ-900 Microsoft Azure Fundamentals</a:t>
+            </a:r>
+          </a:p>
+        </p:txBody>
+      </p:sp>
+      <p:sp>
+        <p:nvSpPr>
+          <p:cNvPr id="12" name="TextBox 11">
+            <a:extLst>
+              <a:ext uri="{FF2B5EF4-FFF2-40B4-BE49-F238E27FC236}">
+                <a16:creationId xmlns:a16="http://schemas.microsoft.com/office/drawing/2014/main" id="{A48842C8-EFC7-F1D7-CA9F-9D69E7C11F18}"/>
+              </a:ext>
+            </a:extLst>
+          </p:cNvPr>
+          <p:cNvSpPr txBox="1"/>
+          <p:nvPr/>
+        </p:nvSpPr>
+        <p:spPr>
+          <a:xfrm>
+            <a:off x="343441" y="1068053"/>
+            <a:ext cx="11563010" cy="1845377"/>
+          </a:xfrm>
+          <a:prstGeom prst="rect">
+            <a:avLst/>
+          </a:prstGeom>
+          <a:noFill/>
+        </p:spPr>
+        <p:txBody>
+          <a:bodyPr wrap="square" rtlCol="0">
+            <a:spAutoFit/>
+          </a:bodyPr>
+          <a:lstStyle/>
+          <a:p>
+            <a:pPr>
+              <a:lnSpc>
+                <a:spcPct val="120000"/>
+              </a:lnSpc>
+            </a:pPr>
+            <a:r>
+              <a:rPr lang="en-GB" sz="1600" b="1" dirty="0"/>
+              <a:t>Azure Arc </a:t>
+            </a:r>
+          </a:p>
+          <a:p>
+            <a:pPr marL="285750" indent="-285750">
+              <a:lnSpc>
+                <a:spcPct val="120000"/>
+              </a:lnSpc>
+              <a:buFontTx/>
+              <a:buChar char="-"/>
+            </a:pPr>
+            <a:r>
+              <a:rPr lang="en-GB" sz="1600" dirty="0"/>
+              <a:t>Allows you to see your own infrastructure that you run on prem or with other clouds such as AWS. I also believe you can manage these resources as well but I’m not 100% sure.  </a:t>
+            </a:r>
+          </a:p>
+          <a:p>
+            <a:pPr marL="285750" indent="-285750">
+              <a:lnSpc>
+                <a:spcPct val="120000"/>
+              </a:lnSpc>
+              <a:buFontTx/>
+              <a:buChar char="-"/>
+            </a:pPr>
+            <a:r>
+              <a:rPr lang="en-GB" sz="1600" dirty="0"/>
+              <a:t>There’s no charge to see this, just add the infrastructure and see the views.</a:t>
+            </a:r>
+          </a:p>
+          <a:p>
+            <a:pPr marL="285750" indent="-285750">
+              <a:lnSpc>
+                <a:spcPct val="120000"/>
+              </a:lnSpc>
+              <a:buFontTx/>
+              <a:buChar char="-"/>
+            </a:pPr>
+            <a:r>
+              <a:rPr lang="en-GB" sz="1600" dirty="0"/>
+              <a:t>Also offer a sandbox to play with this without having to have resource deployed in other locations.</a:t>
+            </a:r>
+          </a:p>
+          <a:p>
+            <a:pPr marL="285750" indent="-285750">
+              <a:lnSpc>
+                <a:spcPct val="120000"/>
+              </a:lnSpc>
+              <a:buFontTx/>
+              <a:buChar char="-"/>
+            </a:pPr>
+            <a:endParaRPr lang="en-GB" sz="1600" dirty="0"/>
+          </a:p>
+        </p:txBody>
+      </p:sp>
+      <p:pic>
+        <p:nvPicPr>
+          <p:cNvPr id="3" name="Picture 2">
+            <a:extLst>
+              <a:ext uri="{FF2B5EF4-FFF2-40B4-BE49-F238E27FC236}">
+                <a16:creationId xmlns:a16="http://schemas.microsoft.com/office/drawing/2014/main" id="{9E893193-394D-C1FF-E4AD-1B6566D91606}"/>
+              </a:ext>
+            </a:extLst>
+          </p:cNvPr>
+          <p:cNvPicPr>
+            <a:picLocks noChangeAspect="1"/>
+          </p:cNvPicPr>
+          <p:nvPr/>
+        </p:nvPicPr>
+        <p:blipFill rotWithShape="1">
+          <a:blip r:embed="rId3"/>
+          <a:srcRect b="16289"/>
+          <a:stretch/>
+        </p:blipFill>
+        <p:spPr>
+          <a:xfrm>
+            <a:off x="5322129" y="3009127"/>
+            <a:ext cx="6287923" cy="2842991"/>
+          </a:xfrm>
+          <a:prstGeom prst="rect">
+            <a:avLst/>
+          </a:prstGeom>
+        </p:spPr>
+      </p:pic>
+      <p:sp>
+        <p:nvSpPr>
+          <p:cNvPr id="41" name="TextBox 40">
+            <a:extLst>
+              <a:ext uri="{FF2B5EF4-FFF2-40B4-BE49-F238E27FC236}">
+                <a16:creationId xmlns:a16="http://schemas.microsoft.com/office/drawing/2014/main" id="{D037D12A-5621-BD28-0EFF-8D6FACADF7A9}"/>
+              </a:ext>
+            </a:extLst>
+          </p:cNvPr>
+          <p:cNvSpPr txBox="1"/>
+          <p:nvPr/>
+        </p:nvSpPr>
+        <p:spPr>
+          <a:xfrm>
+            <a:off x="343441" y="2744134"/>
+            <a:ext cx="4760187" cy="3913635"/>
+          </a:xfrm>
+          <a:prstGeom prst="rect">
+            <a:avLst/>
+          </a:prstGeom>
+          <a:noFill/>
+        </p:spPr>
+        <p:txBody>
+          <a:bodyPr wrap="square" rtlCol="0">
+            <a:spAutoFit/>
+          </a:bodyPr>
+          <a:lstStyle/>
+          <a:p>
+            <a:pPr>
+              <a:lnSpc>
+                <a:spcPct val="120000"/>
+              </a:lnSpc>
+            </a:pPr>
+            <a:r>
+              <a:rPr lang="en-GB" sz="1600" b="1" dirty="0"/>
+              <a:t>ARM (Azure Resource Manager) Templates</a:t>
+            </a:r>
+          </a:p>
+          <a:p>
+            <a:pPr marL="285750" indent="-285750">
+              <a:lnSpc>
+                <a:spcPct val="120000"/>
+              </a:lnSpc>
+              <a:buFontTx/>
+              <a:buChar char="-"/>
+            </a:pPr>
+            <a:r>
+              <a:rPr lang="en-GB" sz="1600" dirty="0"/>
+              <a:t>Service running in the background that’s effectively the middle man between the actual resource and tools available to us like the portal.</a:t>
+            </a:r>
+          </a:p>
+          <a:p>
+            <a:pPr marL="285750" indent="-285750">
+              <a:lnSpc>
+                <a:spcPct val="120000"/>
+              </a:lnSpc>
+              <a:buFontTx/>
+              <a:buChar char="-"/>
+            </a:pPr>
+            <a:r>
+              <a:rPr lang="en-GB" sz="1600" dirty="0"/>
+              <a:t>When you create a resource in the portal it gets created in an ARM template and it’s the template that gets deployed. The template is in JSON format and is effectively a set of variables.</a:t>
+            </a:r>
+          </a:p>
+          <a:p>
+            <a:pPr marL="285750" indent="-285750">
+              <a:lnSpc>
+                <a:spcPct val="120000"/>
+              </a:lnSpc>
+              <a:buFontTx/>
+              <a:buChar char="-"/>
+            </a:pPr>
+            <a:r>
+              <a:rPr lang="en-GB" sz="1600" dirty="0"/>
+              <a:t>We can download a template when creating a resource in the portal. This is useful if we want to create resources repeatedly.</a:t>
+            </a:r>
+          </a:p>
+          <a:p>
+            <a:pPr marL="285750" indent="-285750">
+              <a:lnSpc>
+                <a:spcPct val="120000"/>
+              </a:lnSpc>
+              <a:buFontTx/>
+              <a:buChar char="-"/>
+            </a:pPr>
+            <a:r>
+              <a:rPr lang="en-GB" sz="1600" dirty="0"/>
+              <a:t>We can save and store our templates in the ‘template specs’ for future use.</a:t>
+            </a:r>
+          </a:p>
+        </p:txBody>
+      </p:sp>
+      <p:sp>
+        <p:nvSpPr>
+          <p:cNvPr id="43" name="TextBox 42">
+            <a:extLst>
+              <a:ext uri="{FF2B5EF4-FFF2-40B4-BE49-F238E27FC236}">
+                <a16:creationId xmlns:a16="http://schemas.microsoft.com/office/drawing/2014/main" id="{1F0FA716-B154-C20C-FD3E-2F1CA54C70DF}"/>
+              </a:ext>
+            </a:extLst>
+          </p:cNvPr>
+          <p:cNvSpPr txBox="1"/>
+          <p:nvPr/>
+        </p:nvSpPr>
+        <p:spPr>
+          <a:xfrm>
+            <a:off x="5241718" y="6065438"/>
+            <a:ext cx="6368334" cy="646331"/>
+          </a:xfrm>
+          <a:prstGeom prst="rect">
+            <a:avLst/>
+          </a:prstGeom>
+          <a:noFill/>
+        </p:spPr>
+        <p:txBody>
+          <a:bodyPr wrap="square">
+            <a:spAutoFit/>
+          </a:bodyPr>
+          <a:lstStyle/>
+          <a:p>
+            <a:r>
+              <a:rPr lang="en-US" sz="1200" i="1" dirty="0">
+                <a:solidFill>
+                  <a:schemeClr val="accent1">
+                    <a:lumMod val="75000"/>
+                  </a:schemeClr>
+                </a:solidFill>
+                <a:effectLst/>
+                <a:latin typeface="arial" panose="020B0604020202020204" pitchFamily="34" charset="0"/>
+              </a:rPr>
+              <a:t>N.B./  An Azure Blueprint often consists of a set of resource groups, policies, role assignments, and Resource Manager (ARM) template deployments. So, blueprints are almost one level up from ARM templates </a:t>
+            </a:r>
+            <a:endParaRPr lang="en-GB" sz="1200" i="1" dirty="0">
+              <a:solidFill>
+                <a:schemeClr val="accent1">
+                  <a:lumMod val="75000"/>
+                </a:schemeClr>
+              </a:solidFill>
+            </a:endParaRPr>
+          </a:p>
+        </p:txBody>
+      </p:sp>
+    </p:spTree>
+    <p:extLst>
+      <p:ext uri="{BB962C8B-B14F-4D97-AF65-F5344CB8AC3E}">
+        <p14:creationId xmlns:p14="http://schemas.microsoft.com/office/powerpoint/2010/main" val="3199202557"/>
+      </p:ext>
+    </p:extLst>
+  </p:cSld>
+  <p:clrMapOvr>
+    <a:masterClrMapping/>
+  </p:clrMapOvr>
+</p:sld>
+</file>
+
+<file path=ppt/slides/slide51.xml><?xml version="1.0" encoding="utf-8"?>
+<p:sld xmlns:a="http://schemas.openxmlformats.org/drawingml/2006/main" xmlns:r="http://schemas.openxmlformats.org/officeDocument/2006/relationships" xmlns:p="http://schemas.openxmlformats.org/presentationml/2006/main">
+  <p:cSld>
+    <p:spTree>
+      <p:nvGrpSpPr>
+        <p:cNvPr id="1" name=""/>
+        <p:cNvGrpSpPr/>
+        <p:nvPr/>
+      </p:nvGrpSpPr>
+      <p:grpSpPr>
+        <a:xfrm>
+          <a:off x="0" y="0"/>
+          <a:ext cx="0" cy="0"/>
+          <a:chOff x="0" y="0"/>
+          <a:chExt cx="0" cy="0"/>
+        </a:xfrm>
+      </p:grpSpPr>
+      <p:pic>
+        <p:nvPicPr>
+          <p:cNvPr id="7" name="Picture 2">
+            <a:extLst>
+              <a:ext uri="{FF2B5EF4-FFF2-40B4-BE49-F238E27FC236}">
+                <a16:creationId xmlns:a16="http://schemas.microsoft.com/office/drawing/2014/main" id="{656D77DE-6845-4DF0-A4E8-FCEE79C806B5}"/>
+              </a:ext>
+            </a:extLst>
+          </p:cNvPr>
+          <p:cNvPicPr>
+            <a:picLocks noChangeAspect="1" noChangeArrowheads="1"/>
+          </p:cNvPicPr>
+          <p:nvPr/>
+        </p:nvPicPr>
+        <p:blipFill>
+          <a:blip r:embed="rId2">
+            <a:extLst>
+              <a:ext uri="{28A0092B-C50C-407E-A947-70E740481C1C}">
+                <a14:useLocalDpi xmlns:a14="http://schemas.microsoft.com/office/drawing/2010/main" val="0"/>
+              </a:ext>
+            </a:extLst>
+          </a:blip>
+          <a:srcRect/>
+          <a:stretch>
+            <a:fillRect/>
+          </a:stretch>
+        </p:blipFill>
+        <p:spPr bwMode="auto">
+          <a:xfrm>
+            <a:off x="144770" y="111976"/>
+            <a:ext cx="725548" cy="725548"/>
+          </a:xfrm>
+          <a:prstGeom prst="rect">
+            <a:avLst/>
+          </a:prstGeom>
+          <a:noFill/>
+          <a:extLst>
+            <a:ext uri="{909E8E84-426E-40DD-AFC4-6F175D3DCCD1}">
+              <a14:hiddenFill xmlns:a14="http://schemas.microsoft.com/office/drawing/2010/main">
+                <a:solidFill>
+                  <a:srgbClr val="FFFFFF"/>
+                </a:solidFill>
+              </a14:hiddenFill>
+            </a:ext>
+          </a:extLst>
+        </p:spPr>
+      </p:pic>
+      <p:cxnSp>
+        <p:nvCxnSpPr>
+          <p:cNvPr id="5" name="Straight Connector 4">
+            <a:extLst>
+              <a:ext uri="{FF2B5EF4-FFF2-40B4-BE49-F238E27FC236}">
+                <a16:creationId xmlns:a16="http://schemas.microsoft.com/office/drawing/2014/main" id="{A8BE4EF8-406C-4035-940C-AB752B29BA18}"/>
+              </a:ext>
+            </a:extLst>
+          </p:cNvPr>
+          <p:cNvCxnSpPr/>
+          <p:nvPr/>
+        </p:nvCxnSpPr>
+        <p:spPr>
+          <a:xfrm>
+            <a:off x="99755" y="955963"/>
+            <a:ext cx="11953701" cy="0"/>
+          </a:xfrm>
+          <a:prstGeom prst="line">
+            <a:avLst/>
+          </a:prstGeom>
+          <a:ln w="19050">
+            <a:solidFill>
+              <a:srgbClr val="0072C6"/>
+            </a:solidFill>
+          </a:ln>
+        </p:spPr>
+        <p:style>
+          <a:lnRef idx="1">
+            <a:schemeClr val="accent1"/>
+          </a:lnRef>
+          <a:fillRef idx="0">
+            <a:schemeClr val="accent1"/>
+          </a:fillRef>
+          <a:effectRef idx="0">
+            <a:schemeClr val="accent1"/>
+          </a:effectRef>
+          <a:fontRef idx="minor">
+            <a:schemeClr val="tx1"/>
+          </a:fontRef>
+        </p:style>
+      </p:cxnSp>
+      <p:sp>
+        <p:nvSpPr>
+          <p:cNvPr id="6" name="TextBox 5">
+            <a:extLst>
+              <a:ext uri="{FF2B5EF4-FFF2-40B4-BE49-F238E27FC236}">
+                <a16:creationId xmlns:a16="http://schemas.microsoft.com/office/drawing/2014/main" id="{4A5E75BC-B6AC-4138-AB81-9DEC0096C5A8}"/>
+              </a:ext>
+            </a:extLst>
+          </p:cNvPr>
+          <p:cNvSpPr txBox="1"/>
+          <p:nvPr/>
+        </p:nvSpPr>
+        <p:spPr>
+          <a:xfrm>
+            <a:off x="914402" y="191193"/>
+            <a:ext cx="3483032" cy="646331"/>
+          </a:xfrm>
+          <a:prstGeom prst="rect">
+            <a:avLst/>
+          </a:prstGeom>
+          <a:noFill/>
+        </p:spPr>
+        <p:txBody>
+          <a:bodyPr wrap="square" rtlCol="0">
+            <a:spAutoFit/>
+          </a:bodyPr>
+          <a:lstStyle/>
+          <a:p>
+            <a:pPr marL="0" marR="0" lvl="0" indent="0" algn="l" defTabSz="914400" rtl="0" eaLnBrk="1" fontAlgn="auto" latinLnBrk="0" hangingPunct="1">
+              <a:lnSpc>
+                <a:spcPct val="100000"/>
+              </a:lnSpc>
+              <a:spcBef>
+                <a:spcPts val="0"/>
+              </a:spcBef>
+              <a:spcAft>
+                <a:spcPts val="0"/>
+              </a:spcAft>
+              <a:buClrTx/>
+              <a:buSzTx/>
+              <a:buFontTx/>
+              <a:buNone/>
+              <a:tabLst/>
+              <a:defRPr/>
+            </a:pPr>
+            <a:r>
+              <a:rPr kumimoji="0" lang="en-GB" sz="1800" b="0" i="0" u="none" strike="noStrike" kern="1200" cap="none" spc="0" normalizeH="0" baseline="0" noProof="0" dirty="0">
+                <a:ln>
+                  <a:noFill/>
+                </a:ln>
+                <a:solidFill>
+                  <a:prstClr val="black"/>
+                </a:solidFill>
+                <a:effectLst/>
+                <a:uLnTx/>
+                <a:uFillTx/>
+                <a:latin typeface="Calibri" panose="020F0502020204030204"/>
+                <a:ea typeface="+mn-ea"/>
+                <a:cs typeface="+mn-cs"/>
+              </a:rPr>
+              <a:t>AZ-900 Microsoft Azure Fundamentals</a:t>
+            </a:r>
+          </a:p>
+        </p:txBody>
+      </p:sp>
+      <p:sp>
+        <p:nvSpPr>
+          <p:cNvPr id="8" name="TextBox 7">
+            <a:extLst>
+              <a:ext uri="{FF2B5EF4-FFF2-40B4-BE49-F238E27FC236}">
+                <a16:creationId xmlns:a16="http://schemas.microsoft.com/office/drawing/2014/main" id="{C61B684E-FDA7-4625-9CC3-79C17CC59ED7}"/>
+              </a:ext>
+            </a:extLst>
+          </p:cNvPr>
+          <p:cNvSpPr txBox="1"/>
+          <p:nvPr/>
+        </p:nvSpPr>
+        <p:spPr>
+          <a:xfrm>
+            <a:off x="320040" y="2479578"/>
+            <a:ext cx="11484864" cy="1569660"/>
+          </a:xfrm>
+          <a:prstGeom prst="rect">
+            <a:avLst/>
+          </a:prstGeom>
+          <a:noFill/>
+        </p:spPr>
+        <p:txBody>
+          <a:bodyPr wrap="square" rtlCol="0">
+            <a:spAutoFit/>
+          </a:bodyPr>
+          <a:lstStyle/>
+          <a:p>
+            <a:pPr marL="0" marR="0" lvl="0" indent="0" algn="ctr" defTabSz="914400" rtl="0" eaLnBrk="1" fontAlgn="auto" latinLnBrk="0" hangingPunct="1">
+              <a:lnSpc>
+                <a:spcPct val="100000"/>
+              </a:lnSpc>
+              <a:spcBef>
+                <a:spcPts val="0"/>
+              </a:spcBef>
+              <a:spcAft>
+                <a:spcPts val="0"/>
+              </a:spcAft>
+              <a:buClrTx/>
+              <a:buSzTx/>
+              <a:buFontTx/>
+              <a:buNone/>
+              <a:tabLst/>
+              <a:defRPr/>
+            </a:pPr>
+            <a:r>
+              <a:rPr kumimoji="0" lang="en-GB" sz="3200" i="0" u="none" strike="noStrike" kern="1200" cap="none" spc="0" normalizeH="0" baseline="0" noProof="0" dirty="0">
+                <a:ln>
+                  <a:noFill/>
+                </a:ln>
+                <a:solidFill>
+                  <a:prstClr val="black"/>
+                </a:solidFill>
+                <a:effectLst/>
+                <a:uLnTx/>
+                <a:uFillTx/>
+                <a:latin typeface="Calibri" panose="020F0502020204030204"/>
+                <a:ea typeface="+mn-ea"/>
+                <a:cs typeface="+mn-cs"/>
+              </a:rPr>
+              <a:t>Section 13</a:t>
+            </a:r>
+          </a:p>
+          <a:p>
+            <a:pPr marL="0" marR="0" lvl="0" indent="0" algn="ctr" defTabSz="914400" rtl="0" eaLnBrk="1" fontAlgn="auto" latinLnBrk="0" hangingPunct="1">
+              <a:lnSpc>
+                <a:spcPct val="100000"/>
+              </a:lnSpc>
+              <a:spcBef>
+                <a:spcPts val="0"/>
+              </a:spcBef>
+              <a:spcAft>
+                <a:spcPts val="0"/>
+              </a:spcAft>
+              <a:buClrTx/>
+              <a:buSzTx/>
+              <a:buFontTx/>
+              <a:buNone/>
+              <a:tabLst/>
+              <a:defRPr/>
+            </a:pPr>
+            <a:endParaRPr kumimoji="0" lang="en-GB" sz="3200" b="1" i="0" u="none" strike="noStrike" kern="1200" cap="none" spc="0" normalizeH="0" baseline="0" noProof="0" dirty="0">
+              <a:ln>
+                <a:noFill/>
+              </a:ln>
+              <a:solidFill>
+                <a:prstClr val="black"/>
+              </a:solidFill>
+              <a:effectLst/>
+              <a:uLnTx/>
+              <a:uFillTx/>
+              <a:latin typeface="Calibri" panose="020F0502020204030204"/>
+              <a:ea typeface="+mn-ea"/>
+              <a:cs typeface="+mn-cs"/>
+            </a:endParaRPr>
+          </a:p>
+          <a:p>
+            <a:pPr marL="0" marR="0" lvl="0" indent="0" algn="ctr" defTabSz="914400" rtl="0" eaLnBrk="1" fontAlgn="auto" latinLnBrk="0" hangingPunct="1">
+              <a:lnSpc>
+                <a:spcPct val="100000"/>
+              </a:lnSpc>
+              <a:spcBef>
+                <a:spcPts val="0"/>
+              </a:spcBef>
+              <a:spcAft>
+                <a:spcPts val="0"/>
+              </a:spcAft>
+              <a:buClrTx/>
+              <a:buSzTx/>
+              <a:buFontTx/>
+              <a:buNone/>
+              <a:tabLst/>
+              <a:defRPr/>
+            </a:pPr>
+            <a:r>
+              <a:rPr kumimoji="0" lang="en-GB" sz="3200" b="1" i="0" u="none" strike="noStrike" kern="1200" cap="none" spc="0" normalizeH="0" baseline="0" noProof="0" dirty="0">
+                <a:ln>
+                  <a:noFill/>
+                </a:ln>
+                <a:solidFill>
+                  <a:prstClr val="black"/>
+                </a:solidFill>
+                <a:effectLst/>
+                <a:uLnTx/>
+                <a:uFillTx/>
+                <a:latin typeface="Calibri" panose="020F0502020204030204"/>
+                <a:ea typeface="+mn-ea"/>
+                <a:cs typeface="+mn-cs"/>
+              </a:rPr>
+              <a:t>Monitoring Tools</a:t>
+            </a:r>
+          </a:p>
+        </p:txBody>
+      </p:sp>
+    </p:spTree>
+    <p:extLst>
+      <p:ext uri="{BB962C8B-B14F-4D97-AF65-F5344CB8AC3E}">
+        <p14:creationId xmlns:p14="http://schemas.microsoft.com/office/powerpoint/2010/main" val="1136276068"/>
       </p:ext>
     </p:extLst>
   </p:cSld>

</xml_diff>